<commit_message>
final update. new images of graphs were added and some were deleted. some of the csvs created were also deleted as they were not necessary. my_app.py was updated to have no option for selecting the actual sentiment.
</commit_message>
<xml_diff>
--- a/twitter.pptx
+++ b/twitter.pptx
@@ -7,7 +7,7 @@
     <p:sldMasterId id="2147483692" r:id="rId3"/>
   </p:sldMasterIdLst>
   <p:notesMasterIdLst>
-    <p:notesMasterId r:id="rId20"/>
+    <p:notesMasterId r:id="rId23"/>
   </p:notesMasterIdLst>
   <p:sldIdLst>
     <p:sldId id="354" r:id="rId4"/>
@@ -16,16 +16,19 @@
     <p:sldId id="365" r:id="rId7"/>
     <p:sldId id="364" r:id="rId8"/>
     <p:sldId id="366" r:id="rId9"/>
-    <p:sldId id="367" r:id="rId10"/>
-    <p:sldId id="356" r:id="rId11"/>
+    <p:sldId id="356" r:id="rId10"/>
+    <p:sldId id="359" r:id="rId11"/>
     <p:sldId id="358" r:id="rId12"/>
-    <p:sldId id="357" r:id="rId13"/>
-    <p:sldId id="359" r:id="rId14"/>
-    <p:sldId id="360" r:id="rId15"/>
-    <p:sldId id="361" r:id="rId16"/>
-    <p:sldId id="368" r:id="rId17"/>
-    <p:sldId id="362" r:id="rId18"/>
-    <p:sldId id="363" r:id="rId19"/>
+    <p:sldId id="360" r:id="rId13"/>
+    <p:sldId id="357" r:id="rId14"/>
+    <p:sldId id="361" r:id="rId15"/>
+    <p:sldId id="368" r:id="rId16"/>
+    <p:sldId id="362" r:id="rId17"/>
+    <p:sldId id="363" r:id="rId18"/>
+    <p:sldId id="369" r:id="rId19"/>
+    <p:sldId id="370" r:id="rId20"/>
+    <p:sldId id="371" r:id="rId21"/>
+    <p:sldId id="372" r:id="rId22"/>
   </p:sldIdLst>
   <p:sldSz cx="12192000" cy="6858000"/>
   <p:notesSz cx="6858000" cy="9144000"/>
@@ -225,7 +228,7 @@
           <a:p>
             <a:fld id="{3389243F-B1BB-4202-BD78-416ACA555174}" type="datetimeFigureOut">
               <a:rPr lang="en-US" smtClean="0"/>
-              <a:t>7/28/2021</a:t>
+              <a:t>7/29/2021</a:t>
             </a:fld>
             <a:endParaRPr lang="en-US"/>
           </a:p>
@@ -587,6 +590,196 @@
 </p:notes>
 </file>
 
+<file path=ppt/notesSlides/notesSlide10.xml><?xml version="1.0" encoding="utf-8"?>
+<p:notes xmlns:a="http://schemas.openxmlformats.org/drawingml/2006/main" xmlns:r="http://schemas.openxmlformats.org/officeDocument/2006/relationships" xmlns:p="http://schemas.openxmlformats.org/presentationml/2006/main">
+  <p:cSld>
+    <p:spTree>
+      <p:nvGrpSpPr>
+        <p:cNvPr id="1" name=""/>
+        <p:cNvGrpSpPr/>
+        <p:nvPr/>
+      </p:nvGrpSpPr>
+      <p:grpSpPr>
+        <a:xfrm>
+          <a:off x="0" y="0"/>
+          <a:ext cx="0" cy="0"/>
+          <a:chOff x="0" y="0"/>
+          <a:chExt cx="0" cy="0"/>
+        </a:xfrm>
+      </p:grpSpPr>
+      <p:sp>
+        <p:nvSpPr>
+          <p:cNvPr id="2" name="Slide Image Placeholder 1"/>
+          <p:cNvSpPr>
+            <a:spLocks noGrp="1" noRot="1" noChangeAspect="1"/>
+          </p:cNvSpPr>
+          <p:nvPr>
+            <p:ph type="sldImg"/>
+          </p:nvPr>
+        </p:nvSpPr>
+        <p:spPr/>
+      </p:sp>
+      <p:sp>
+        <p:nvSpPr>
+          <p:cNvPr id="3" name="Notes Placeholder 2"/>
+          <p:cNvSpPr>
+            <a:spLocks noGrp="1"/>
+          </p:cNvSpPr>
+          <p:nvPr>
+            <p:ph type="body" idx="1"/>
+          </p:nvPr>
+        </p:nvSpPr>
+        <p:spPr/>
+        <p:txBody>
+          <a:bodyPr/>
+          <a:lstStyle/>
+          <a:p>
+            <a:r>
+              <a:rPr lang="en-US"/>
+              <a:t>© Copyright </a:t>
+            </a:r>
+            <a:r>
+              <a:rPr lang="en-US" b="1"/>
+              <a:t>PresentationGO.com</a:t>
+            </a:r>
+            <a:r>
+              <a:rPr lang="en-US"/>
+              <a:t> – The free PowerPoint template library</a:t>
+            </a:r>
+          </a:p>
+        </p:txBody>
+      </p:sp>
+      <p:sp>
+        <p:nvSpPr>
+          <p:cNvPr id="4" name="Slide Number Placeholder 3"/>
+          <p:cNvSpPr>
+            <a:spLocks noGrp="1"/>
+          </p:cNvSpPr>
+          <p:nvPr>
+            <p:ph type="sldNum" sz="quarter" idx="10"/>
+          </p:nvPr>
+        </p:nvSpPr>
+        <p:spPr/>
+        <p:txBody>
+          <a:bodyPr/>
+          <a:lstStyle/>
+          <a:p>
+            <a:fld id="{B68D2766-C49B-4C1A-9FEE-6F146754B02B}" type="slidenum">
+              <a:rPr lang="en-US" smtClean="0"/>
+              <a:t>12</a:t>
+            </a:fld>
+            <a:endParaRPr lang="en-US"/>
+          </a:p>
+        </p:txBody>
+      </p:sp>
+    </p:spTree>
+    <p:extLst>
+      <p:ext uri="{BB962C8B-B14F-4D97-AF65-F5344CB8AC3E}">
+        <p14:creationId xmlns:p14="http://schemas.microsoft.com/office/powerpoint/2010/main" val="326981967"/>
+      </p:ext>
+    </p:extLst>
+  </p:cSld>
+  <p:clrMapOvr>
+    <a:masterClrMapping/>
+  </p:clrMapOvr>
+</p:notes>
+</file>
+
+<file path=ppt/notesSlides/notesSlide11.xml><?xml version="1.0" encoding="utf-8"?>
+<p:notes xmlns:a="http://schemas.openxmlformats.org/drawingml/2006/main" xmlns:r="http://schemas.openxmlformats.org/officeDocument/2006/relationships" xmlns:p="http://schemas.openxmlformats.org/presentationml/2006/main">
+  <p:cSld>
+    <p:spTree>
+      <p:nvGrpSpPr>
+        <p:cNvPr id="1" name=""/>
+        <p:cNvGrpSpPr/>
+        <p:nvPr/>
+      </p:nvGrpSpPr>
+      <p:grpSpPr>
+        <a:xfrm>
+          <a:off x="0" y="0"/>
+          <a:ext cx="0" cy="0"/>
+          <a:chOff x="0" y="0"/>
+          <a:chExt cx="0" cy="0"/>
+        </a:xfrm>
+      </p:grpSpPr>
+      <p:sp>
+        <p:nvSpPr>
+          <p:cNvPr id="2" name="Slide Image Placeholder 1"/>
+          <p:cNvSpPr>
+            <a:spLocks noGrp="1" noRot="1" noChangeAspect="1"/>
+          </p:cNvSpPr>
+          <p:nvPr>
+            <p:ph type="sldImg"/>
+          </p:nvPr>
+        </p:nvSpPr>
+        <p:spPr/>
+      </p:sp>
+      <p:sp>
+        <p:nvSpPr>
+          <p:cNvPr id="3" name="Notes Placeholder 2"/>
+          <p:cNvSpPr>
+            <a:spLocks noGrp="1"/>
+          </p:cNvSpPr>
+          <p:nvPr>
+            <p:ph type="body" idx="1"/>
+          </p:nvPr>
+        </p:nvSpPr>
+        <p:spPr/>
+        <p:txBody>
+          <a:bodyPr/>
+          <a:lstStyle/>
+          <a:p>
+            <a:r>
+              <a:rPr lang="en-US"/>
+              <a:t>© Copyright </a:t>
+            </a:r>
+            <a:r>
+              <a:rPr lang="en-US" b="1"/>
+              <a:t>PresentationGO.com</a:t>
+            </a:r>
+            <a:r>
+              <a:rPr lang="en-US"/>
+              <a:t> – The free PowerPoint template library</a:t>
+            </a:r>
+          </a:p>
+        </p:txBody>
+      </p:sp>
+      <p:sp>
+        <p:nvSpPr>
+          <p:cNvPr id="4" name="Slide Number Placeholder 3"/>
+          <p:cNvSpPr>
+            <a:spLocks noGrp="1"/>
+          </p:cNvSpPr>
+          <p:nvPr>
+            <p:ph type="sldNum" sz="quarter" idx="10"/>
+          </p:nvPr>
+        </p:nvSpPr>
+        <p:spPr/>
+        <p:txBody>
+          <a:bodyPr/>
+          <a:lstStyle/>
+          <a:p>
+            <a:fld id="{B68D2766-C49B-4C1A-9FEE-6F146754B02B}" type="slidenum">
+              <a:rPr lang="en-US" smtClean="0"/>
+              <a:t>13</a:t>
+            </a:fld>
+            <a:endParaRPr lang="en-US"/>
+          </a:p>
+        </p:txBody>
+      </p:sp>
+    </p:spTree>
+    <p:extLst>
+      <p:ext uri="{BB962C8B-B14F-4D97-AF65-F5344CB8AC3E}">
+        <p14:creationId xmlns:p14="http://schemas.microsoft.com/office/powerpoint/2010/main" val="1056149350"/>
+      </p:ext>
+    </p:extLst>
+  </p:cSld>
+  <p:clrMapOvr>
+    <a:masterClrMapping/>
+  </p:clrMapOvr>
+</p:notes>
+</file>
+
 <file path=ppt/notesSlides/notesSlide2.xml><?xml version="1.0" encoding="utf-8"?>
 <p:notes xmlns:a="http://schemas.openxmlformats.org/drawingml/2006/main" xmlns:r="http://schemas.openxmlformats.org/officeDocument/2006/relationships" xmlns:p="http://schemas.openxmlformats.org/presentationml/2006/main">
   <p:cSld>
@@ -726,18 +919,80 @@
           <a:bodyPr/>
           <a:lstStyle/>
           <a:p>
-            <a:r>
-              <a:rPr lang="en-US"/>
-              <a:t>© Copyright </a:t>
-            </a:r>
-            <a:r>
-              <a:rPr lang="en-US" b="1"/>
-              <a:t>PresentationGO.com</a:t>
-            </a:r>
-            <a:r>
-              <a:rPr lang="en-US"/>
-              <a:t> – The free PowerPoint template library</a:t>
-            </a:r>
+            <a:pPr marL="342900" indent="-342900">
+              <a:buFont typeface="Arial" panose="020B0604020202020204" pitchFamily="34" charset="0"/>
+              <a:buChar char="•"/>
+            </a:pPr>
+            <a:r>
+              <a:rPr lang="en-US" sz="1200" dirty="0">
+                <a:solidFill>
+                  <a:schemeClr val="tx1">
+                    <a:lumMod val="65000"/>
+                    <a:lumOff val="35000"/>
+                  </a:schemeClr>
+                </a:solidFill>
+              </a:rPr>
+              <a:t>For each old and new tweets, Random Forest Modeling and Naïve Bayesian Modeling were performed. </a:t>
+            </a:r>
+          </a:p>
+          <a:p>
+            <a:pPr marL="342900" indent="-342900">
+              <a:buFont typeface="Arial" panose="020B0604020202020204" pitchFamily="34" charset="0"/>
+              <a:buChar char="•"/>
+            </a:pPr>
+            <a:r>
+              <a:rPr lang="en-US" sz="1200" dirty="0">
+                <a:solidFill>
+                  <a:schemeClr val="tx1">
+                    <a:lumMod val="65000"/>
+                    <a:lumOff val="35000"/>
+                  </a:schemeClr>
+                </a:solidFill>
+              </a:rPr>
+              <a:t>The image on the right shows the confusion matrix of the random forest model after the </a:t>
+            </a:r>
+            <a:r>
+              <a:rPr lang="en-US" sz="1200" dirty="0" err="1">
+                <a:solidFill>
+                  <a:schemeClr val="tx1">
+                    <a:lumMod val="65000"/>
+                    <a:lumOff val="35000"/>
+                  </a:schemeClr>
+                </a:solidFill>
+              </a:rPr>
+              <a:t>gridsearch</a:t>
+            </a:r>
+            <a:r>
+              <a:rPr lang="en-US" sz="1200" dirty="0">
+                <a:solidFill>
+                  <a:schemeClr val="tx1">
+                    <a:lumMod val="65000"/>
+                    <a:lumOff val="35000"/>
+                  </a:schemeClr>
+                </a:solidFill>
+              </a:rPr>
+              <a:t> was performed. </a:t>
+            </a:r>
+          </a:p>
+          <a:p>
+            <a:pPr marL="342900" indent="-342900">
+              <a:buFont typeface="Arial" panose="020B0604020202020204" pitchFamily="34" charset="0"/>
+              <a:buChar char="•"/>
+            </a:pPr>
+            <a:r>
+              <a:rPr lang="en-US" sz="1200" dirty="0">
+                <a:solidFill>
+                  <a:schemeClr val="tx1">
+                    <a:lumMod val="65000"/>
+                    <a:lumOff val="35000"/>
+                  </a:schemeClr>
+                </a:solidFill>
+              </a:rPr>
+              <a:t>As shown before, the number of negative tweets were far less, which resulted in the low recall score for the negative tweets.</a:t>
+            </a:r>
+          </a:p>
+          <a:p>
+            <a:endParaRPr lang="en-US" dirty="0"/>
           </a:p>
         </p:txBody>
       </p:sp>
@@ -748,7 +1003,7 @@
             <a:spLocks noGrp="1"/>
           </p:cNvSpPr>
           <p:nvPr>
-            <p:ph type="sldNum" sz="quarter" idx="10"/>
+            <p:ph type="sldNum" sz="quarter" idx="5"/>
           </p:nvPr>
         </p:nvSpPr>
         <p:spPr/>
@@ -758,7 +1013,7 @@
           <a:p>
             <a:fld id="{B68D2766-C49B-4C1A-9FEE-6F146754B02B}" type="slidenum">
               <a:rPr lang="en-US" smtClean="0"/>
-              <a:t>8</a:t>
+              <a:t>5</a:t>
             </a:fld>
             <a:endParaRPr lang="en-US"/>
           </a:p>
@@ -767,7 +1022,7 @@
     </p:spTree>
     <p:extLst>
       <p:ext uri="{BB962C8B-B14F-4D97-AF65-F5344CB8AC3E}">
-        <p14:creationId xmlns:p14="http://schemas.microsoft.com/office/powerpoint/2010/main" val="1306669430"/>
+        <p14:creationId xmlns:p14="http://schemas.microsoft.com/office/powerpoint/2010/main" val="3997807056"/>
       </p:ext>
     </p:extLst>
   </p:cSld>
@@ -821,18 +1076,63 @@
           <a:bodyPr/>
           <a:lstStyle/>
           <a:p>
-            <a:r>
-              <a:rPr lang="en-US"/>
-              <a:t>© Copyright </a:t>
-            </a:r>
-            <a:r>
-              <a:rPr lang="en-US" b="1"/>
-              <a:t>PresentationGO.com</a:t>
-            </a:r>
-            <a:r>
-              <a:rPr lang="en-US"/>
-              <a:t> – The free PowerPoint template library</a:t>
-            </a:r>
+            <a:pPr marL="342900" indent="-342900">
+              <a:buFont typeface="Arial" panose="020B0604020202020204" pitchFamily="34" charset="0"/>
+              <a:buChar char="•"/>
+            </a:pPr>
+            <a:r>
+              <a:rPr lang="en-US" sz="1200" dirty="0">
+                <a:solidFill>
+                  <a:schemeClr val="tx1">
+                    <a:lumMod val="65000"/>
+                    <a:lumOff val="35000"/>
+                  </a:schemeClr>
+                </a:solidFill>
+              </a:rPr>
+              <a:t>The recall score of the random forest model with grid search for the new tweets also show the same problem.</a:t>
+            </a:r>
+          </a:p>
+          <a:p>
+            <a:pPr marL="342900" indent="-342900">
+              <a:buFont typeface="Arial" panose="020B0604020202020204" pitchFamily="34" charset="0"/>
+              <a:buChar char="•"/>
+            </a:pPr>
+            <a:r>
+              <a:rPr lang="en-US" sz="1200" dirty="0">
+                <a:solidFill>
+                  <a:schemeClr val="tx1">
+                    <a:lumMod val="65000"/>
+                    <a:lumOff val="35000"/>
+                  </a:schemeClr>
+                </a:solidFill>
+              </a:rPr>
+              <a:t>However, I would still recommend this model (random forest with </a:t>
+            </a:r>
+            <a:r>
+              <a:rPr lang="en-US" sz="1200" dirty="0" err="1">
+                <a:solidFill>
+                  <a:schemeClr val="tx1">
+                    <a:lumMod val="65000"/>
+                    <a:lumOff val="35000"/>
+                  </a:schemeClr>
+                </a:solidFill>
+              </a:rPr>
+              <a:t>gridsearch</a:t>
+            </a:r>
+            <a:r>
+              <a:rPr lang="en-US" sz="1200" dirty="0">
+                <a:solidFill>
+                  <a:schemeClr val="tx1">
+                    <a:lumMod val="65000"/>
+                    <a:lumOff val="35000"/>
+                  </a:schemeClr>
+                </a:solidFill>
+              </a:rPr>
+              <a:t>) above others because it was able to maintain a relatively high recalls core for the positive and neutral tweets while improving the recall score for the negative tweets.</a:t>
+            </a:r>
+          </a:p>
+          <a:p>
+            <a:endParaRPr lang="en-US" dirty="0"/>
           </a:p>
         </p:txBody>
       </p:sp>
@@ -843,7 +1143,7 @@
             <a:spLocks noGrp="1"/>
           </p:cNvSpPr>
           <p:nvPr>
-            <p:ph type="sldNum" sz="quarter" idx="10"/>
+            <p:ph type="sldNum" sz="quarter" idx="5"/>
           </p:nvPr>
         </p:nvSpPr>
         <p:spPr/>
@@ -853,7 +1153,7 @@
           <a:p>
             <a:fld id="{B68D2766-C49B-4C1A-9FEE-6F146754B02B}" type="slidenum">
               <a:rPr lang="en-US" smtClean="0"/>
-              <a:t>9</a:t>
+              <a:t>6</a:t>
             </a:fld>
             <a:endParaRPr lang="en-US"/>
           </a:p>
@@ -862,7 +1162,7 @@
     </p:spTree>
     <p:extLst>
       <p:ext uri="{BB962C8B-B14F-4D97-AF65-F5344CB8AC3E}">
-        <p14:creationId xmlns:p14="http://schemas.microsoft.com/office/powerpoint/2010/main" val="3607588145"/>
+        <p14:creationId xmlns:p14="http://schemas.microsoft.com/office/powerpoint/2010/main" val="69945339"/>
       </p:ext>
     </p:extLst>
   </p:cSld>
@@ -948,7 +1248,7 @@
           <a:p>
             <a:fld id="{B68D2766-C49B-4C1A-9FEE-6F146754B02B}" type="slidenum">
               <a:rPr lang="en-US" smtClean="0"/>
-              <a:t>10</a:t>
+              <a:t>7</a:t>
             </a:fld>
             <a:endParaRPr lang="en-US"/>
           </a:p>
@@ -957,7 +1257,7 @@
     </p:spTree>
     <p:extLst>
       <p:ext uri="{BB962C8B-B14F-4D97-AF65-F5344CB8AC3E}">
-        <p14:creationId xmlns:p14="http://schemas.microsoft.com/office/powerpoint/2010/main" val="3944929242"/>
+        <p14:creationId xmlns:p14="http://schemas.microsoft.com/office/powerpoint/2010/main" val="1306669430"/>
       </p:ext>
     </p:extLst>
   </p:cSld>
@@ -1043,7 +1343,7 @@
           <a:p>
             <a:fld id="{B68D2766-C49B-4C1A-9FEE-6F146754B02B}" type="slidenum">
               <a:rPr lang="en-US" smtClean="0"/>
-              <a:t>11</a:t>
+              <a:t>8</a:t>
             </a:fld>
             <a:endParaRPr lang="en-US"/>
           </a:p>
@@ -1138,7 +1438,7 @@
           <a:p>
             <a:fld id="{B68D2766-C49B-4C1A-9FEE-6F146754B02B}" type="slidenum">
               <a:rPr lang="en-US" smtClean="0"/>
-              <a:t>12</a:t>
+              <a:t>9</a:t>
             </a:fld>
             <a:endParaRPr lang="en-US"/>
           </a:p>
@@ -1147,7 +1447,7 @@
     </p:spTree>
     <p:extLst>
       <p:ext uri="{BB962C8B-B14F-4D97-AF65-F5344CB8AC3E}">
-        <p14:creationId xmlns:p14="http://schemas.microsoft.com/office/powerpoint/2010/main" val="1288995506"/>
+        <p14:creationId xmlns:p14="http://schemas.microsoft.com/office/powerpoint/2010/main" val="3607588145"/>
       </p:ext>
     </p:extLst>
   </p:cSld>
@@ -1233,7 +1533,7 @@
           <a:p>
             <a:fld id="{B68D2766-C49B-4C1A-9FEE-6F146754B02B}" type="slidenum">
               <a:rPr lang="en-US" smtClean="0"/>
-              <a:t>13</a:t>
+              <a:t>10</a:t>
             </a:fld>
             <a:endParaRPr lang="en-US"/>
           </a:p>
@@ -1242,7 +1542,7 @@
     </p:spTree>
     <p:extLst>
       <p:ext uri="{BB962C8B-B14F-4D97-AF65-F5344CB8AC3E}">
-        <p14:creationId xmlns:p14="http://schemas.microsoft.com/office/powerpoint/2010/main" val="326981967"/>
+        <p14:creationId xmlns:p14="http://schemas.microsoft.com/office/powerpoint/2010/main" val="1288995506"/>
       </p:ext>
     </p:extLst>
   </p:cSld>
@@ -1328,7 +1628,7 @@
           <a:p>
             <a:fld id="{B68D2766-C49B-4C1A-9FEE-6F146754B02B}" type="slidenum">
               <a:rPr lang="en-US" smtClean="0"/>
-              <a:t>14</a:t>
+              <a:t>11</a:t>
             </a:fld>
             <a:endParaRPr lang="en-US"/>
           </a:p>
@@ -1337,7 +1637,7 @@
     </p:spTree>
     <p:extLst>
       <p:ext uri="{BB962C8B-B14F-4D97-AF65-F5344CB8AC3E}">
-        <p14:creationId xmlns:p14="http://schemas.microsoft.com/office/powerpoint/2010/main" val="1056149350"/>
+        <p14:creationId xmlns:p14="http://schemas.microsoft.com/office/powerpoint/2010/main" val="3944929242"/>
       </p:ext>
     </p:extLst>
   </p:cSld>
@@ -3715,7 +4015,7 @@
           <a:p>
             <a:fld id="{997E942A-26CB-4FC8-A61F-ED7BAF06B75B}" type="datetimeFigureOut">
               <a:rPr lang="en-US" smtClean="0"/>
-              <a:t>7/28/2021</a:t>
+              <a:t>7/29/2021</a:t>
             </a:fld>
             <a:endParaRPr lang="en-US"/>
           </a:p>
@@ -4475,6 +4775,218 @@
           <a:chExt cx="0" cy="0"/>
         </a:xfrm>
       </p:grpSpPr>
+      <p:sp>
+        <p:nvSpPr>
+          <p:cNvPr id="2" name="Title 1">
+            <a:extLst>
+              <a:ext uri="{FF2B5EF4-FFF2-40B4-BE49-F238E27FC236}">
+                <a16:creationId xmlns:a16="http://schemas.microsoft.com/office/drawing/2014/main" id="{33101823-B7E8-4F9B-B03F-29FC1BF88595}"/>
+              </a:ext>
+            </a:extLst>
+          </p:cNvPr>
+          <p:cNvSpPr>
+            <a:spLocks noGrp="1"/>
+          </p:cNvSpPr>
+          <p:nvPr>
+            <p:ph type="title"/>
+          </p:nvPr>
+        </p:nvSpPr>
+        <p:spPr/>
+        <p:txBody>
+          <a:bodyPr>
+            <a:normAutofit/>
+          </a:bodyPr>
+          <a:lstStyle/>
+          <a:p>
+            <a:r>
+              <a:rPr lang="en-US" dirty="0"/>
+              <a:t>Word Cloud Comparison: Google</a:t>
+            </a:r>
+          </a:p>
+        </p:txBody>
+      </p:sp>
+      <p:pic>
+        <p:nvPicPr>
+          <p:cNvPr id="4" name="Picture 3">
+            <a:extLst>
+              <a:ext uri="{FF2B5EF4-FFF2-40B4-BE49-F238E27FC236}">
+                <a16:creationId xmlns:a16="http://schemas.microsoft.com/office/drawing/2014/main" id="{0D942AE8-A76D-4F0F-8500-E3EBE80A3E1B}"/>
+              </a:ext>
+            </a:extLst>
+          </p:cNvPr>
+          <p:cNvPicPr>
+            <a:picLocks noChangeAspect="1"/>
+          </p:cNvPicPr>
+          <p:nvPr/>
+        </p:nvPicPr>
+        <p:blipFill>
+          <a:blip r:embed="rId3">
+            <a:extLst>
+              <a:ext uri="{28A0092B-C50C-407E-A947-70E740481C1C}">
+                <a14:useLocalDpi xmlns:a14="http://schemas.microsoft.com/office/drawing/2010/main" val="0"/>
+              </a:ext>
+            </a:extLst>
+          </a:blip>
+          <a:srcRect/>
+          <a:stretch/>
+        </p:blipFill>
+        <p:spPr>
+          <a:xfrm>
+            <a:off x="316285" y="2276355"/>
+            <a:ext cx="5557626" cy="3420077"/>
+          </a:xfrm>
+          <a:prstGeom prst="rect">
+            <a:avLst/>
+          </a:prstGeom>
+        </p:spPr>
+      </p:pic>
+      <p:pic>
+        <p:nvPicPr>
+          <p:cNvPr id="6" name="Picture 5">
+            <a:extLst>
+              <a:ext uri="{FF2B5EF4-FFF2-40B4-BE49-F238E27FC236}">
+                <a16:creationId xmlns:a16="http://schemas.microsoft.com/office/drawing/2014/main" id="{3DA90E20-93E6-4C7E-A307-B0EA3EBB1432}"/>
+              </a:ext>
+            </a:extLst>
+          </p:cNvPr>
+          <p:cNvPicPr>
+            <a:picLocks noChangeAspect="1"/>
+          </p:cNvPicPr>
+          <p:nvPr/>
+        </p:nvPicPr>
+        <p:blipFill>
+          <a:blip r:embed="rId4">
+            <a:extLst>
+              <a:ext uri="{28A0092B-C50C-407E-A947-70E740481C1C}">
+                <a14:useLocalDpi xmlns:a14="http://schemas.microsoft.com/office/drawing/2010/main" val="0"/>
+              </a:ext>
+            </a:extLst>
+          </a:blip>
+          <a:srcRect/>
+          <a:stretch/>
+        </p:blipFill>
+        <p:spPr>
+          <a:xfrm>
+            <a:off x="6412374" y="2276354"/>
+            <a:ext cx="5557626" cy="3420078"/>
+          </a:xfrm>
+          <a:prstGeom prst="rect">
+            <a:avLst/>
+          </a:prstGeom>
+        </p:spPr>
+      </p:pic>
+      <p:sp>
+        <p:nvSpPr>
+          <p:cNvPr id="10" name="TextBox 9">
+            <a:extLst>
+              <a:ext uri="{FF2B5EF4-FFF2-40B4-BE49-F238E27FC236}">
+                <a16:creationId xmlns:a16="http://schemas.microsoft.com/office/drawing/2014/main" id="{FAA0FBC2-A78B-427A-B244-5AEAF817997E}"/>
+              </a:ext>
+            </a:extLst>
+          </p:cNvPr>
+          <p:cNvSpPr txBox="1"/>
+          <p:nvPr/>
+        </p:nvSpPr>
+        <p:spPr>
+          <a:xfrm>
+            <a:off x="1320616" y="1741714"/>
+            <a:ext cx="3446417" cy="369332"/>
+          </a:xfrm>
+          <a:prstGeom prst="rect">
+            <a:avLst/>
+          </a:prstGeom>
+          <a:noFill/>
+        </p:spPr>
+        <p:txBody>
+          <a:bodyPr wrap="square" rtlCol="0">
+            <a:spAutoFit/>
+          </a:bodyPr>
+          <a:lstStyle/>
+          <a:p>
+            <a:pPr algn="ctr"/>
+            <a:r>
+              <a:rPr lang="en-US" dirty="0"/>
+              <a:t>Old</a:t>
+            </a:r>
+          </a:p>
+        </p:txBody>
+      </p:sp>
+      <p:sp>
+        <p:nvSpPr>
+          <p:cNvPr id="11" name="TextBox 10">
+            <a:extLst>
+              <a:ext uri="{FF2B5EF4-FFF2-40B4-BE49-F238E27FC236}">
+                <a16:creationId xmlns:a16="http://schemas.microsoft.com/office/drawing/2014/main" id="{0D545C37-A0EF-45E3-9977-C94B7D4E34ED}"/>
+              </a:ext>
+            </a:extLst>
+          </p:cNvPr>
+          <p:cNvSpPr txBox="1"/>
+          <p:nvPr/>
+        </p:nvSpPr>
+        <p:spPr>
+          <a:xfrm>
+            <a:off x="7183980" y="1741714"/>
+            <a:ext cx="3446417" cy="369332"/>
+          </a:xfrm>
+          <a:prstGeom prst="rect">
+            <a:avLst/>
+          </a:prstGeom>
+          <a:noFill/>
+        </p:spPr>
+        <p:txBody>
+          <a:bodyPr wrap="square" rtlCol="0">
+            <a:spAutoFit/>
+          </a:bodyPr>
+          <a:lstStyle/>
+          <a:p>
+            <a:pPr algn="ctr"/>
+            <a:r>
+              <a:rPr lang="en-US" dirty="0"/>
+              <a:t>New</a:t>
+            </a:r>
+          </a:p>
+        </p:txBody>
+      </p:sp>
+    </p:spTree>
+    <p:extLst>
+      <p:ext uri="{BB962C8B-B14F-4D97-AF65-F5344CB8AC3E}">
+        <p14:creationId xmlns:p14="http://schemas.microsoft.com/office/powerpoint/2010/main" val="3513480580"/>
+      </p:ext>
+    </p:extLst>
+  </p:cSld>
+  <p:clrMapOvr>
+    <a:masterClrMapping/>
+  </p:clrMapOvr>
+</p:sld>
+</file>
+
+<file path=ppt/slides/slide11.xml><?xml version="1.0" encoding="utf-8"?>
+<p:sld xmlns:a="http://schemas.openxmlformats.org/drawingml/2006/main" xmlns:r="http://schemas.openxmlformats.org/officeDocument/2006/relationships" xmlns:p="http://schemas.openxmlformats.org/presentationml/2006/main">
+  <p:cSld>
+    <p:bg>
+      <p:bgPr>
+        <a:solidFill>
+          <a:schemeClr val="bg1">
+            <a:lumMod val="95000"/>
+          </a:schemeClr>
+        </a:solidFill>
+        <a:effectLst/>
+      </p:bgPr>
+    </p:bg>
+    <p:spTree>
+      <p:nvGrpSpPr>
+        <p:cNvPr id="1" name=""/>
+        <p:cNvGrpSpPr/>
+        <p:nvPr/>
+      </p:nvGrpSpPr>
+      <p:grpSpPr>
+        <a:xfrm>
+          <a:off x="0" y="0"/>
+          <a:ext cx="0" cy="0"/>
+          <a:chOff x="0" y="0"/>
+          <a:chExt cx="0" cy="0"/>
+        </a:xfrm>
+      </p:grpSpPr>
       <p:sp useBgFill="1">
         <p:nvSpPr>
           <p:cNvPr id="19" name="Rectangle 18">
@@ -4919,8 +5431,8 @@
         </p:blipFill>
         <p:spPr>
           <a:xfrm>
-            <a:off x="6139644" y="3118120"/>
-            <a:ext cx="5419344" cy="3483864"/>
+            <a:off x="6139644" y="2925356"/>
+            <a:ext cx="5419344" cy="3676628"/>
           </a:xfrm>
           <a:prstGeom prst="rect">
             <a:avLst/>
@@ -4954,304 +5466,18 @@
         </p:blipFill>
         <p:spPr>
           <a:xfrm>
-            <a:off x="345149" y="3118120"/>
-            <a:ext cx="5419344" cy="3483864"/>
+            <a:off x="345149" y="2925356"/>
+            <a:ext cx="5419344" cy="3676628"/>
           </a:xfrm>
           <a:prstGeom prst="rect">
             <a:avLst/>
           </a:prstGeom>
         </p:spPr>
       </p:pic>
-      <p:sp>
-        <p:nvSpPr>
-          <p:cNvPr id="8" name="TextBox 7">
-            <a:extLst>
-              <a:ext uri="{FF2B5EF4-FFF2-40B4-BE49-F238E27FC236}">
-                <a16:creationId xmlns:a16="http://schemas.microsoft.com/office/drawing/2014/main" id="{6D3A73C2-C20F-47FA-91AF-509AE5877D1C}"/>
-              </a:ext>
-            </a:extLst>
-          </p:cNvPr>
-          <p:cNvSpPr txBox="1"/>
-          <p:nvPr/>
-        </p:nvSpPr>
-        <p:spPr>
-          <a:xfrm>
-            <a:off x="1262743" y="2656114"/>
-            <a:ext cx="3446417" cy="369332"/>
-          </a:xfrm>
-          <a:prstGeom prst="rect">
-            <a:avLst/>
-          </a:prstGeom>
-          <a:noFill/>
-        </p:spPr>
-        <p:txBody>
-          <a:bodyPr wrap="square" rtlCol="0">
-            <a:spAutoFit/>
-          </a:bodyPr>
-          <a:lstStyle/>
-          <a:p>
-            <a:pPr algn="ctr"/>
-            <a:r>
-              <a:rPr lang="en-US" dirty="0"/>
-              <a:t>Old</a:t>
-            </a:r>
-          </a:p>
-        </p:txBody>
-      </p:sp>
-      <p:sp>
-        <p:nvSpPr>
-          <p:cNvPr id="20" name="TextBox 19">
-            <a:extLst>
-              <a:ext uri="{FF2B5EF4-FFF2-40B4-BE49-F238E27FC236}">
-                <a16:creationId xmlns:a16="http://schemas.microsoft.com/office/drawing/2014/main" id="{D49533F6-31C4-4F00-A756-297A6B1B70A8}"/>
-              </a:ext>
-            </a:extLst>
-          </p:cNvPr>
-          <p:cNvSpPr txBox="1"/>
-          <p:nvPr/>
-        </p:nvSpPr>
-        <p:spPr>
-          <a:xfrm>
-            <a:off x="7126107" y="2656114"/>
-            <a:ext cx="3446417" cy="369332"/>
-          </a:xfrm>
-          <a:prstGeom prst="rect">
-            <a:avLst/>
-          </a:prstGeom>
-          <a:noFill/>
-        </p:spPr>
-        <p:txBody>
-          <a:bodyPr wrap="square" rtlCol="0">
-            <a:spAutoFit/>
-          </a:bodyPr>
-          <a:lstStyle/>
-          <a:p>
-            <a:pPr algn="ctr"/>
-            <a:r>
-              <a:rPr lang="en-US" dirty="0"/>
-              <a:t>New</a:t>
-            </a:r>
-          </a:p>
-        </p:txBody>
-      </p:sp>
     </p:spTree>
     <p:extLst>
       <p:ext uri="{BB962C8B-B14F-4D97-AF65-F5344CB8AC3E}">
         <p14:creationId xmlns:p14="http://schemas.microsoft.com/office/powerpoint/2010/main" val="1154550159"/>
-      </p:ext>
-    </p:extLst>
-  </p:cSld>
-  <p:clrMapOvr>
-    <a:masterClrMapping/>
-  </p:clrMapOvr>
-</p:sld>
-</file>
-
-<file path=ppt/slides/slide11.xml><?xml version="1.0" encoding="utf-8"?>
-<p:sld xmlns:a="http://schemas.openxmlformats.org/drawingml/2006/main" xmlns:r="http://schemas.openxmlformats.org/officeDocument/2006/relationships" xmlns:p="http://schemas.openxmlformats.org/presentationml/2006/main">
-  <p:cSld>
-    <p:bg>
-      <p:bgPr>
-        <a:solidFill>
-          <a:schemeClr val="bg1">
-            <a:lumMod val="95000"/>
-          </a:schemeClr>
-        </a:solidFill>
-        <a:effectLst/>
-      </p:bgPr>
-    </p:bg>
-    <p:spTree>
-      <p:nvGrpSpPr>
-        <p:cNvPr id="1" name=""/>
-        <p:cNvGrpSpPr/>
-        <p:nvPr/>
-      </p:nvGrpSpPr>
-      <p:grpSpPr>
-        <a:xfrm>
-          <a:off x="0" y="0"/>
-          <a:ext cx="0" cy="0"/>
-          <a:chOff x="0" y="0"/>
-          <a:chExt cx="0" cy="0"/>
-        </a:xfrm>
-      </p:grpSpPr>
-      <p:sp>
-        <p:nvSpPr>
-          <p:cNvPr id="2" name="Title 1">
-            <a:extLst>
-              <a:ext uri="{FF2B5EF4-FFF2-40B4-BE49-F238E27FC236}">
-                <a16:creationId xmlns:a16="http://schemas.microsoft.com/office/drawing/2014/main" id="{33101823-B7E8-4F9B-B03F-29FC1BF88595}"/>
-              </a:ext>
-            </a:extLst>
-          </p:cNvPr>
-          <p:cNvSpPr>
-            <a:spLocks noGrp="1"/>
-          </p:cNvSpPr>
-          <p:nvPr>
-            <p:ph type="title"/>
-          </p:nvPr>
-        </p:nvSpPr>
-        <p:spPr/>
-        <p:txBody>
-          <a:bodyPr>
-            <a:normAutofit/>
-          </a:bodyPr>
-          <a:lstStyle/>
-          <a:p>
-            <a:r>
-              <a:rPr lang="en-US" dirty="0"/>
-              <a:t>Word Cloud Comparison Apple: Negative</a:t>
-            </a:r>
-          </a:p>
-        </p:txBody>
-      </p:sp>
-      <p:pic>
-        <p:nvPicPr>
-          <p:cNvPr id="4" name="Picture 3" descr="A picture containing text, newspaper&#10;&#10;Description automatically generated">
-            <a:extLst>
-              <a:ext uri="{FF2B5EF4-FFF2-40B4-BE49-F238E27FC236}">
-                <a16:creationId xmlns:a16="http://schemas.microsoft.com/office/drawing/2014/main" id="{0D942AE8-A76D-4F0F-8500-E3EBE80A3E1B}"/>
-              </a:ext>
-            </a:extLst>
-          </p:cNvPr>
-          <p:cNvPicPr>
-            <a:picLocks noChangeAspect="1"/>
-          </p:cNvPicPr>
-          <p:nvPr/>
-        </p:nvPicPr>
-        <p:blipFill>
-          <a:blip r:embed="rId3">
-            <a:extLst>
-              <a:ext uri="{28A0092B-C50C-407E-A947-70E740481C1C}">
-                <a14:useLocalDpi xmlns:a14="http://schemas.microsoft.com/office/drawing/2010/main" val="0"/>
-              </a:ext>
-            </a:extLst>
-          </a:blip>
-          <a:stretch>
-            <a:fillRect/>
-          </a:stretch>
-        </p:blipFill>
-        <p:spPr>
-          <a:xfrm>
-            <a:off x="316285" y="2276355"/>
-            <a:ext cx="5557627" cy="3420078"/>
-          </a:xfrm>
-          <a:prstGeom prst="rect">
-            <a:avLst/>
-          </a:prstGeom>
-        </p:spPr>
-      </p:pic>
-      <p:pic>
-        <p:nvPicPr>
-          <p:cNvPr id="6" name="Picture 5" descr="Text&#10;&#10;Description automatically generated">
-            <a:extLst>
-              <a:ext uri="{FF2B5EF4-FFF2-40B4-BE49-F238E27FC236}">
-                <a16:creationId xmlns:a16="http://schemas.microsoft.com/office/drawing/2014/main" id="{3DA90E20-93E6-4C7E-A307-B0EA3EBB1432}"/>
-              </a:ext>
-            </a:extLst>
-          </p:cNvPr>
-          <p:cNvPicPr>
-            <a:picLocks noChangeAspect="1"/>
-          </p:cNvPicPr>
-          <p:nvPr/>
-        </p:nvPicPr>
-        <p:blipFill>
-          <a:blip r:embed="rId4">
-            <a:extLst>
-              <a:ext uri="{28A0092B-C50C-407E-A947-70E740481C1C}">
-                <a14:useLocalDpi xmlns:a14="http://schemas.microsoft.com/office/drawing/2010/main" val="0"/>
-              </a:ext>
-            </a:extLst>
-          </a:blip>
-          <a:stretch>
-            <a:fillRect/>
-          </a:stretch>
-        </p:blipFill>
-        <p:spPr>
-          <a:xfrm>
-            <a:off x="6412374" y="2276354"/>
-            <a:ext cx="5557627" cy="3420079"/>
-          </a:xfrm>
-          <a:prstGeom prst="rect">
-            <a:avLst/>
-          </a:prstGeom>
-        </p:spPr>
-      </p:pic>
-      <p:sp>
-        <p:nvSpPr>
-          <p:cNvPr id="10" name="TextBox 9">
-            <a:extLst>
-              <a:ext uri="{FF2B5EF4-FFF2-40B4-BE49-F238E27FC236}">
-                <a16:creationId xmlns:a16="http://schemas.microsoft.com/office/drawing/2014/main" id="{FAA0FBC2-A78B-427A-B244-5AEAF817997E}"/>
-              </a:ext>
-            </a:extLst>
-          </p:cNvPr>
-          <p:cNvSpPr txBox="1"/>
-          <p:nvPr/>
-        </p:nvSpPr>
-        <p:spPr>
-          <a:xfrm>
-            <a:off x="1320616" y="1741714"/>
-            <a:ext cx="3446417" cy="369332"/>
-          </a:xfrm>
-          <a:prstGeom prst="rect">
-            <a:avLst/>
-          </a:prstGeom>
-          <a:noFill/>
-        </p:spPr>
-        <p:txBody>
-          <a:bodyPr wrap="square" rtlCol="0">
-            <a:spAutoFit/>
-          </a:bodyPr>
-          <a:lstStyle/>
-          <a:p>
-            <a:pPr algn="ctr"/>
-            <a:r>
-              <a:rPr lang="en-US" dirty="0"/>
-              <a:t>Old</a:t>
-            </a:r>
-          </a:p>
-        </p:txBody>
-      </p:sp>
-      <p:sp>
-        <p:nvSpPr>
-          <p:cNvPr id="11" name="TextBox 10">
-            <a:extLst>
-              <a:ext uri="{FF2B5EF4-FFF2-40B4-BE49-F238E27FC236}">
-                <a16:creationId xmlns:a16="http://schemas.microsoft.com/office/drawing/2014/main" id="{0D545C37-A0EF-45E3-9977-C94B7D4E34ED}"/>
-              </a:ext>
-            </a:extLst>
-          </p:cNvPr>
-          <p:cNvSpPr txBox="1"/>
-          <p:nvPr/>
-        </p:nvSpPr>
-        <p:spPr>
-          <a:xfrm>
-            <a:off x="7183980" y="1741714"/>
-            <a:ext cx="3446417" cy="369332"/>
-          </a:xfrm>
-          <a:prstGeom prst="rect">
-            <a:avLst/>
-          </a:prstGeom>
-          <a:noFill/>
-        </p:spPr>
-        <p:txBody>
-          <a:bodyPr wrap="square" rtlCol="0">
-            <a:spAutoFit/>
-          </a:bodyPr>
-          <a:lstStyle/>
-          <a:p>
-            <a:pPr algn="ctr"/>
-            <a:r>
-              <a:rPr lang="en-US" dirty="0"/>
-              <a:t>New</a:t>
-            </a:r>
-          </a:p>
-        </p:txBody>
-      </p:sp>
-    </p:spTree>
-    <p:extLst>
-      <p:ext uri="{BB962C8B-B14F-4D97-AF65-F5344CB8AC3E}">
-        <p14:creationId xmlns:p14="http://schemas.microsoft.com/office/powerpoint/2010/main" val="756654474"/>
       </p:ext>
     </p:extLst>
   </p:cSld>
@@ -5313,7 +5539,7 @@
           <a:p>
             <a:r>
               <a:rPr lang="en-US" dirty="0"/>
-              <a:t>Word Cloud Comparison Google: Neutral</a:t>
+              <a:t>Word Cloud Comparison: Android</a:t>
             </a:r>
           </a:p>
         </p:txBody>
@@ -5346,7 +5572,7 @@
         <p:spPr>
           <a:xfrm>
             <a:off x="316285" y="2276355"/>
-            <a:ext cx="5557626" cy="3420078"/>
+            <a:ext cx="5557625" cy="3420077"/>
           </a:xfrm>
           <a:prstGeom prst="rect">
             <a:avLst/>
@@ -5381,7 +5607,7 @@
         <p:spPr>
           <a:xfrm>
             <a:off x="6412374" y="2276354"/>
-            <a:ext cx="5557627" cy="3420078"/>
+            <a:ext cx="5557626" cy="3420077"/>
           </a:xfrm>
           <a:prstGeom prst="rect">
             <a:avLst/>
@@ -5463,7 +5689,7 @@
     </p:spTree>
     <p:extLst>
       <p:ext uri="{BB962C8B-B14F-4D97-AF65-F5344CB8AC3E}">
-        <p14:creationId xmlns:p14="http://schemas.microsoft.com/office/powerpoint/2010/main" val="3513480580"/>
+        <p14:creationId xmlns:p14="http://schemas.microsoft.com/office/powerpoint/2010/main" val="2320827095"/>
       </p:ext>
     </p:extLst>
   </p:cSld>
@@ -5474,218 +5700,6 @@
 </file>
 
 <file path=ppt/slides/slide13.xml><?xml version="1.0" encoding="utf-8"?>
-<p:sld xmlns:a="http://schemas.openxmlformats.org/drawingml/2006/main" xmlns:r="http://schemas.openxmlformats.org/officeDocument/2006/relationships" xmlns:p="http://schemas.openxmlformats.org/presentationml/2006/main">
-  <p:cSld>
-    <p:bg>
-      <p:bgPr>
-        <a:solidFill>
-          <a:schemeClr val="bg1">
-            <a:lumMod val="95000"/>
-          </a:schemeClr>
-        </a:solidFill>
-        <a:effectLst/>
-      </p:bgPr>
-    </p:bg>
-    <p:spTree>
-      <p:nvGrpSpPr>
-        <p:cNvPr id="1" name=""/>
-        <p:cNvGrpSpPr/>
-        <p:nvPr/>
-      </p:nvGrpSpPr>
-      <p:grpSpPr>
-        <a:xfrm>
-          <a:off x="0" y="0"/>
-          <a:ext cx="0" cy="0"/>
-          <a:chOff x="0" y="0"/>
-          <a:chExt cx="0" cy="0"/>
-        </a:xfrm>
-      </p:grpSpPr>
-      <p:sp>
-        <p:nvSpPr>
-          <p:cNvPr id="2" name="Title 1">
-            <a:extLst>
-              <a:ext uri="{FF2B5EF4-FFF2-40B4-BE49-F238E27FC236}">
-                <a16:creationId xmlns:a16="http://schemas.microsoft.com/office/drawing/2014/main" id="{33101823-B7E8-4F9B-B03F-29FC1BF88595}"/>
-              </a:ext>
-            </a:extLst>
-          </p:cNvPr>
-          <p:cNvSpPr>
-            <a:spLocks noGrp="1"/>
-          </p:cNvSpPr>
-          <p:nvPr>
-            <p:ph type="title"/>
-          </p:nvPr>
-        </p:nvSpPr>
-        <p:spPr/>
-        <p:txBody>
-          <a:bodyPr>
-            <a:normAutofit/>
-          </a:bodyPr>
-          <a:lstStyle/>
-          <a:p>
-            <a:r>
-              <a:rPr lang="en-US" dirty="0"/>
-              <a:t>Word Cloud Comparison Android: Positive</a:t>
-            </a:r>
-          </a:p>
-        </p:txBody>
-      </p:sp>
-      <p:pic>
-        <p:nvPicPr>
-          <p:cNvPr id="4" name="Picture 3">
-            <a:extLst>
-              <a:ext uri="{FF2B5EF4-FFF2-40B4-BE49-F238E27FC236}">
-                <a16:creationId xmlns:a16="http://schemas.microsoft.com/office/drawing/2014/main" id="{0D942AE8-A76D-4F0F-8500-E3EBE80A3E1B}"/>
-              </a:ext>
-            </a:extLst>
-          </p:cNvPr>
-          <p:cNvPicPr>
-            <a:picLocks noChangeAspect="1"/>
-          </p:cNvPicPr>
-          <p:nvPr/>
-        </p:nvPicPr>
-        <p:blipFill>
-          <a:blip r:embed="rId3">
-            <a:extLst>
-              <a:ext uri="{28A0092B-C50C-407E-A947-70E740481C1C}">
-                <a14:useLocalDpi xmlns:a14="http://schemas.microsoft.com/office/drawing/2010/main" val="0"/>
-              </a:ext>
-            </a:extLst>
-          </a:blip>
-          <a:srcRect/>
-          <a:stretch/>
-        </p:blipFill>
-        <p:spPr>
-          <a:xfrm>
-            <a:off x="316285" y="2276355"/>
-            <a:ext cx="5557626" cy="3420077"/>
-          </a:xfrm>
-          <a:prstGeom prst="rect">
-            <a:avLst/>
-          </a:prstGeom>
-        </p:spPr>
-      </p:pic>
-      <p:pic>
-        <p:nvPicPr>
-          <p:cNvPr id="6" name="Picture 5">
-            <a:extLst>
-              <a:ext uri="{FF2B5EF4-FFF2-40B4-BE49-F238E27FC236}">
-                <a16:creationId xmlns:a16="http://schemas.microsoft.com/office/drawing/2014/main" id="{3DA90E20-93E6-4C7E-A307-B0EA3EBB1432}"/>
-              </a:ext>
-            </a:extLst>
-          </p:cNvPr>
-          <p:cNvPicPr>
-            <a:picLocks noChangeAspect="1"/>
-          </p:cNvPicPr>
-          <p:nvPr/>
-        </p:nvPicPr>
-        <p:blipFill>
-          <a:blip r:embed="rId4">
-            <a:extLst>
-              <a:ext uri="{28A0092B-C50C-407E-A947-70E740481C1C}">
-                <a14:useLocalDpi xmlns:a14="http://schemas.microsoft.com/office/drawing/2010/main" val="0"/>
-              </a:ext>
-            </a:extLst>
-          </a:blip>
-          <a:srcRect/>
-          <a:stretch/>
-        </p:blipFill>
-        <p:spPr>
-          <a:xfrm>
-            <a:off x="6412374" y="2276354"/>
-            <a:ext cx="5557626" cy="3420078"/>
-          </a:xfrm>
-          <a:prstGeom prst="rect">
-            <a:avLst/>
-          </a:prstGeom>
-        </p:spPr>
-      </p:pic>
-      <p:sp>
-        <p:nvSpPr>
-          <p:cNvPr id="10" name="TextBox 9">
-            <a:extLst>
-              <a:ext uri="{FF2B5EF4-FFF2-40B4-BE49-F238E27FC236}">
-                <a16:creationId xmlns:a16="http://schemas.microsoft.com/office/drawing/2014/main" id="{FAA0FBC2-A78B-427A-B244-5AEAF817997E}"/>
-              </a:ext>
-            </a:extLst>
-          </p:cNvPr>
-          <p:cNvSpPr txBox="1"/>
-          <p:nvPr/>
-        </p:nvSpPr>
-        <p:spPr>
-          <a:xfrm>
-            <a:off x="1320616" y="1741714"/>
-            <a:ext cx="3446417" cy="369332"/>
-          </a:xfrm>
-          <a:prstGeom prst="rect">
-            <a:avLst/>
-          </a:prstGeom>
-          <a:noFill/>
-        </p:spPr>
-        <p:txBody>
-          <a:bodyPr wrap="square" rtlCol="0">
-            <a:spAutoFit/>
-          </a:bodyPr>
-          <a:lstStyle/>
-          <a:p>
-            <a:pPr algn="ctr"/>
-            <a:r>
-              <a:rPr lang="en-US" dirty="0"/>
-              <a:t>Old</a:t>
-            </a:r>
-          </a:p>
-        </p:txBody>
-      </p:sp>
-      <p:sp>
-        <p:nvSpPr>
-          <p:cNvPr id="11" name="TextBox 10">
-            <a:extLst>
-              <a:ext uri="{FF2B5EF4-FFF2-40B4-BE49-F238E27FC236}">
-                <a16:creationId xmlns:a16="http://schemas.microsoft.com/office/drawing/2014/main" id="{0D545C37-A0EF-45E3-9977-C94B7D4E34ED}"/>
-              </a:ext>
-            </a:extLst>
-          </p:cNvPr>
-          <p:cNvSpPr txBox="1"/>
-          <p:nvPr/>
-        </p:nvSpPr>
-        <p:spPr>
-          <a:xfrm>
-            <a:off x="7183980" y="1741714"/>
-            <a:ext cx="3446417" cy="369332"/>
-          </a:xfrm>
-          <a:prstGeom prst="rect">
-            <a:avLst/>
-          </a:prstGeom>
-          <a:noFill/>
-        </p:spPr>
-        <p:txBody>
-          <a:bodyPr wrap="square" rtlCol="0">
-            <a:spAutoFit/>
-          </a:bodyPr>
-          <a:lstStyle/>
-          <a:p>
-            <a:pPr algn="ctr"/>
-            <a:r>
-              <a:rPr lang="en-US" dirty="0"/>
-              <a:t>New</a:t>
-            </a:r>
-          </a:p>
-        </p:txBody>
-      </p:sp>
-    </p:spTree>
-    <p:extLst>
-      <p:ext uri="{BB962C8B-B14F-4D97-AF65-F5344CB8AC3E}">
-        <p14:creationId xmlns:p14="http://schemas.microsoft.com/office/powerpoint/2010/main" val="2320827095"/>
-      </p:ext>
-    </p:extLst>
-  </p:cSld>
-  <p:clrMapOvr>
-    <a:masterClrMapping/>
-  </p:clrMapOvr>
-</p:sld>
-</file>
-
-<file path=ppt/slides/slide14.xml><?xml version="1.0" encoding="utf-8"?>
 <p:sld xmlns:a="http://schemas.openxmlformats.org/drawingml/2006/main" xmlns:r="http://schemas.openxmlformats.org/officeDocument/2006/relationships" xmlns:p="http://schemas.openxmlformats.org/presentationml/2006/main">
   <p:cSld>
     <p:bg>
@@ -6155,7 +6169,7 @@
 </p:sld>
 </file>
 
-<file path=ppt/slides/slide15.xml><?xml version="1.0" encoding="utf-8"?>
+<file path=ppt/slides/slide14.xml><?xml version="1.0" encoding="utf-8"?>
 <p:sld xmlns:a="http://schemas.openxmlformats.org/drawingml/2006/main" xmlns:r="http://schemas.openxmlformats.org/officeDocument/2006/relationships" xmlns:p="http://schemas.openxmlformats.org/presentationml/2006/main">
   <p:cSld>
     <p:spTree>
@@ -6610,6 +6624,79 @@
 </p:sld>
 </file>
 
+<file path=ppt/slides/slide15.xml><?xml version="1.0" encoding="utf-8"?>
+<p:sld xmlns:a="http://schemas.openxmlformats.org/drawingml/2006/main" xmlns:r="http://schemas.openxmlformats.org/officeDocument/2006/relationships" xmlns:p="http://schemas.openxmlformats.org/presentationml/2006/main">
+  <p:cSld>
+    <p:spTree>
+      <p:nvGrpSpPr>
+        <p:cNvPr id="1" name=""/>
+        <p:cNvGrpSpPr/>
+        <p:nvPr/>
+      </p:nvGrpSpPr>
+      <p:grpSpPr>
+        <a:xfrm>
+          <a:off x="0" y="0"/>
+          <a:ext cx="0" cy="0"/>
+          <a:chOff x="0" y="0"/>
+          <a:chExt cx="0" cy="0"/>
+        </a:xfrm>
+      </p:grpSpPr>
+      <p:sp>
+        <p:nvSpPr>
+          <p:cNvPr id="2" name="Title 1">
+            <a:extLst>
+              <a:ext uri="{FF2B5EF4-FFF2-40B4-BE49-F238E27FC236}">
+                <a16:creationId xmlns:a16="http://schemas.microsoft.com/office/drawing/2014/main" id="{148CC2C7-94DC-40B4-A7A3-C779995D9F5E}"/>
+              </a:ext>
+            </a:extLst>
+          </p:cNvPr>
+          <p:cNvSpPr>
+            <a:spLocks noGrp="1"/>
+          </p:cNvSpPr>
+          <p:nvPr>
+            <p:ph type="title"/>
+          </p:nvPr>
+        </p:nvSpPr>
+        <p:spPr>
+          <a:xfrm>
+            <a:off x="907868" y="2689944"/>
+            <a:ext cx="10515600" cy="739056"/>
+          </a:xfrm>
+        </p:spPr>
+        <p:txBody>
+          <a:bodyPr>
+            <a:normAutofit fontScale="90000"/>
+          </a:bodyPr>
+          <a:lstStyle/>
+          <a:p>
+            <a:pPr algn="ctr"/>
+            <a:r>
+              <a:rPr lang="en-US" sz="9800" dirty="0"/>
+              <a:t>Thank You</a:t>
+            </a:r>
+            <a:br>
+              <a:rPr lang="en-US" dirty="0"/>
+            </a:br>
+            <a:r>
+              <a:rPr lang="en-US" dirty="0"/>
+              <a:t>Q&amp;A</a:t>
+            </a:r>
+          </a:p>
+        </p:txBody>
+      </p:sp>
+    </p:spTree>
+    <p:extLst>
+      <p:ext uri="{BB962C8B-B14F-4D97-AF65-F5344CB8AC3E}">
+        <p14:creationId xmlns:p14="http://schemas.microsoft.com/office/powerpoint/2010/main" val="3463978095"/>
+      </p:ext>
+    </p:extLst>
+  </p:cSld>
+  <p:clrMapOvr>
+    <a:masterClrMapping/>
+  </p:clrMapOvr>
+</p:sld>
+</file>
+
 <file path=ppt/slides/slide16.xml><?xml version="1.0" encoding="utf-8"?>
 <p:sld xmlns:a="http://schemas.openxmlformats.org/drawingml/2006/main" xmlns:r="http://schemas.openxmlformats.org/officeDocument/2006/relationships" xmlns:p="http://schemas.openxmlformats.org/presentationml/2006/main">
   <p:cSld>
@@ -6632,7 +6719,7 @@
           <p:cNvPr id="2" name="Title 1">
             <a:extLst>
               <a:ext uri="{FF2B5EF4-FFF2-40B4-BE49-F238E27FC236}">
-                <a16:creationId xmlns:a16="http://schemas.microsoft.com/office/drawing/2014/main" id="{148CC2C7-94DC-40B4-A7A3-C779995D9F5E}"/>
+                <a16:creationId xmlns:a16="http://schemas.microsoft.com/office/drawing/2014/main" id="{85BFC2D1-07F0-4E13-B620-194934AD87CF}"/>
               </a:ext>
             </a:extLst>
           </p:cNvPr>
@@ -6643,37 +6730,792 @@
             <p:ph type="title"/>
           </p:nvPr>
         </p:nvSpPr>
-        <p:spPr>
-          <a:xfrm>
-            <a:off x="907868" y="2689944"/>
-            <a:ext cx="10515600" cy="739056"/>
-          </a:xfrm>
-        </p:spPr>
+        <p:spPr/>
         <p:txBody>
           <a:bodyPr>
             <a:normAutofit fontScale="90000"/>
           </a:bodyPr>
           <a:lstStyle/>
           <a:p>
+            <a:r>
+              <a:rPr lang="en-US" dirty="0" err="1"/>
+              <a:t>Appendx</a:t>
+            </a:r>
+            <a:r>
+              <a:rPr lang="en-US" dirty="0"/>
+              <a:t>: Random Forest Base model and Pipeline (Old Tweet)</a:t>
+            </a:r>
+          </a:p>
+        </p:txBody>
+      </p:sp>
+      <p:pic>
+        <p:nvPicPr>
+          <p:cNvPr id="4" name="Picture 3" descr="Chart, treemap chart&#10;&#10;Description automatically generated">
+            <a:extLst>
+              <a:ext uri="{FF2B5EF4-FFF2-40B4-BE49-F238E27FC236}">
+                <a16:creationId xmlns:a16="http://schemas.microsoft.com/office/drawing/2014/main" id="{1F4C5A53-FBF8-4502-A3BE-22F6B30D4D76}"/>
+              </a:ext>
+            </a:extLst>
+          </p:cNvPr>
+          <p:cNvPicPr>
+            <a:picLocks noChangeAspect="1"/>
+          </p:cNvPicPr>
+          <p:nvPr/>
+        </p:nvPicPr>
+        <p:blipFill>
+          <a:blip r:embed="rId2">
+            <a:extLst>
+              <a:ext uri="{28A0092B-C50C-407E-A947-70E740481C1C}">
+                <a14:useLocalDpi xmlns:a14="http://schemas.microsoft.com/office/drawing/2010/main" val="0"/>
+              </a:ext>
+            </a:extLst>
+          </a:blip>
+          <a:stretch>
+            <a:fillRect/>
+          </a:stretch>
+        </p:blipFill>
+        <p:spPr>
+          <a:xfrm>
+            <a:off x="6614853" y="1420492"/>
+            <a:ext cx="4855464" cy="5437507"/>
+          </a:xfrm>
+          <a:prstGeom prst="rect">
+            <a:avLst/>
+          </a:prstGeom>
+        </p:spPr>
+      </p:pic>
+      <p:pic>
+        <p:nvPicPr>
+          <p:cNvPr id="6" name="Picture 5" descr="Chart, treemap chart&#10;&#10;Description automatically generated">
+            <a:extLst>
+              <a:ext uri="{FF2B5EF4-FFF2-40B4-BE49-F238E27FC236}">
+                <a16:creationId xmlns:a16="http://schemas.microsoft.com/office/drawing/2014/main" id="{753364F9-C1F5-4944-8627-0EFEEDB956FD}"/>
+              </a:ext>
+            </a:extLst>
+          </p:cNvPr>
+          <p:cNvPicPr>
+            <a:picLocks noChangeAspect="1"/>
+          </p:cNvPicPr>
+          <p:nvPr/>
+        </p:nvPicPr>
+        <p:blipFill>
+          <a:blip r:embed="rId3">
+            <a:extLst>
+              <a:ext uri="{28A0092B-C50C-407E-A947-70E740481C1C}">
+                <a14:useLocalDpi xmlns:a14="http://schemas.microsoft.com/office/drawing/2010/main" val="0"/>
+              </a:ext>
+            </a:extLst>
+          </a:blip>
+          <a:stretch>
+            <a:fillRect/>
+          </a:stretch>
+        </p:blipFill>
+        <p:spPr>
+          <a:xfrm>
+            <a:off x="838200" y="1420492"/>
+            <a:ext cx="4855464" cy="5411899"/>
+          </a:xfrm>
+          <a:prstGeom prst="rect">
+            <a:avLst/>
+          </a:prstGeom>
+        </p:spPr>
+      </p:pic>
+      <p:sp>
+        <p:nvSpPr>
+          <p:cNvPr id="7" name="TextBox 6">
+            <a:extLst>
+              <a:ext uri="{FF2B5EF4-FFF2-40B4-BE49-F238E27FC236}">
+                <a16:creationId xmlns:a16="http://schemas.microsoft.com/office/drawing/2014/main" id="{2A3D876D-6908-4B8A-B53F-7CE788381D7B}"/>
+              </a:ext>
+            </a:extLst>
+          </p:cNvPr>
+          <p:cNvSpPr txBox="1"/>
+          <p:nvPr/>
+        </p:nvSpPr>
+        <p:spPr>
+          <a:xfrm>
+            <a:off x="2257587" y="1060098"/>
+            <a:ext cx="2016690" cy="369332"/>
+          </a:xfrm>
+          <a:prstGeom prst="rect">
+            <a:avLst/>
+          </a:prstGeom>
+          <a:noFill/>
+        </p:spPr>
+        <p:txBody>
+          <a:bodyPr wrap="square" rtlCol="0">
+            <a:spAutoFit/>
+          </a:bodyPr>
+          <a:lstStyle/>
+          <a:p>
             <a:pPr algn="ctr"/>
             <a:r>
-              <a:rPr lang="en-US" sz="9800" dirty="0"/>
-              <a:t>Thank You</a:t>
-            </a:r>
-            <a:br>
               <a:rPr lang="en-US" dirty="0"/>
-            </a:br>
-            <a:r>
-              <a:rPr lang="en-US" dirty="0"/>
-              <a:t>Q&amp;A</a:t>
-            </a:r>
+              <a:t>Base</a:t>
+            </a:r>
+          </a:p>
+        </p:txBody>
+      </p:sp>
+      <p:sp>
+        <p:nvSpPr>
+          <p:cNvPr id="8" name="TextBox 7">
+            <a:extLst>
+              <a:ext uri="{FF2B5EF4-FFF2-40B4-BE49-F238E27FC236}">
+                <a16:creationId xmlns:a16="http://schemas.microsoft.com/office/drawing/2014/main" id="{69B7906D-2577-4C1C-A250-0EAFDBEAA775}"/>
+              </a:ext>
+            </a:extLst>
+          </p:cNvPr>
+          <p:cNvSpPr txBox="1"/>
+          <p:nvPr/>
+        </p:nvSpPr>
+        <p:spPr>
+          <a:xfrm>
+            <a:off x="8034240" y="1000874"/>
+            <a:ext cx="2016690" cy="369332"/>
+          </a:xfrm>
+          <a:prstGeom prst="rect">
+            <a:avLst/>
+          </a:prstGeom>
+          <a:noFill/>
+        </p:spPr>
+        <p:txBody>
+          <a:bodyPr wrap="square" rtlCol="0">
+            <a:spAutoFit/>
+          </a:bodyPr>
+          <a:lstStyle/>
+          <a:p>
+            <a:pPr algn="ctr"/>
+            <a:r>
+              <a:rPr lang="en-US" dirty="0" err="1"/>
+              <a:t>Piepeline</a:t>
+            </a:r>
+            <a:endParaRPr lang="en-US" dirty="0"/>
           </a:p>
         </p:txBody>
       </p:sp>
     </p:spTree>
     <p:extLst>
       <p:ext uri="{BB962C8B-B14F-4D97-AF65-F5344CB8AC3E}">
-        <p14:creationId xmlns:p14="http://schemas.microsoft.com/office/powerpoint/2010/main" val="3463978095"/>
+        <p14:creationId xmlns:p14="http://schemas.microsoft.com/office/powerpoint/2010/main" val="284740002"/>
+      </p:ext>
+    </p:extLst>
+  </p:cSld>
+  <p:clrMapOvr>
+    <a:masterClrMapping/>
+  </p:clrMapOvr>
+</p:sld>
+</file>
+
+<file path=ppt/slides/slide17.xml><?xml version="1.0" encoding="utf-8"?>
+<p:sld xmlns:a="http://schemas.openxmlformats.org/drawingml/2006/main" xmlns:r="http://schemas.openxmlformats.org/officeDocument/2006/relationships" xmlns:p="http://schemas.openxmlformats.org/presentationml/2006/main">
+  <p:cSld>
+    <p:spTree>
+      <p:nvGrpSpPr>
+        <p:cNvPr id="1" name=""/>
+        <p:cNvGrpSpPr/>
+        <p:nvPr/>
+      </p:nvGrpSpPr>
+      <p:grpSpPr>
+        <a:xfrm>
+          <a:off x="0" y="0"/>
+          <a:ext cx="0" cy="0"/>
+          <a:chOff x="0" y="0"/>
+          <a:chExt cx="0" cy="0"/>
+        </a:xfrm>
+      </p:grpSpPr>
+      <p:sp>
+        <p:nvSpPr>
+          <p:cNvPr id="2" name="Title 1">
+            <a:extLst>
+              <a:ext uri="{FF2B5EF4-FFF2-40B4-BE49-F238E27FC236}">
+                <a16:creationId xmlns:a16="http://schemas.microsoft.com/office/drawing/2014/main" id="{85BFC2D1-07F0-4E13-B620-194934AD87CF}"/>
+              </a:ext>
+            </a:extLst>
+          </p:cNvPr>
+          <p:cNvSpPr>
+            <a:spLocks noGrp="1"/>
+          </p:cNvSpPr>
+          <p:nvPr>
+            <p:ph type="title"/>
+          </p:nvPr>
+        </p:nvSpPr>
+        <p:spPr/>
+        <p:txBody>
+          <a:bodyPr>
+            <a:normAutofit fontScale="90000"/>
+          </a:bodyPr>
+          <a:lstStyle/>
+          <a:p>
+            <a:r>
+              <a:rPr lang="en-US" dirty="0" err="1"/>
+              <a:t>Appendx</a:t>
+            </a:r>
+            <a:r>
+              <a:rPr lang="en-US" dirty="0"/>
+              <a:t>: Random Forest Base model and Pipeline (New Tweet)</a:t>
+            </a:r>
+          </a:p>
+        </p:txBody>
+      </p:sp>
+      <p:pic>
+        <p:nvPicPr>
+          <p:cNvPr id="3" name="Picture 2">
+            <a:extLst>
+              <a:ext uri="{FF2B5EF4-FFF2-40B4-BE49-F238E27FC236}">
+                <a16:creationId xmlns:a16="http://schemas.microsoft.com/office/drawing/2014/main" id="{9FBB54F7-4ED2-426E-82A4-2E4724F18B15}"/>
+              </a:ext>
+            </a:extLst>
+          </p:cNvPr>
+          <p:cNvPicPr>
+            <a:picLocks noChangeAspect="1"/>
+          </p:cNvPicPr>
+          <p:nvPr/>
+        </p:nvPicPr>
+        <p:blipFill>
+          <a:blip r:embed="rId2">
+            <a:extLst>
+              <a:ext uri="{28A0092B-C50C-407E-A947-70E740481C1C}">
+                <a14:useLocalDpi xmlns:a14="http://schemas.microsoft.com/office/drawing/2010/main" val="0"/>
+              </a:ext>
+            </a:extLst>
+          </a:blip>
+          <a:srcRect/>
+          <a:stretch/>
+        </p:blipFill>
+        <p:spPr>
+          <a:xfrm>
+            <a:off x="6687342" y="1420492"/>
+            <a:ext cx="4710486" cy="5437507"/>
+          </a:xfrm>
+          <a:prstGeom prst="rect">
+            <a:avLst/>
+          </a:prstGeom>
+        </p:spPr>
+      </p:pic>
+      <p:pic>
+        <p:nvPicPr>
+          <p:cNvPr id="4" name="Picture 3">
+            <a:extLst>
+              <a:ext uri="{FF2B5EF4-FFF2-40B4-BE49-F238E27FC236}">
+                <a16:creationId xmlns:a16="http://schemas.microsoft.com/office/drawing/2014/main" id="{B0D9F23A-D3A1-4A2F-ADB5-428121E8CF42}"/>
+              </a:ext>
+            </a:extLst>
+          </p:cNvPr>
+          <p:cNvPicPr>
+            <a:picLocks noChangeAspect="1"/>
+          </p:cNvPicPr>
+          <p:nvPr/>
+        </p:nvPicPr>
+        <p:blipFill>
+          <a:blip r:embed="rId3">
+            <a:extLst>
+              <a:ext uri="{28A0092B-C50C-407E-A947-70E740481C1C}">
+                <a14:useLocalDpi xmlns:a14="http://schemas.microsoft.com/office/drawing/2010/main" val="0"/>
+              </a:ext>
+            </a:extLst>
+          </a:blip>
+          <a:srcRect/>
+          <a:stretch/>
+        </p:blipFill>
+        <p:spPr>
+          <a:xfrm>
+            <a:off x="880123" y="1420492"/>
+            <a:ext cx="4771617" cy="5411899"/>
+          </a:xfrm>
+          <a:prstGeom prst="rect">
+            <a:avLst/>
+          </a:prstGeom>
+        </p:spPr>
+      </p:pic>
+      <p:sp>
+        <p:nvSpPr>
+          <p:cNvPr id="5" name="TextBox 4">
+            <a:extLst>
+              <a:ext uri="{FF2B5EF4-FFF2-40B4-BE49-F238E27FC236}">
+                <a16:creationId xmlns:a16="http://schemas.microsoft.com/office/drawing/2014/main" id="{7CBEFEF6-5DB6-44BD-ADC8-6AC6DA14BC80}"/>
+              </a:ext>
+            </a:extLst>
+          </p:cNvPr>
+          <p:cNvSpPr txBox="1"/>
+          <p:nvPr/>
+        </p:nvSpPr>
+        <p:spPr>
+          <a:xfrm>
+            <a:off x="2257587" y="1060098"/>
+            <a:ext cx="2016690" cy="369332"/>
+          </a:xfrm>
+          <a:prstGeom prst="rect">
+            <a:avLst/>
+          </a:prstGeom>
+          <a:noFill/>
+        </p:spPr>
+        <p:txBody>
+          <a:bodyPr wrap="square" rtlCol="0">
+            <a:spAutoFit/>
+          </a:bodyPr>
+          <a:lstStyle/>
+          <a:p>
+            <a:pPr algn="ctr"/>
+            <a:r>
+              <a:rPr lang="en-US" dirty="0"/>
+              <a:t>Base</a:t>
+            </a:r>
+          </a:p>
+        </p:txBody>
+      </p:sp>
+      <p:sp>
+        <p:nvSpPr>
+          <p:cNvPr id="6" name="TextBox 5">
+            <a:extLst>
+              <a:ext uri="{FF2B5EF4-FFF2-40B4-BE49-F238E27FC236}">
+                <a16:creationId xmlns:a16="http://schemas.microsoft.com/office/drawing/2014/main" id="{23F5D8B8-CAD8-4546-A79B-694F49A74BD8}"/>
+              </a:ext>
+            </a:extLst>
+          </p:cNvPr>
+          <p:cNvSpPr txBox="1"/>
+          <p:nvPr/>
+        </p:nvSpPr>
+        <p:spPr>
+          <a:xfrm>
+            <a:off x="8034240" y="1000874"/>
+            <a:ext cx="2016690" cy="369332"/>
+          </a:xfrm>
+          <a:prstGeom prst="rect">
+            <a:avLst/>
+          </a:prstGeom>
+          <a:noFill/>
+        </p:spPr>
+        <p:txBody>
+          <a:bodyPr wrap="square" rtlCol="0">
+            <a:spAutoFit/>
+          </a:bodyPr>
+          <a:lstStyle/>
+          <a:p>
+            <a:pPr algn="ctr"/>
+            <a:r>
+              <a:rPr lang="en-US" dirty="0" err="1"/>
+              <a:t>Piepeline</a:t>
+            </a:r>
+            <a:endParaRPr lang="en-US" dirty="0"/>
+          </a:p>
+        </p:txBody>
+      </p:sp>
+    </p:spTree>
+    <p:extLst>
+      <p:ext uri="{BB962C8B-B14F-4D97-AF65-F5344CB8AC3E}">
+        <p14:creationId xmlns:p14="http://schemas.microsoft.com/office/powerpoint/2010/main" val="3701945742"/>
+      </p:ext>
+    </p:extLst>
+  </p:cSld>
+  <p:clrMapOvr>
+    <a:masterClrMapping/>
+  </p:clrMapOvr>
+</p:sld>
+</file>
+
+<file path=ppt/slides/slide18.xml><?xml version="1.0" encoding="utf-8"?>
+<p:sld xmlns:a="http://schemas.openxmlformats.org/drawingml/2006/main" xmlns:r="http://schemas.openxmlformats.org/officeDocument/2006/relationships" xmlns:p="http://schemas.openxmlformats.org/presentationml/2006/main">
+  <p:cSld>
+    <p:spTree>
+      <p:nvGrpSpPr>
+        <p:cNvPr id="1" name=""/>
+        <p:cNvGrpSpPr/>
+        <p:nvPr/>
+      </p:nvGrpSpPr>
+      <p:grpSpPr>
+        <a:xfrm>
+          <a:off x="0" y="0"/>
+          <a:ext cx="0" cy="0"/>
+          <a:chOff x="0" y="0"/>
+          <a:chExt cx="0" cy="0"/>
+        </a:xfrm>
+      </p:grpSpPr>
+      <p:sp>
+        <p:nvSpPr>
+          <p:cNvPr id="2" name="Title 1">
+            <a:extLst>
+              <a:ext uri="{FF2B5EF4-FFF2-40B4-BE49-F238E27FC236}">
+                <a16:creationId xmlns:a16="http://schemas.microsoft.com/office/drawing/2014/main" id="{85BFC2D1-07F0-4E13-B620-194934AD87CF}"/>
+              </a:ext>
+            </a:extLst>
+          </p:cNvPr>
+          <p:cNvSpPr>
+            <a:spLocks noGrp="1"/>
+          </p:cNvSpPr>
+          <p:nvPr>
+            <p:ph type="title"/>
+          </p:nvPr>
+        </p:nvSpPr>
+        <p:spPr/>
+        <p:txBody>
+          <a:bodyPr>
+            <a:normAutofit fontScale="90000"/>
+          </a:bodyPr>
+          <a:lstStyle/>
+          <a:p>
+            <a:r>
+              <a:rPr lang="en-US" dirty="0" err="1"/>
+              <a:t>Appendx</a:t>
+            </a:r>
+            <a:r>
+              <a:rPr lang="en-US" dirty="0"/>
+              <a:t>: Naïve Bayesian Base model and Grid Search (Old Tweet)</a:t>
+            </a:r>
+          </a:p>
+        </p:txBody>
+      </p:sp>
+      <p:pic>
+        <p:nvPicPr>
+          <p:cNvPr id="3" name="Picture 2">
+            <a:extLst>
+              <a:ext uri="{FF2B5EF4-FFF2-40B4-BE49-F238E27FC236}">
+                <a16:creationId xmlns:a16="http://schemas.microsoft.com/office/drawing/2014/main" id="{5DF3EBF4-05EB-4FC0-B904-4CCC6AA0F4E3}"/>
+              </a:ext>
+            </a:extLst>
+          </p:cNvPr>
+          <p:cNvPicPr>
+            <a:picLocks noChangeAspect="1"/>
+          </p:cNvPicPr>
+          <p:nvPr/>
+        </p:nvPicPr>
+        <p:blipFill>
+          <a:blip r:embed="rId2">
+            <a:extLst>
+              <a:ext uri="{28A0092B-C50C-407E-A947-70E740481C1C}">
+                <a14:useLocalDpi xmlns:a14="http://schemas.microsoft.com/office/drawing/2010/main" val="0"/>
+              </a:ext>
+            </a:extLst>
+          </a:blip>
+          <a:srcRect/>
+          <a:stretch/>
+        </p:blipFill>
+        <p:spPr>
+          <a:xfrm>
+            <a:off x="6671228" y="1420492"/>
+            <a:ext cx="4742714" cy="5437507"/>
+          </a:xfrm>
+          <a:prstGeom prst="rect">
+            <a:avLst/>
+          </a:prstGeom>
+        </p:spPr>
+      </p:pic>
+      <p:pic>
+        <p:nvPicPr>
+          <p:cNvPr id="4" name="Picture 3">
+            <a:extLst>
+              <a:ext uri="{FF2B5EF4-FFF2-40B4-BE49-F238E27FC236}">
+                <a16:creationId xmlns:a16="http://schemas.microsoft.com/office/drawing/2014/main" id="{9B95F1E7-B7FE-4350-A51B-EAD63E47028D}"/>
+              </a:ext>
+            </a:extLst>
+          </p:cNvPr>
+          <p:cNvPicPr>
+            <a:picLocks noChangeAspect="1"/>
+          </p:cNvPicPr>
+          <p:nvPr/>
+        </p:nvPicPr>
+        <p:blipFill>
+          <a:blip r:embed="rId3">
+            <a:extLst>
+              <a:ext uri="{28A0092B-C50C-407E-A947-70E740481C1C}">
+                <a14:useLocalDpi xmlns:a14="http://schemas.microsoft.com/office/drawing/2010/main" val="0"/>
+              </a:ext>
+            </a:extLst>
+          </a:blip>
+          <a:srcRect/>
+          <a:stretch/>
+        </p:blipFill>
+        <p:spPr>
+          <a:xfrm>
+            <a:off x="838200" y="1420928"/>
+            <a:ext cx="4855464" cy="5411026"/>
+          </a:xfrm>
+          <a:prstGeom prst="rect">
+            <a:avLst/>
+          </a:prstGeom>
+        </p:spPr>
+      </p:pic>
+      <p:sp>
+        <p:nvSpPr>
+          <p:cNvPr id="5" name="TextBox 4">
+            <a:extLst>
+              <a:ext uri="{FF2B5EF4-FFF2-40B4-BE49-F238E27FC236}">
+                <a16:creationId xmlns:a16="http://schemas.microsoft.com/office/drawing/2014/main" id="{F267E81E-70C4-44B1-BD0F-91EF99761667}"/>
+              </a:ext>
+            </a:extLst>
+          </p:cNvPr>
+          <p:cNvSpPr txBox="1"/>
+          <p:nvPr/>
+        </p:nvSpPr>
+        <p:spPr>
+          <a:xfrm>
+            <a:off x="2257587" y="1060098"/>
+            <a:ext cx="2016690" cy="369332"/>
+          </a:xfrm>
+          <a:prstGeom prst="rect">
+            <a:avLst/>
+          </a:prstGeom>
+          <a:noFill/>
+        </p:spPr>
+        <p:txBody>
+          <a:bodyPr wrap="square" rtlCol="0">
+            <a:spAutoFit/>
+          </a:bodyPr>
+          <a:lstStyle/>
+          <a:p>
+            <a:pPr algn="ctr"/>
+            <a:r>
+              <a:rPr lang="en-US" dirty="0"/>
+              <a:t>Base</a:t>
+            </a:r>
+          </a:p>
+        </p:txBody>
+      </p:sp>
+      <p:sp>
+        <p:nvSpPr>
+          <p:cNvPr id="6" name="TextBox 5">
+            <a:extLst>
+              <a:ext uri="{FF2B5EF4-FFF2-40B4-BE49-F238E27FC236}">
+                <a16:creationId xmlns:a16="http://schemas.microsoft.com/office/drawing/2014/main" id="{00368D60-4075-461A-90C0-1763D2558FCA}"/>
+              </a:ext>
+            </a:extLst>
+          </p:cNvPr>
+          <p:cNvSpPr txBox="1"/>
+          <p:nvPr/>
+        </p:nvSpPr>
+        <p:spPr>
+          <a:xfrm>
+            <a:off x="8034240" y="1000874"/>
+            <a:ext cx="2016690" cy="369332"/>
+          </a:xfrm>
+          <a:prstGeom prst="rect">
+            <a:avLst/>
+          </a:prstGeom>
+          <a:noFill/>
+        </p:spPr>
+        <p:txBody>
+          <a:bodyPr wrap="square" rtlCol="0">
+            <a:spAutoFit/>
+          </a:bodyPr>
+          <a:lstStyle/>
+          <a:p>
+            <a:pPr algn="ctr"/>
+            <a:r>
+              <a:rPr lang="en-US" dirty="0"/>
+              <a:t>Grid Search</a:t>
+            </a:r>
+          </a:p>
+        </p:txBody>
+      </p:sp>
+    </p:spTree>
+    <p:extLst>
+      <p:ext uri="{BB962C8B-B14F-4D97-AF65-F5344CB8AC3E}">
+        <p14:creationId xmlns:p14="http://schemas.microsoft.com/office/powerpoint/2010/main" val="1708327473"/>
+      </p:ext>
+    </p:extLst>
+  </p:cSld>
+  <p:clrMapOvr>
+    <a:masterClrMapping/>
+  </p:clrMapOvr>
+</p:sld>
+</file>
+
+<file path=ppt/slides/slide19.xml><?xml version="1.0" encoding="utf-8"?>
+<p:sld xmlns:a="http://schemas.openxmlformats.org/drawingml/2006/main" xmlns:r="http://schemas.openxmlformats.org/officeDocument/2006/relationships" xmlns:p="http://schemas.openxmlformats.org/presentationml/2006/main">
+  <p:cSld>
+    <p:spTree>
+      <p:nvGrpSpPr>
+        <p:cNvPr id="1" name=""/>
+        <p:cNvGrpSpPr/>
+        <p:nvPr/>
+      </p:nvGrpSpPr>
+      <p:grpSpPr>
+        <a:xfrm>
+          <a:off x="0" y="0"/>
+          <a:ext cx="0" cy="0"/>
+          <a:chOff x="0" y="0"/>
+          <a:chExt cx="0" cy="0"/>
+        </a:xfrm>
+      </p:grpSpPr>
+      <p:sp>
+        <p:nvSpPr>
+          <p:cNvPr id="2" name="Title 1">
+            <a:extLst>
+              <a:ext uri="{FF2B5EF4-FFF2-40B4-BE49-F238E27FC236}">
+                <a16:creationId xmlns:a16="http://schemas.microsoft.com/office/drawing/2014/main" id="{85BFC2D1-07F0-4E13-B620-194934AD87CF}"/>
+              </a:ext>
+            </a:extLst>
+          </p:cNvPr>
+          <p:cNvSpPr>
+            <a:spLocks noGrp="1"/>
+          </p:cNvSpPr>
+          <p:nvPr>
+            <p:ph type="title"/>
+          </p:nvPr>
+        </p:nvSpPr>
+        <p:spPr/>
+        <p:txBody>
+          <a:bodyPr>
+            <a:normAutofit fontScale="90000"/>
+          </a:bodyPr>
+          <a:lstStyle/>
+          <a:p>
+            <a:r>
+              <a:rPr lang="en-US" dirty="0" err="1"/>
+              <a:t>Appendx</a:t>
+            </a:r>
+            <a:r>
+              <a:rPr lang="en-US" dirty="0"/>
+              <a:t>: Naïve Bayesian Base model and Grid Search (New Tweet)</a:t>
+            </a:r>
+          </a:p>
+        </p:txBody>
+      </p:sp>
+      <p:pic>
+        <p:nvPicPr>
+          <p:cNvPr id="3" name="Picture 2">
+            <a:extLst>
+              <a:ext uri="{FF2B5EF4-FFF2-40B4-BE49-F238E27FC236}">
+                <a16:creationId xmlns:a16="http://schemas.microsoft.com/office/drawing/2014/main" id="{29D1D51D-641E-4651-BCDA-C81EC02EE3BA}"/>
+              </a:ext>
+            </a:extLst>
+          </p:cNvPr>
+          <p:cNvPicPr>
+            <a:picLocks noChangeAspect="1"/>
+          </p:cNvPicPr>
+          <p:nvPr/>
+        </p:nvPicPr>
+        <p:blipFill>
+          <a:blip r:embed="rId2">
+            <a:extLst>
+              <a:ext uri="{28A0092B-C50C-407E-A947-70E740481C1C}">
+                <a14:useLocalDpi xmlns:a14="http://schemas.microsoft.com/office/drawing/2010/main" val="0"/>
+              </a:ext>
+            </a:extLst>
+          </a:blip>
+          <a:srcRect/>
+          <a:stretch/>
+        </p:blipFill>
+        <p:spPr>
+          <a:xfrm>
+            <a:off x="6634330" y="1420492"/>
+            <a:ext cx="4816510" cy="5437507"/>
+          </a:xfrm>
+          <a:prstGeom prst="rect">
+            <a:avLst/>
+          </a:prstGeom>
+        </p:spPr>
+      </p:pic>
+      <p:pic>
+        <p:nvPicPr>
+          <p:cNvPr id="4" name="Picture 3">
+            <a:extLst>
+              <a:ext uri="{FF2B5EF4-FFF2-40B4-BE49-F238E27FC236}">
+                <a16:creationId xmlns:a16="http://schemas.microsoft.com/office/drawing/2014/main" id="{3D01ABC4-F88F-4AAE-942B-4D977DCD6927}"/>
+              </a:ext>
+            </a:extLst>
+          </p:cNvPr>
+          <p:cNvPicPr>
+            <a:picLocks noChangeAspect="1"/>
+          </p:cNvPicPr>
+          <p:nvPr/>
+        </p:nvPicPr>
+        <p:blipFill>
+          <a:blip r:embed="rId3">
+            <a:extLst>
+              <a:ext uri="{28A0092B-C50C-407E-A947-70E740481C1C}">
+                <a14:useLocalDpi xmlns:a14="http://schemas.microsoft.com/office/drawing/2010/main" val="0"/>
+              </a:ext>
+            </a:extLst>
+          </a:blip>
+          <a:srcRect/>
+          <a:stretch/>
+        </p:blipFill>
+        <p:spPr>
+          <a:xfrm>
+            <a:off x="887745" y="1420492"/>
+            <a:ext cx="4756373" cy="5411899"/>
+          </a:xfrm>
+          <a:prstGeom prst="rect">
+            <a:avLst/>
+          </a:prstGeom>
+        </p:spPr>
+      </p:pic>
+      <p:sp>
+        <p:nvSpPr>
+          <p:cNvPr id="5" name="TextBox 4">
+            <a:extLst>
+              <a:ext uri="{FF2B5EF4-FFF2-40B4-BE49-F238E27FC236}">
+                <a16:creationId xmlns:a16="http://schemas.microsoft.com/office/drawing/2014/main" id="{2DFF40BA-5CC4-45CC-AED5-3F14EEA70347}"/>
+              </a:ext>
+            </a:extLst>
+          </p:cNvPr>
+          <p:cNvSpPr txBox="1"/>
+          <p:nvPr/>
+        </p:nvSpPr>
+        <p:spPr>
+          <a:xfrm>
+            <a:off x="2257587" y="1060098"/>
+            <a:ext cx="2016690" cy="369332"/>
+          </a:xfrm>
+          <a:prstGeom prst="rect">
+            <a:avLst/>
+          </a:prstGeom>
+          <a:noFill/>
+        </p:spPr>
+        <p:txBody>
+          <a:bodyPr wrap="square" rtlCol="0">
+            <a:spAutoFit/>
+          </a:bodyPr>
+          <a:lstStyle/>
+          <a:p>
+            <a:pPr algn="ctr"/>
+            <a:r>
+              <a:rPr lang="en-US" dirty="0"/>
+              <a:t>Base</a:t>
+            </a:r>
+          </a:p>
+        </p:txBody>
+      </p:sp>
+      <p:sp>
+        <p:nvSpPr>
+          <p:cNvPr id="6" name="TextBox 5">
+            <a:extLst>
+              <a:ext uri="{FF2B5EF4-FFF2-40B4-BE49-F238E27FC236}">
+                <a16:creationId xmlns:a16="http://schemas.microsoft.com/office/drawing/2014/main" id="{9169320A-00D0-4A08-B1C9-A38AA9F035C9}"/>
+              </a:ext>
+            </a:extLst>
+          </p:cNvPr>
+          <p:cNvSpPr txBox="1"/>
+          <p:nvPr/>
+        </p:nvSpPr>
+        <p:spPr>
+          <a:xfrm>
+            <a:off x="8034240" y="1000874"/>
+            <a:ext cx="2016690" cy="369332"/>
+          </a:xfrm>
+          <a:prstGeom prst="rect">
+            <a:avLst/>
+          </a:prstGeom>
+          <a:noFill/>
+        </p:spPr>
+        <p:txBody>
+          <a:bodyPr wrap="square" rtlCol="0">
+            <a:spAutoFit/>
+          </a:bodyPr>
+          <a:lstStyle/>
+          <a:p>
+            <a:pPr algn="ctr"/>
+            <a:r>
+              <a:rPr lang="en-US" dirty="0"/>
+              <a:t>Grid Search</a:t>
+            </a:r>
+          </a:p>
+        </p:txBody>
+      </p:sp>
+    </p:spTree>
+    <p:extLst>
+      <p:ext uri="{BB962C8B-B14F-4D97-AF65-F5344CB8AC3E}">
+        <p14:creationId xmlns:p14="http://schemas.microsoft.com/office/powerpoint/2010/main" val="3874558146"/>
       </p:ext>
     </p:extLst>
   </p:cSld>
@@ -7494,8 +8336,8 @@
         </p:nvSpPr>
         <p:spPr>
           <a:xfrm>
-            <a:off x="452587" y="2635131"/>
-            <a:ext cx="5735781" cy="3785652"/>
+            <a:off x="452586" y="1674869"/>
+            <a:ext cx="5735781" cy="4154984"/>
           </a:xfrm>
           <a:prstGeom prst="rect">
             <a:avLst/>
@@ -7520,6 +8362,68 @@
                   </a:schemeClr>
                 </a:solidFill>
               </a:rPr>
+              <a:t>Old Twitter data was gathered from </a:t>
+            </a:r>
+            <a:r>
+              <a:rPr lang="en-US" sz="2400" dirty="0">
+                <a:solidFill>
+                  <a:schemeClr val="tx1">
+                    <a:lumMod val="65000"/>
+                    <a:lumOff val="35000"/>
+                  </a:schemeClr>
+                </a:solidFill>
+                <a:hlinkClick r:id="rId3"/>
+              </a:rPr>
+              <a:t>https://data.world/crowdflower/brands-and-product-emotions</a:t>
+            </a:r>
+            <a:r>
+              <a:rPr lang="en-US" sz="2400" dirty="0">
+                <a:solidFill>
+                  <a:schemeClr val="tx1">
+                    <a:lumMod val="65000"/>
+                    <a:lumOff val="35000"/>
+                  </a:schemeClr>
+                </a:solidFill>
+              </a:rPr>
+              <a:t>. After cleaning, 8,306 total tweets remained in the old </a:t>
+            </a:r>
+            <a:r>
+              <a:rPr lang="en-US" sz="2400">
+                <a:solidFill>
+                  <a:schemeClr val="tx1">
+                    <a:lumMod val="65000"/>
+                    <a:lumOff val="35000"/>
+                  </a:schemeClr>
+                </a:solidFill>
+              </a:rPr>
+              <a:t>Twitter data frame</a:t>
+            </a:r>
+            <a:r>
+              <a:rPr lang="en-US" sz="2400" dirty="0">
+                <a:solidFill>
+                  <a:schemeClr val="tx1">
+                    <a:lumMod val="65000"/>
+                    <a:lumOff val="35000"/>
+                  </a:schemeClr>
+                </a:solidFill>
+              </a:rPr>
+              <a:t>.</a:t>
+            </a:r>
+          </a:p>
+          <a:p>
+            <a:pPr marL="342900" indent="-342900">
+              <a:buFont typeface="Arial" panose="020B0604020202020204" pitchFamily="34" charset="0"/>
+              <a:buChar char="•"/>
+            </a:pPr>
+            <a:r>
+              <a:rPr lang="en-US" sz="2400" dirty="0">
+                <a:solidFill>
+                  <a:schemeClr val="tx1">
+                    <a:lumMod val="65000"/>
+                    <a:lumOff val="35000"/>
+                  </a:schemeClr>
+                </a:solidFill>
+              </a:rPr>
               <a:t>Using </a:t>
             </a:r>
             <a:r>
@@ -7542,7 +8446,7 @@
                   </a:schemeClr>
                 </a:solidFill>
               </a:rPr>
-              <a:t> and Twitter's Developer API, I was able to gather around 3,000 current user tweets about these companies. </a:t>
+              <a:t> and Twitter's Developer API, I collected 1,500 tweets per company, but around 1/3 of the tweets were not related to the company. </a:t>
             </a:r>
           </a:p>
           <a:p>
@@ -7559,24 +8463,7 @@
                   </a:schemeClr>
                 </a:solidFill>
               </a:rPr>
-              <a:t>For each company, I collected 1,500 tweets, but around 1/3 of the tweets did not contain any information of said companies.</a:t>
-            </a:r>
-          </a:p>
-          <a:p>
-            <a:pPr marL="342900" indent="-342900">
-              <a:buFont typeface="Arial" panose="020B0604020202020204" pitchFamily="34" charset="0"/>
-              <a:buChar char="•"/>
-            </a:pPr>
-            <a:r>
-              <a:rPr lang="en-US" sz="2400" dirty="0">
-                <a:solidFill>
-                  <a:schemeClr val="tx1">
-                    <a:lumMod val="65000"/>
-                    <a:lumOff val="35000"/>
-                  </a:schemeClr>
-                </a:solidFill>
-              </a:rPr>
-              <a:t>The data containing older tweets were provided.</a:t>
+              <a:t>After cleaning, 3,405 tweets remained in the new Twitter data frame. </a:t>
             </a:r>
           </a:p>
         </p:txBody>
@@ -7595,7 +8482,7 @@
         </p:nvSpPr>
         <p:spPr>
           <a:xfrm>
-            <a:off x="1299059" y="1744818"/>
+            <a:off x="1299058" y="966983"/>
             <a:ext cx="4042838" cy="707886"/>
           </a:xfrm>
           <a:prstGeom prst="rect">
@@ -7908,7 +8795,7 @@
         <p:spPr>
           <a:xfrm>
             <a:off x="513806" y="1590101"/>
-            <a:ext cx="4362994" cy="4893647"/>
+            <a:ext cx="4362994" cy="1200329"/>
           </a:xfrm>
           <a:prstGeom prst="rect">
             <a:avLst/>
@@ -7933,63 +8820,7 @@
                   </a:schemeClr>
                 </a:solidFill>
               </a:rPr>
-              <a:t>For each old and new tweets, Random Forest Modeling and Naïve Bayesian Modeling were performed. </a:t>
-            </a:r>
-          </a:p>
-          <a:p>
-            <a:pPr marL="342900" indent="-342900">
-              <a:buFont typeface="Arial" panose="020B0604020202020204" pitchFamily="34" charset="0"/>
-              <a:buChar char="•"/>
-            </a:pPr>
-            <a:r>
-              <a:rPr lang="en-US" sz="2400" dirty="0">
-                <a:solidFill>
-                  <a:schemeClr val="tx1">
-                    <a:lumMod val="65000"/>
-                    <a:lumOff val="35000"/>
-                  </a:schemeClr>
-                </a:solidFill>
-              </a:rPr>
-              <a:t>The image on the right shows the confusion matrix of the random forest model after the </a:t>
-            </a:r>
-            <a:r>
-              <a:rPr lang="en-US" sz="2400" dirty="0" err="1">
-                <a:solidFill>
-                  <a:schemeClr val="tx1">
-                    <a:lumMod val="65000"/>
-                    <a:lumOff val="35000"/>
-                  </a:schemeClr>
-                </a:solidFill>
-              </a:rPr>
-              <a:t>gridsearch</a:t>
-            </a:r>
-            <a:r>
-              <a:rPr lang="en-US" sz="2400" dirty="0">
-                <a:solidFill>
-                  <a:schemeClr val="tx1">
-                    <a:lumMod val="65000"/>
-                    <a:lumOff val="35000"/>
-                  </a:schemeClr>
-                </a:solidFill>
-              </a:rPr>
-              <a:t> was performed. </a:t>
-            </a:r>
-          </a:p>
-          <a:p>
-            <a:pPr marL="342900" indent="-342900">
-              <a:buFont typeface="Arial" panose="020B0604020202020204" pitchFamily="34" charset="0"/>
-              <a:buChar char="•"/>
-            </a:pPr>
-            <a:r>
-              <a:rPr lang="en-US" sz="2400" dirty="0">
-                <a:solidFill>
-                  <a:schemeClr val="tx1">
-                    <a:lumMod val="65000"/>
-                    <a:lumOff val="35000"/>
-                  </a:schemeClr>
-                </a:solidFill>
-              </a:rPr>
-              <a:t>As shown before, the number of negative tweets were far less, which resulted in the low recall score for the negative tweets.</a:t>
+              <a:t>Because of the small number of negative tweets, the recall score for 'Negative' is low. </a:t>
             </a:r>
           </a:p>
         </p:txBody>
@@ -8009,7 +8840,7 @@
           <p:nvPr/>
         </p:nvPicPr>
         <p:blipFill rotWithShape="1">
-          <a:blip r:embed="rId2">
+          <a:blip r:embed="rId3">
             <a:extLst>
               <a:ext uri="{28A0092B-C50C-407E-A947-70E740481C1C}">
                 <a14:useLocalDpi xmlns:a14="http://schemas.microsoft.com/office/drawing/2010/main" val="0"/>
@@ -8023,6 +8854,42 @@
           <a:xfrm>
             <a:off x="5728062" y="463536"/>
             <a:ext cx="5625738" cy="6316087"/>
+          </a:xfrm>
+          <a:prstGeom prst="rect">
+            <a:avLst/>
+          </a:prstGeom>
+        </p:spPr>
+      </p:pic>
+      <p:pic>
+        <p:nvPicPr>
+          <p:cNvPr id="5" name="Picture 4" descr="Chart&#10;&#10;Description automatically generated">
+            <a:extLst>
+              <a:ext uri="{FF2B5EF4-FFF2-40B4-BE49-F238E27FC236}">
+                <a16:creationId xmlns:a16="http://schemas.microsoft.com/office/drawing/2014/main" id="{68ACC0C9-CA21-4701-80C6-BEB6611BD461}"/>
+              </a:ext>
+            </a:extLst>
+          </p:cNvPr>
+          <p:cNvPicPr>
+            <a:picLocks noChangeAspect="1"/>
+          </p:cNvPicPr>
+          <p:nvPr/>
+        </p:nvPicPr>
+        <p:blipFill>
+          <a:blip r:embed="rId4">
+            <a:extLst>
+              <a:ext uri="{28A0092B-C50C-407E-A947-70E740481C1C}">
+                <a14:useLocalDpi xmlns:a14="http://schemas.microsoft.com/office/drawing/2010/main" val="0"/>
+              </a:ext>
+            </a:extLst>
+          </a:blip>
+          <a:stretch>
+            <a:fillRect/>
+          </a:stretch>
+        </p:blipFill>
+        <p:spPr>
+          <a:xfrm>
+            <a:off x="141706" y="3129651"/>
+            <a:ext cx="5160725" cy="3301629"/>
           </a:xfrm>
           <a:prstGeom prst="rect">
             <a:avLst/>
@@ -8077,8 +8944,8 @@
         </p:nvSpPr>
         <p:spPr>
           <a:xfrm>
-            <a:off x="7734300" y="163481"/>
-            <a:ext cx="3619500" cy="739056"/>
+            <a:off x="7415408" y="0"/>
+            <a:ext cx="4559475" cy="739056"/>
           </a:xfrm>
         </p:spPr>
         <p:txBody>
@@ -8087,14 +8954,10 @@
           </a:bodyPr>
           <a:lstStyle/>
           <a:p>
-            <a:pPr algn="r"/>
             <a:r>
               <a:rPr lang="en-US" dirty="0"/>
-              <a:t>Random Forest </a:t>
-            </a:r>
-            <a:br>
-              <a:rPr lang="en-US" dirty="0"/>
-            </a:br>
+              <a:t>Random Forest with Grid Search </a:t>
+            </a:r>
             <a:r>
               <a:rPr lang="en-US" sz="2700" dirty="0"/>
               <a:t>(New Tweets)</a:t>
@@ -8117,8 +8980,8 @@
         </p:nvSpPr>
         <p:spPr>
           <a:xfrm>
-            <a:off x="6819900" y="1500817"/>
-            <a:ext cx="4695825" cy="4524315"/>
+            <a:off x="6519276" y="929866"/>
+            <a:ext cx="5625738" cy="1938992"/>
           </a:xfrm>
           <a:prstGeom prst="rect">
             <a:avLst/>
@@ -8143,7 +9006,7 @@
                   </a:schemeClr>
                 </a:solidFill>
               </a:rPr>
-              <a:t>The recall score of the random forest model with grid search for the new tweets also show the same problem.</a:t>
+              <a:t>Same problem as the old tweets</a:t>
             </a:r>
           </a:p>
           <a:p>
@@ -8160,29 +9023,7 @@
                   </a:schemeClr>
                 </a:solidFill>
               </a:rPr>
-              <a:t>However, I would still recommend this model (random forest with </a:t>
-            </a:r>
-            <a:r>
-              <a:rPr lang="en-US" sz="2400" dirty="0" err="1">
-                <a:solidFill>
-                  <a:schemeClr val="tx1">
-                    <a:lumMod val="65000"/>
-                    <a:lumOff val="35000"/>
-                  </a:schemeClr>
-                </a:solidFill>
-              </a:rPr>
-              <a:t>gridsearch</a:t>
-            </a:r>
-            <a:r>
-              <a:rPr lang="en-US" sz="2400" dirty="0">
-                <a:solidFill>
-                  <a:schemeClr val="tx1">
-                    <a:lumMod val="65000"/>
-                    <a:lumOff val="35000"/>
-                  </a:schemeClr>
-                </a:solidFill>
-              </a:rPr>
-              <a:t>) above others because it was able to maintain a relatively high recalls core for the positive and neutral tweets while improving the recall score for the negative tweets.</a:t>
+              <a:t>Still recommended because it was able to maintain a relatively high recall scores while improving the recall score for the negative tweets.</a:t>
             </a:r>
           </a:p>
         </p:txBody>
@@ -8202,7 +9043,7 @@
           <p:nvPr/>
         </p:nvPicPr>
         <p:blipFill>
-          <a:blip r:embed="rId2">
+          <a:blip r:embed="rId3">
             <a:extLst>
               <a:ext uri="{28A0092B-C50C-407E-A947-70E740481C1C}">
                 <a14:useLocalDpi xmlns:a14="http://schemas.microsoft.com/office/drawing/2010/main" val="0"/>
@@ -8214,8 +9055,44 @@
         </p:blipFill>
         <p:spPr>
           <a:xfrm>
-            <a:off x="676275" y="350129"/>
+            <a:off x="206730" y="270956"/>
             <a:ext cx="5625738" cy="6316087"/>
+          </a:xfrm>
+          <a:prstGeom prst="rect">
+            <a:avLst/>
+          </a:prstGeom>
+        </p:spPr>
+      </p:pic>
+      <p:pic>
+        <p:nvPicPr>
+          <p:cNvPr id="5" name="Picture 4" descr="Chart&#10;&#10;Description automatically generated with medium confidence">
+            <a:extLst>
+              <a:ext uri="{FF2B5EF4-FFF2-40B4-BE49-F238E27FC236}">
+                <a16:creationId xmlns:a16="http://schemas.microsoft.com/office/drawing/2014/main" id="{1D4E65B8-2E38-4B2C-BF83-1AF8A17A6A3D}"/>
+              </a:ext>
+            </a:extLst>
+          </p:cNvPr>
+          <p:cNvPicPr>
+            <a:picLocks noChangeAspect="1"/>
+          </p:cNvPicPr>
+          <p:nvPr/>
+        </p:nvPicPr>
+        <p:blipFill>
+          <a:blip r:embed="rId4">
+            <a:extLst>
+              <a:ext uri="{28A0092B-C50C-407E-A947-70E740481C1C}">
+                <a14:useLocalDpi xmlns:a14="http://schemas.microsoft.com/office/drawing/2010/main" val="0"/>
+              </a:ext>
+            </a:extLst>
+          </a:blip>
+          <a:stretch>
+            <a:fillRect/>
+          </a:stretch>
+        </p:blipFill>
+        <p:spPr>
+          <a:xfrm>
+            <a:off x="6142417" y="2866782"/>
+            <a:ext cx="5832466" cy="3720261"/>
           </a:xfrm>
           <a:prstGeom prst="rect">
             <a:avLst/>
@@ -8236,193 +9113,6 @@
 </file>
 
 <file path=ppt/slides/slide7.xml><?xml version="1.0" encoding="utf-8"?>
-<p:sld xmlns:a="http://schemas.openxmlformats.org/drawingml/2006/main" xmlns:r="http://schemas.openxmlformats.org/officeDocument/2006/relationships" xmlns:p="http://schemas.openxmlformats.org/presentationml/2006/main">
-  <p:cSld>
-    <p:spTree>
-      <p:nvGrpSpPr>
-        <p:cNvPr id="1" name=""/>
-        <p:cNvGrpSpPr/>
-        <p:nvPr/>
-      </p:nvGrpSpPr>
-      <p:grpSpPr>
-        <a:xfrm>
-          <a:off x="0" y="0"/>
-          <a:ext cx="0" cy="0"/>
-          <a:chOff x="0" y="0"/>
-          <a:chExt cx="0" cy="0"/>
-        </a:xfrm>
-      </p:grpSpPr>
-      <p:sp>
-        <p:nvSpPr>
-          <p:cNvPr id="2" name="Title 1">
-            <a:extLst>
-              <a:ext uri="{FF2B5EF4-FFF2-40B4-BE49-F238E27FC236}">
-                <a16:creationId xmlns:a16="http://schemas.microsoft.com/office/drawing/2014/main" id="{E1F3A353-7CD0-4CD6-A75C-B3EBBF266B81}"/>
-              </a:ext>
-            </a:extLst>
-          </p:cNvPr>
-          <p:cNvSpPr>
-            <a:spLocks noGrp="1"/>
-          </p:cNvSpPr>
-          <p:nvPr>
-            <p:ph type="title"/>
-          </p:nvPr>
-        </p:nvSpPr>
-        <p:spPr/>
-        <p:txBody>
-          <a:bodyPr>
-            <a:normAutofit fontScale="90000"/>
-          </a:bodyPr>
-          <a:lstStyle/>
-          <a:p>
-            <a:r>
-              <a:rPr lang="en-US" dirty="0"/>
-              <a:t>Naïve Bayesian Model</a:t>
-            </a:r>
-            <a:br>
-              <a:rPr lang="en-US" dirty="0"/>
-            </a:br>
-            <a:r>
-              <a:rPr lang="en-US" sz="2700" dirty="0"/>
-              <a:t>(Old Tweets)</a:t>
-            </a:r>
-            <a:endParaRPr lang="en-US" dirty="0"/>
-          </a:p>
-        </p:txBody>
-      </p:sp>
-      <p:sp>
-        <p:nvSpPr>
-          <p:cNvPr id="3" name="Rectangle 2">
-            <a:extLst>
-              <a:ext uri="{FF2B5EF4-FFF2-40B4-BE49-F238E27FC236}">
-                <a16:creationId xmlns:a16="http://schemas.microsoft.com/office/drawing/2014/main" id="{80A2ACB0-6C3E-4982-B9E8-18534B673030}"/>
-              </a:ext>
-            </a:extLst>
-          </p:cNvPr>
-          <p:cNvSpPr/>
-          <p:nvPr/>
-        </p:nvSpPr>
-        <p:spPr>
-          <a:xfrm>
-            <a:off x="513806" y="1590101"/>
-            <a:ext cx="4362994" cy="3416320"/>
-          </a:xfrm>
-          <a:prstGeom prst="rect">
-            <a:avLst/>
-          </a:prstGeom>
-        </p:spPr>
-        <p:txBody>
-          <a:bodyPr wrap="square">
-            <a:spAutoFit/>
-          </a:bodyPr>
-          <a:lstStyle/>
-          <a:p>
-            <a:pPr marL="342900" indent="-342900">
-              <a:buFont typeface="Arial" panose="020B0604020202020204" pitchFamily="34" charset="0"/>
-              <a:buChar char="•"/>
-            </a:pPr>
-            <a:r>
-              <a:rPr lang="en-US" sz="2400" dirty="0">
-                <a:solidFill>
-                  <a:schemeClr val="tx1">
-                    <a:lumMod val="65000"/>
-                    <a:lumOff val="35000"/>
-                  </a:schemeClr>
-                </a:solidFill>
-              </a:rPr>
-              <a:t>The Naïve Bayesian model after the </a:t>
-            </a:r>
-            <a:r>
-              <a:rPr lang="en-US" sz="2400" dirty="0" err="1">
-                <a:solidFill>
-                  <a:schemeClr val="tx1">
-                    <a:lumMod val="65000"/>
-                    <a:lumOff val="35000"/>
-                  </a:schemeClr>
-                </a:solidFill>
-              </a:rPr>
-              <a:t>gridsearch</a:t>
-            </a:r>
-            <a:r>
-              <a:rPr lang="en-US" sz="2400" dirty="0">
-                <a:solidFill>
-                  <a:schemeClr val="tx1">
-                    <a:lumMod val="65000"/>
-                    <a:lumOff val="35000"/>
-                  </a:schemeClr>
-                </a:solidFill>
-              </a:rPr>
-              <a:t> also performed quite well.</a:t>
-            </a:r>
-          </a:p>
-          <a:p>
-            <a:pPr marL="342900" indent="-342900">
-              <a:buFont typeface="Arial" panose="020B0604020202020204" pitchFamily="34" charset="0"/>
-              <a:buChar char="•"/>
-            </a:pPr>
-            <a:r>
-              <a:rPr lang="en-US" sz="2400" dirty="0">
-                <a:solidFill>
-                  <a:schemeClr val="tx1">
-                    <a:lumMod val="65000"/>
-                    <a:lumOff val="35000"/>
-                  </a:schemeClr>
-                </a:solidFill>
-              </a:rPr>
-              <a:t>However, this model's recall score for the neutral and positive tweets were lower than that of the random forest model, hence why this model is not recommended.</a:t>
-            </a:r>
-          </a:p>
-        </p:txBody>
-      </p:sp>
-      <p:pic>
-        <p:nvPicPr>
-          <p:cNvPr id="6" name="Picture 5">
-            <a:extLst>
-              <a:ext uri="{FF2B5EF4-FFF2-40B4-BE49-F238E27FC236}">
-                <a16:creationId xmlns:a16="http://schemas.microsoft.com/office/drawing/2014/main" id="{1866F079-DEB8-4946-B4F0-5FA8A7317439}"/>
-              </a:ext>
-            </a:extLst>
-          </p:cNvPr>
-          <p:cNvPicPr>
-            <a:picLocks noChangeAspect="1"/>
-          </p:cNvPicPr>
-          <p:nvPr/>
-        </p:nvPicPr>
-        <p:blipFill>
-          <a:blip r:embed="rId2">
-            <a:extLst>
-              <a:ext uri="{28A0092B-C50C-407E-A947-70E740481C1C}">
-                <a14:useLocalDpi xmlns:a14="http://schemas.microsoft.com/office/drawing/2010/main" val="0"/>
-              </a:ext>
-            </a:extLst>
-          </a:blip>
-          <a:srcRect t="1037" b="1037"/>
-          <a:stretch/>
-        </p:blipFill>
-        <p:spPr>
-          <a:xfrm>
-            <a:off x="5728062" y="463536"/>
-            <a:ext cx="5625738" cy="6316087"/>
-          </a:xfrm>
-          <a:prstGeom prst="rect">
-            <a:avLst/>
-          </a:prstGeom>
-        </p:spPr>
-      </p:pic>
-    </p:spTree>
-    <p:extLst>
-      <p:ext uri="{BB962C8B-B14F-4D97-AF65-F5344CB8AC3E}">
-        <p14:creationId xmlns:p14="http://schemas.microsoft.com/office/powerpoint/2010/main" val="426929613"/>
-      </p:ext>
-    </p:extLst>
-  </p:cSld>
-  <p:clrMapOvr>
-    <a:masterClrMapping/>
-  </p:clrMapOvr>
-</p:sld>
-</file>
-
-<file path=ppt/slides/slide8.xml><?xml version="1.0" encoding="utf-8"?>
 <p:sld xmlns:a="http://schemas.openxmlformats.org/drawingml/2006/main" xmlns:r="http://schemas.openxmlformats.org/officeDocument/2006/relationships" xmlns:p="http://schemas.openxmlformats.org/presentationml/2006/main">
   <p:cSld>
     <p:bg>
@@ -8852,7 +9542,7 @@
       </p:sp>
       <p:pic>
         <p:nvPicPr>
-          <p:cNvPr id="7" name="Picture 6" descr="A screenshot of a computer&#10;&#10;Description automatically generated with medium confidence">
+          <p:cNvPr id="7" name="Picture 6">
             <a:extLst>
               <a:ext uri="{FF2B5EF4-FFF2-40B4-BE49-F238E27FC236}">
                 <a16:creationId xmlns:a16="http://schemas.microsoft.com/office/drawing/2014/main" id="{770260DC-5919-42FD-8B97-60A388787D49}"/>
@@ -8872,14 +9562,13 @@
               </a:ext>
             </a:extLst>
           </a:blip>
-          <a:stretch>
-            <a:fillRect/>
-          </a:stretch>
+          <a:srcRect/>
+          <a:stretch/>
         </p:blipFill>
         <p:spPr>
           <a:xfrm>
-            <a:off x="6138139" y="3118120"/>
-            <a:ext cx="5422355" cy="3483864"/>
+            <a:off x="6139644" y="2925356"/>
+            <a:ext cx="5419344" cy="3676628"/>
           </a:xfrm>
           <a:prstGeom prst="rect">
             <a:avLst/>
@@ -8888,7 +9577,7 @@
       </p:pic>
       <p:pic>
         <p:nvPicPr>
-          <p:cNvPr id="4" name="Picture 3" descr="A screenshot of a computer&#10;&#10;Description automatically generated with medium confidence">
+          <p:cNvPr id="4" name="Picture 3">
             <a:extLst>
               <a:ext uri="{FF2B5EF4-FFF2-40B4-BE49-F238E27FC236}">
                 <a16:creationId xmlns:a16="http://schemas.microsoft.com/office/drawing/2014/main" id="{1B613720-693C-4B67-8EAA-3635591E8FA4}"/>
@@ -8908,14 +9597,153 @@
               </a:ext>
             </a:extLst>
           </a:blip>
-          <a:stretch>
-            <a:fillRect/>
-          </a:stretch>
+          <a:srcRect/>
+          <a:stretch/>
         </p:blipFill>
         <p:spPr>
           <a:xfrm>
-            <a:off x="343644" y="3118120"/>
-            <a:ext cx="5422355" cy="3483864"/>
+            <a:off x="345149" y="2925356"/>
+            <a:ext cx="5419344" cy="3676628"/>
+          </a:xfrm>
+          <a:prstGeom prst="rect">
+            <a:avLst/>
+          </a:prstGeom>
+        </p:spPr>
+      </p:pic>
+    </p:spTree>
+    <p:extLst>
+      <p:ext uri="{BB962C8B-B14F-4D97-AF65-F5344CB8AC3E}">
+        <p14:creationId xmlns:p14="http://schemas.microsoft.com/office/powerpoint/2010/main" val="1638676338"/>
+      </p:ext>
+    </p:extLst>
+  </p:cSld>
+  <p:clrMapOvr>
+    <a:masterClrMapping/>
+  </p:clrMapOvr>
+</p:sld>
+</file>
+
+<file path=ppt/slides/slide8.xml><?xml version="1.0" encoding="utf-8"?>
+<p:sld xmlns:a="http://schemas.openxmlformats.org/drawingml/2006/main" xmlns:r="http://schemas.openxmlformats.org/officeDocument/2006/relationships" xmlns:p="http://schemas.openxmlformats.org/presentationml/2006/main">
+  <p:cSld>
+    <p:bg>
+      <p:bgPr>
+        <a:solidFill>
+          <a:schemeClr val="bg1">
+            <a:lumMod val="95000"/>
+          </a:schemeClr>
+        </a:solidFill>
+        <a:effectLst/>
+      </p:bgPr>
+    </p:bg>
+    <p:spTree>
+      <p:nvGrpSpPr>
+        <p:cNvPr id="1" name=""/>
+        <p:cNvGrpSpPr/>
+        <p:nvPr/>
+      </p:nvGrpSpPr>
+      <p:grpSpPr>
+        <a:xfrm>
+          <a:off x="0" y="0"/>
+          <a:ext cx="0" cy="0"/>
+          <a:chOff x="0" y="0"/>
+          <a:chExt cx="0" cy="0"/>
+        </a:xfrm>
+      </p:grpSpPr>
+      <p:sp>
+        <p:nvSpPr>
+          <p:cNvPr id="2" name="Title 1">
+            <a:extLst>
+              <a:ext uri="{FF2B5EF4-FFF2-40B4-BE49-F238E27FC236}">
+                <a16:creationId xmlns:a16="http://schemas.microsoft.com/office/drawing/2014/main" id="{33101823-B7E8-4F9B-B03F-29FC1BF88595}"/>
+              </a:ext>
+            </a:extLst>
+          </p:cNvPr>
+          <p:cNvSpPr>
+            <a:spLocks noGrp="1"/>
+          </p:cNvSpPr>
+          <p:nvPr>
+            <p:ph type="title"/>
+          </p:nvPr>
+        </p:nvSpPr>
+        <p:spPr/>
+        <p:txBody>
+          <a:bodyPr>
+            <a:normAutofit/>
+          </a:bodyPr>
+          <a:lstStyle/>
+          <a:p>
+            <a:r>
+              <a:rPr lang="en-US" dirty="0"/>
+              <a:t>Word Cloud Comparison: Apple</a:t>
+            </a:r>
+          </a:p>
+        </p:txBody>
+      </p:sp>
+      <p:pic>
+        <p:nvPicPr>
+          <p:cNvPr id="4" name="Picture 3">
+            <a:extLst>
+              <a:ext uri="{FF2B5EF4-FFF2-40B4-BE49-F238E27FC236}">
+                <a16:creationId xmlns:a16="http://schemas.microsoft.com/office/drawing/2014/main" id="{0D942AE8-A76D-4F0F-8500-E3EBE80A3E1B}"/>
+              </a:ext>
+            </a:extLst>
+          </p:cNvPr>
+          <p:cNvPicPr>
+            <a:picLocks noChangeAspect="1"/>
+          </p:cNvPicPr>
+          <p:nvPr/>
+        </p:nvPicPr>
+        <p:blipFill>
+          <a:blip r:embed="rId3">
+            <a:extLst>
+              <a:ext uri="{28A0092B-C50C-407E-A947-70E740481C1C}">
+                <a14:useLocalDpi xmlns:a14="http://schemas.microsoft.com/office/drawing/2010/main" val="0"/>
+              </a:ext>
+            </a:extLst>
+          </a:blip>
+          <a:srcRect/>
+          <a:stretch/>
+        </p:blipFill>
+        <p:spPr>
+          <a:xfrm>
+            <a:off x="316285" y="2276355"/>
+            <a:ext cx="5557626" cy="3420078"/>
+          </a:xfrm>
+          <a:prstGeom prst="rect">
+            <a:avLst/>
+          </a:prstGeom>
+        </p:spPr>
+      </p:pic>
+      <p:pic>
+        <p:nvPicPr>
+          <p:cNvPr id="6" name="Picture 5">
+            <a:extLst>
+              <a:ext uri="{FF2B5EF4-FFF2-40B4-BE49-F238E27FC236}">
+                <a16:creationId xmlns:a16="http://schemas.microsoft.com/office/drawing/2014/main" id="{3DA90E20-93E6-4C7E-A307-B0EA3EBB1432}"/>
+              </a:ext>
+            </a:extLst>
+          </p:cNvPr>
+          <p:cNvPicPr>
+            <a:picLocks noChangeAspect="1"/>
+          </p:cNvPicPr>
+          <p:nvPr/>
+        </p:nvPicPr>
+        <p:blipFill>
+          <a:blip r:embed="rId4">
+            <a:extLst>
+              <a:ext uri="{28A0092B-C50C-407E-A947-70E740481C1C}">
+                <a14:useLocalDpi xmlns:a14="http://schemas.microsoft.com/office/drawing/2010/main" val="0"/>
+              </a:ext>
+            </a:extLst>
+          </a:blip>
+          <a:srcRect/>
+          <a:stretch/>
+        </p:blipFill>
+        <p:spPr>
+          <a:xfrm>
+            <a:off x="6412374" y="2276354"/>
+            <a:ext cx="5557627" cy="3420078"/>
           </a:xfrm>
           <a:prstGeom prst="rect">
             <a:avLst/>
@@ -8924,10 +9752,10 @@
       </p:pic>
       <p:sp>
         <p:nvSpPr>
-          <p:cNvPr id="8" name="TextBox 7">
+          <p:cNvPr id="10" name="TextBox 9">
             <a:extLst>
               <a:ext uri="{FF2B5EF4-FFF2-40B4-BE49-F238E27FC236}">
-                <a16:creationId xmlns:a16="http://schemas.microsoft.com/office/drawing/2014/main" id="{6D3A73C2-C20F-47FA-91AF-509AE5877D1C}"/>
+                <a16:creationId xmlns:a16="http://schemas.microsoft.com/office/drawing/2014/main" id="{FAA0FBC2-A78B-427A-B244-5AEAF817997E}"/>
               </a:ext>
             </a:extLst>
           </p:cNvPr>
@@ -8936,7 +9764,7 @@
         </p:nvSpPr>
         <p:spPr>
           <a:xfrm>
-            <a:off x="1262743" y="2656114"/>
+            <a:off x="1320616" y="1741714"/>
             <a:ext cx="3446417" cy="369332"/>
           </a:xfrm>
           <a:prstGeom prst="rect">
@@ -8960,10 +9788,10 @@
       </p:sp>
       <p:sp>
         <p:nvSpPr>
-          <p:cNvPr id="20" name="TextBox 19">
+          <p:cNvPr id="11" name="TextBox 10">
             <a:extLst>
               <a:ext uri="{FF2B5EF4-FFF2-40B4-BE49-F238E27FC236}">
-                <a16:creationId xmlns:a16="http://schemas.microsoft.com/office/drawing/2014/main" id="{D49533F6-31C4-4F00-A756-297A6B1B70A8}"/>
+                <a16:creationId xmlns:a16="http://schemas.microsoft.com/office/drawing/2014/main" id="{0D545C37-A0EF-45E3-9977-C94B7D4E34ED}"/>
               </a:ext>
             </a:extLst>
           </p:cNvPr>
@@ -8972,7 +9800,7 @@
         </p:nvSpPr>
         <p:spPr>
           <a:xfrm>
-            <a:off x="7126107" y="2656114"/>
+            <a:off x="7183980" y="1741714"/>
             <a:ext cx="3446417" cy="369332"/>
           </a:xfrm>
           <a:prstGeom prst="rect">
@@ -8997,7 +9825,7 @@
     </p:spTree>
     <p:extLst>
       <p:ext uri="{BB962C8B-B14F-4D97-AF65-F5344CB8AC3E}">
-        <p14:creationId xmlns:p14="http://schemas.microsoft.com/office/powerpoint/2010/main" val="1638676338"/>
+        <p14:creationId xmlns:p14="http://schemas.microsoft.com/office/powerpoint/2010/main" val="756654474"/>
       </p:ext>
     </p:extLst>
   </p:cSld>
@@ -9478,8 +10306,8 @@
         </p:blipFill>
         <p:spPr>
           <a:xfrm>
-            <a:off x="6139644" y="3118120"/>
-            <a:ext cx="5419344" cy="3483864"/>
+            <a:off x="6139644" y="2925356"/>
+            <a:ext cx="5419344" cy="3676628"/>
           </a:xfrm>
           <a:prstGeom prst="rect">
             <a:avLst/>
@@ -9513,86 +10341,14 @@
         </p:blipFill>
         <p:spPr>
           <a:xfrm>
-            <a:off x="345149" y="3118120"/>
-            <a:ext cx="5419344" cy="3483864"/>
+            <a:off x="345149" y="2925356"/>
+            <a:ext cx="5419344" cy="3676628"/>
           </a:xfrm>
           <a:prstGeom prst="rect">
             <a:avLst/>
           </a:prstGeom>
         </p:spPr>
       </p:pic>
-      <p:sp>
-        <p:nvSpPr>
-          <p:cNvPr id="8" name="TextBox 7">
-            <a:extLst>
-              <a:ext uri="{FF2B5EF4-FFF2-40B4-BE49-F238E27FC236}">
-                <a16:creationId xmlns:a16="http://schemas.microsoft.com/office/drawing/2014/main" id="{6D3A73C2-C20F-47FA-91AF-509AE5877D1C}"/>
-              </a:ext>
-            </a:extLst>
-          </p:cNvPr>
-          <p:cNvSpPr txBox="1"/>
-          <p:nvPr/>
-        </p:nvSpPr>
-        <p:spPr>
-          <a:xfrm>
-            <a:off x="1262743" y="2656114"/>
-            <a:ext cx="3446417" cy="369332"/>
-          </a:xfrm>
-          <a:prstGeom prst="rect">
-            <a:avLst/>
-          </a:prstGeom>
-          <a:noFill/>
-        </p:spPr>
-        <p:txBody>
-          <a:bodyPr wrap="square" rtlCol="0">
-            <a:spAutoFit/>
-          </a:bodyPr>
-          <a:lstStyle/>
-          <a:p>
-            <a:pPr algn="ctr"/>
-            <a:r>
-              <a:rPr lang="en-US" dirty="0"/>
-              <a:t>Old</a:t>
-            </a:r>
-          </a:p>
-        </p:txBody>
-      </p:sp>
-      <p:sp>
-        <p:nvSpPr>
-          <p:cNvPr id="20" name="TextBox 19">
-            <a:extLst>
-              <a:ext uri="{FF2B5EF4-FFF2-40B4-BE49-F238E27FC236}">
-                <a16:creationId xmlns:a16="http://schemas.microsoft.com/office/drawing/2014/main" id="{D49533F6-31C4-4F00-A756-297A6B1B70A8}"/>
-              </a:ext>
-            </a:extLst>
-          </p:cNvPr>
-          <p:cNvSpPr txBox="1"/>
-          <p:nvPr/>
-        </p:nvSpPr>
-        <p:spPr>
-          <a:xfrm>
-            <a:off x="7126107" y="2656114"/>
-            <a:ext cx="3446417" cy="369332"/>
-          </a:xfrm>
-          <a:prstGeom prst="rect">
-            <a:avLst/>
-          </a:prstGeom>
-          <a:noFill/>
-        </p:spPr>
-        <p:txBody>
-          <a:bodyPr wrap="square" rtlCol="0">
-            <a:spAutoFit/>
-          </a:bodyPr>
-          <a:lstStyle/>
-          <a:p>
-            <a:pPr algn="ctr"/>
-            <a:r>
-              <a:rPr lang="en-US" dirty="0"/>
-              <a:t>New</a:t>
-            </a:r>
-          </a:p>
-        </p:txBody>
-      </p:sp>
     </p:spTree>
     <p:extLst>
       <p:ext uri="{BB962C8B-B14F-4D97-AF65-F5344CB8AC3E}">

</xml_diff>

<commit_message>
final update for ppt
</commit_message>
<xml_diff>
--- a/twitter.pptx
+++ b/twitter.pptx
@@ -228,7 +228,7 @@
           <a:p>
             <a:fld id="{3389243F-B1BB-4202-BD78-416ACA555174}" type="datetimeFigureOut">
               <a:rPr lang="en-US" smtClean="0"/>
-              <a:t>7/29/2021</a:t>
+              <a:t>7/30/2021</a:t>
             </a:fld>
             <a:endParaRPr lang="en-US"/>
           </a:p>
@@ -666,6 +666,101 @@
           <a:p>
             <a:fld id="{B68D2766-C49B-4C1A-9FEE-6F146754B02B}" type="slidenum">
               <a:rPr lang="en-US" smtClean="0"/>
+              <a:t>11</a:t>
+            </a:fld>
+            <a:endParaRPr lang="en-US"/>
+          </a:p>
+        </p:txBody>
+      </p:sp>
+    </p:spTree>
+    <p:extLst>
+      <p:ext uri="{BB962C8B-B14F-4D97-AF65-F5344CB8AC3E}">
+        <p14:creationId xmlns:p14="http://schemas.microsoft.com/office/powerpoint/2010/main" val="3944929242"/>
+      </p:ext>
+    </p:extLst>
+  </p:cSld>
+  <p:clrMapOvr>
+    <a:masterClrMapping/>
+  </p:clrMapOvr>
+</p:notes>
+</file>
+
+<file path=ppt/notesSlides/notesSlide11.xml><?xml version="1.0" encoding="utf-8"?>
+<p:notes xmlns:a="http://schemas.openxmlformats.org/drawingml/2006/main" xmlns:r="http://schemas.openxmlformats.org/officeDocument/2006/relationships" xmlns:p="http://schemas.openxmlformats.org/presentationml/2006/main">
+  <p:cSld>
+    <p:spTree>
+      <p:nvGrpSpPr>
+        <p:cNvPr id="1" name=""/>
+        <p:cNvGrpSpPr/>
+        <p:nvPr/>
+      </p:nvGrpSpPr>
+      <p:grpSpPr>
+        <a:xfrm>
+          <a:off x="0" y="0"/>
+          <a:ext cx="0" cy="0"/>
+          <a:chOff x="0" y="0"/>
+          <a:chExt cx="0" cy="0"/>
+        </a:xfrm>
+      </p:grpSpPr>
+      <p:sp>
+        <p:nvSpPr>
+          <p:cNvPr id="2" name="Slide Image Placeholder 1"/>
+          <p:cNvSpPr>
+            <a:spLocks noGrp="1" noRot="1" noChangeAspect="1"/>
+          </p:cNvSpPr>
+          <p:nvPr>
+            <p:ph type="sldImg"/>
+          </p:nvPr>
+        </p:nvSpPr>
+        <p:spPr/>
+      </p:sp>
+      <p:sp>
+        <p:nvSpPr>
+          <p:cNvPr id="3" name="Notes Placeholder 2"/>
+          <p:cNvSpPr>
+            <a:spLocks noGrp="1"/>
+          </p:cNvSpPr>
+          <p:nvPr>
+            <p:ph type="body" idx="1"/>
+          </p:nvPr>
+        </p:nvSpPr>
+        <p:spPr/>
+        <p:txBody>
+          <a:bodyPr/>
+          <a:lstStyle/>
+          <a:p>
+            <a:r>
+              <a:rPr lang="en-US"/>
+              <a:t>© Copyright </a:t>
+            </a:r>
+            <a:r>
+              <a:rPr lang="en-US" b="1"/>
+              <a:t>PresentationGO.com</a:t>
+            </a:r>
+            <a:r>
+              <a:rPr lang="en-US"/>
+              <a:t> – The free PowerPoint template library</a:t>
+            </a:r>
+          </a:p>
+        </p:txBody>
+      </p:sp>
+      <p:sp>
+        <p:nvSpPr>
+          <p:cNvPr id="4" name="Slide Number Placeholder 3"/>
+          <p:cNvSpPr>
+            <a:spLocks noGrp="1"/>
+          </p:cNvSpPr>
+          <p:nvPr>
+            <p:ph type="sldNum" sz="quarter" idx="10"/>
+          </p:nvPr>
+        </p:nvSpPr>
+        <p:spPr/>
+        <p:txBody>
+          <a:bodyPr/>
+          <a:lstStyle/>
+          <a:p>
+            <a:fld id="{B68D2766-C49B-4C1A-9FEE-6F146754B02B}" type="slidenum">
+              <a:rPr lang="en-US" smtClean="0"/>
               <a:t>12</a:t>
             </a:fld>
             <a:endParaRPr lang="en-US"/>
@@ -685,7 +780,7 @@
 </p:notes>
 </file>
 
-<file path=ppt/notesSlides/notesSlide11.xml><?xml version="1.0" encoding="utf-8"?>
+<file path=ppt/notesSlides/notesSlide12.xml><?xml version="1.0" encoding="utf-8"?>
 <p:notes xmlns:a="http://schemas.openxmlformats.org/drawingml/2006/main" xmlns:r="http://schemas.openxmlformats.org/officeDocument/2006/relationships" xmlns:p="http://schemas.openxmlformats.org/presentationml/2006/main">
   <p:cSld>
     <p:spTree>
@@ -932,7 +1027,7 @@
                   </a:schemeClr>
                 </a:solidFill>
               </a:rPr>
-              <a:t>For each old and new tweets, Random Forest Modeling and Naïve Bayesian Modeling were performed. </a:t>
+              <a:t>For both the old tweets and new tweets, there was an imbalance in the number of the three sentiments.</a:t>
             </a:r>
           </a:p>
           <a:p>
@@ -949,19 +1044,14 @@
                   </a:schemeClr>
                 </a:solidFill>
               </a:rPr>
-              <a:t>The image on the right shows the confusion matrix of the random forest model after the </a:t>
-            </a:r>
-            <a:r>
-              <a:rPr lang="en-US" sz="1200" dirty="0" err="1">
-                <a:solidFill>
-                  <a:schemeClr val="tx1">
-                    <a:lumMod val="65000"/>
-                    <a:lumOff val="35000"/>
-                  </a:schemeClr>
-                </a:solidFill>
-              </a:rPr>
-              <a:t>gridsearch</a:t>
-            </a:r>
+              <a:t>The top image represents the number of old tweets with the respective sentiments, and the bottom represents the new tweets with the respective sentiments.</a:t>
+            </a:r>
+          </a:p>
+          <a:p>
+            <a:pPr marL="342900" indent="-342900">
+              <a:buFont typeface="Arial" panose="020B0604020202020204" pitchFamily="34" charset="0"/>
+              <a:buChar char="•"/>
+            </a:pPr>
             <a:r>
               <a:rPr lang="en-US" sz="1200" dirty="0">
                 <a:solidFill>
@@ -971,24 +1061,7 @@
                   </a:schemeClr>
                 </a:solidFill>
               </a:rPr>
-              <a:t> was performed. </a:t>
-            </a:r>
-          </a:p>
-          <a:p>
-            <a:pPr marL="342900" indent="-342900">
-              <a:buFont typeface="Arial" panose="020B0604020202020204" pitchFamily="34" charset="0"/>
-              <a:buChar char="•"/>
-            </a:pPr>
-            <a:r>
-              <a:rPr lang="en-US" sz="1200" dirty="0">
-                <a:solidFill>
-                  <a:schemeClr val="tx1">
-                    <a:lumMod val="65000"/>
-                    <a:lumOff val="35000"/>
-                  </a:schemeClr>
-                </a:solidFill>
-              </a:rPr>
-              <a:t>As shown before, the number of negative tweets were far less, which resulted in the low recall score for the negative tweets.</a:t>
+              <a:t>For both old and new tweets, the number of negative tweets were around a third of the size of the neutral tweets and positive tweets.</a:t>
             </a:r>
           </a:p>
           <a:p>
@@ -1013,7 +1086,7 @@
           <a:p>
             <a:fld id="{B68D2766-C49B-4C1A-9FEE-6F146754B02B}" type="slidenum">
               <a:rPr lang="en-US" smtClean="0"/>
-              <a:t>5</a:t>
+              <a:t>4</a:t>
             </a:fld>
             <a:endParaRPr lang="en-US"/>
           </a:p>
@@ -1022,7 +1095,7 @@
     </p:spTree>
     <p:extLst>
       <p:ext uri="{BB962C8B-B14F-4D97-AF65-F5344CB8AC3E}">
-        <p14:creationId xmlns:p14="http://schemas.microsoft.com/office/powerpoint/2010/main" val="3997807056"/>
+        <p14:creationId xmlns:p14="http://schemas.microsoft.com/office/powerpoint/2010/main" val="985100449"/>
       </p:ext>
     </p:extLst>
   </p:cSld>
@@ -1089,7 +1162,7 @@
                   </a:schemeClr>
                 </a:solidFill>
               </a:rPr>
-              <a:t>The recall score of the random forest model with grid search for the new tweets also show the same problem.</a:t>
+              <a:t>For each old and new tweets, Random Forest Modeling and Naïve Bayesian Modeling were performed. </a:t>
             </a:r>
           </a:p>
           <a:p>
@@ -1106,7 +1179,7 @@
                   </a:schemeClr>
                 </a:solidFill>
               </a:rPr>
-              <a:t>However, I would still recommend this model (random forest with </a:t>
+              <a:t>The image on the right shows the confusion matrix of the random forest model after the </a:t>
             </a:r>
             <a:r>
               <a:rPr lang="en-US" sz="1200" dirty="0" err="1">
@@ -1128,7 +1201,24 @@
                   </a:schemeClr>
                 </a:solidFill>
               </a:rPr>
-              <a:t>) above others because it was able to maintain a relatively high recalls core for the positive and neutral tweets while improving the recall score for the negative tweets.</a:t>
+              <a:t> was performed. </a:t>
+            </a:r>
+          </a:p>
+          <a:p>
+            <a:pPr marL="342900" indent="-342900">
+              <a:buFont typeface="Arial" panose="020B0604020202020204" pitchFamily="34" charset="0"/>
+              <a:buChar char="•"/>
+            </a:pPr>
+            <a:r>
+              <a:rPr lang="en-US" sz="1200" dirty="0">
+                <a:solidFill>
+                  <a:schemeClr val="tx1">
+                    <a:lumMod val="65000"/>
+                    <a:lumOff val="35000"/>
+                  </a:schemeClr>
+                </a:solidFill>
+              </a:rPr>
+              <a:t>As shown before, the number of negative tweets were far less, which resulted in the low recall score for the negative tweets.</a:t>
             </a:r>
           </a:p>
           <a:p>
@@ -1153,7 +1243,7 @@
           <a:p>
             <a:fld id="{B68D2766-C49B-4C1A-9FEE-6F146754B02B}" type="slidenum">
               <a:rPr lang="en-US" smtClean="0"/>
-              <a:t>6</a:t>
+              <a:t>5</a:t>
             </a:fld>
             <a:endParaRPr lang="en-US"/>
           </a:p>
@@ -1162,7 +1252,7 @@
     </p:spTree>
     <p:extLst>
       <p:ext uri="{BB962C8B-B14F-4D97-AF65-F5344CB8AC3E}">
-        <p14:creationId xmlns:p14="http://schemas.microsoft.com/office/powerpoint/2010/main" val="69945339"/>
+        <p14:creationId xmlns:p14="http://schemas.microsoft.com/office/powerpoint/2010/main" val="3997807056"/>
       </p:ext>
     </p:extLst>
   </p:cSld>
@@ -1216,18 +1306,63 @@
           <a:bodyPr/>
           <a:lstStyle/>
           <a:p>
-            <a:r>
-              <a:rPr lang="en-US"/>
-              <a:t>© Copyright </a:t>
-            </a:r>
-            <a:r>
-              <a:rPr lang="en-US" b="1"/>
-              <a:t>PresentationGO.com</a:t>
-            </a:r>
-            <a:r>
-              <a:rPr lang="en-US"/>
-              <a:t> – The free PowerPoint template library</a:t>
-            </a:r>
+            <a:pPr marL="342900" indent="-342900">
+              <a:buFont typeface="Arial" panose="020B0604020202020204" pitchFamily="34" charset="0"/>
+              <a:buChar char="•"/>
+            </a:pPr>
+            <a:r>
+              <a:rPr lang="en-US" sz="1200" dirty="0">
+                <a:solidFill>
+                  <a:schemeClr val="tx1">
+                    <a:lumMod val="65000"/>
+                    <a:lumOff val="35000"/>
+                  </a:schemeClr>
+                </a:solidFill>
+              </a:rPr>
+              <a:t>The recall score of the random forest model with grid search for the new tweets also show the same problem.</a:t>
+            </a:r>
+          </a:p>
+          <a:p>
+            <a:pPr marL="342900" indent="-342900">
+              <a:buFont typeface="Arial" panose="020B0604020202020204" pitchFamily="34" charset="0"/>
+              <a:buChar char="•"/>
+            </a:pPr>
+            <a:r>
+              <a:rPr lang="en-US" sz="1200" dirty="0">
+                <a:solidFill>
+                  <a:schemeClr val="tx1">
+                    <a:lumMod val="65000"/>
+                    <a:lumOff val="35000"/>
+                  </a:schemeClr>
+                </a:solidFill>
+              </a:rPr>
+              <a:t>However, I would still recommend this model (random forest with </a:t>
+            </a:r>
+            <a:r>
+              <a:rPr lang="en-US" sz="1200" dirty="0" err="1">
+                <a:solidFill>
+                  <a:schemeClr val="tx1">
+                    <a:lumMod val="65000"/>
+                    <a:lumOff val="35000"/>
+                  </a:schemeClr>
+                </a:solidFill>
+              </a:rPr>
+              <a:t>gridsearch</a:t>
+            </a:r>
+            <a:r>
+              <a:rPr lang="en-US" sz="1200" dirty="0">
+                <a:solidFill>
+                  <a:schemeClr val="tx1">
+                    <a:lumMod val="65000"/>
+                    <a:lumOff val="35000"/>
+                  </a:schemeClr>
+                </a:solidFill>
+              </a:rPr>
+              <a:t>) above others because it was able to maintain a relatively high recalls core for the positive and neutral tweets while improving the recall score for the negative tweets.</a:t>
+            </a:r>
+          </a:p>
+          <a:p>
+            <a:endParaRPr lang="en-US" dirty="0"/>
           </a:p>
         </p:txBody>
       </p:sp>
@@ -1238,7 +1373,7 @@
             <a:spLocks noGrp="1"/>
           </p:cNvSpPr>
           <p:nvPr>
-            <p:ph type="sldNum" sz="quarter" idx="10"/>
+            <p:ph type="sldNum" sz="quarter" idx="5"/>
           </p:nvPr>
         </p:nvSpPr>
         <p:spPr/>
@@ -1248,7 +1383,7 @@
           <a:p>
             <a:fld id="{B68D2766-C49B-4C1A-9FEE-6F146754B02B}" type="slidenum">
               <a:rPr lang="en-US" smtClean="0"/>
-              <a:t>7</a:t>
+              <a:t>6</a:t>
             </a:fld>
             <a:endParaRPr lang="en-US"/>
           </a:p>
@@ -1257,7 +1392,7 @@
     </p:spTree>
     <p:extLst>
       <p:ext uri="{BB962C8B-B14F-4D97-AF65-F5344CB8AC3E}">
-        <p14:creationId xmlns:p14="http://schemas.microsoft.com/office/powerpoint/2010/main" val="1306669430"/>
+        <p14:creationId xmlns:p14="http://schemas.microsoft.com/office/powerpoint/2010/main" val="69945339"/>
       </p:ext>
     </p:extLst>
   </p:cSld>
@@ -1343,7 +1478,7 @@
           <a:p>
             <a:fld id="{B68D2766-C49B-4C1A-9FEE-6F146754B02B}" type="slidenum">
               <a:rPr lang="en-US" smtClean="0"/>
-              <a:t>8</a:t>
+              <a:t>7</a:t>
             </a:fld>
             <a:endParaRPr lang="en-US"/>
           </a:p>
@@ -1352,7 +1487,7 @@
     </p:spTree>
     <p:extLst>
       <p:ext uri="{BB962C8B-B14F-4D97-AF65-F5344CB8AC3E}">
-        <p14:creationId xmlns:p14="http://schemas.microsoft.com/office/powerpoint/2010/main" val="1201213236"/>
+        <p14:creationId xmlns:p14="http://schemas.microsoft.com/office/powerpoint/2010/main" val="1306669430"/>
       </p:ext>
     </p:extLst>
   </p:cSld>
@@ -1438,7 +1573,7 @@
           <a:p>
             <a:fld id="{B68D2766-C49B-4C1A-9FEE-6F146754B02B}" type="slidenum">
               <a:rPr lang="en-US" smtClean="0"/>
-              <a:t>9</a:t>
+              <a:t>8</a:t>
             </a:fld>
             <a:endParaRPr lang="en-US"/>
           </a:p>
@@ -1447,7 +1582,7 @@
     </p:spTree>
     <p:extLst>
       <p:ext uri="{BB962C8B-B14F-4D97-AF65-F5344CB8AC3E}">
-        <p14:creationId xmlns:p14="http://schemas.microsoft.com/office/powerpoint/2010/main" val="3607588145"/>
+        <p14:creationId xmlns:p14="http://schemas.microsoft.com/office/powerpoint/2010/main" val="1201213236"/>
       </p:ext>
     </p:extLst>
   </p:cSld>
@@ -1533,7 +1668,7 @@
           <a:p>
             <a:fld id="{B68D2766-C49B-4C1A-9FEE-6F146754B02B}" type="slidenum">
               <a:rPr lang="en-US" smtClean="0"/>
-              <a:t>10</a:t>
+              <a:t>9</a:t>
             </a:fld>
             <a:endParaRPr lang="en-US"/>
           </a:p>
@@ -1542,7 +1677,7 @@
     </p:spTree>
     <p:extLst>
       <p:ext uri="{BB962C8B-B14F-4D97-AF65-F5344CB8AC3E}">
-        <p14:creationId xmlns:p14="http://schemas.microsoft.com/office/powerpoint/2010/main" val="1288995506"/>
+        <p14:creationId xmlns:p14="http://schemas.microsoft.com/office/powerpoint/2010/main" val="3607588145"/>
       </p:ext>
     </p:extLst>
   </p:cSld>
@@ -1628,7 +1763,7 @@
           <a:p>
             <a:fld id="{B68D2766-C49B-4C1A-9FEE-6F146754B02B}" type="slidenum">
               <a:rPr lang="en-US" smtClean="0"/>
-              <a:t>11</a:t>
+              <a:t>10</a:t>
             </a:fld>
             <a:endParaRPr lang="en-US"/>
           </a:p>
@@ -1637,7 +1772,7 @@
     </p:spTree>
     <p:extLst>
       <p:ext uri="{BB962C8B-B14F-4D97-AF65-F5344CB8AC3E}">
-        <p14:creationId xmlns:p14="http://schemas.microsoft.com/office/powerpoint/2010/main" val="3944929242"/>
+        <p14:creationId xmlns:p14="http://schemas.microsoft.com/office/powerpoint/2010/main" val="1288995506"/>
       </p:ext>
     </p:extLst>
   </p:cSld>
@@ -4015,7 +4150,7 @@
           <a:p>
             <a:fld id="{997E942A-26CB-4FC8-A61F-ED7BAF06B75B}" type="datetimeFigureOut">
               <a:rPr lang="en-US" smtClean="0"/>
-              <a:t>7/29/2021</a:t>
+              <a:t>7/30/2021</a:t>
             </a:fld>
             <a:endParaRPr lang="en-US"/>
           </a:p>
@@ -8576,7 +8711,7 @@
           <p:nvPr/>
         </p:nvPicPr>
         <p:blipFill>
-          <a:blip r:embed="rId2">
+          <a:blip r:embed="rId3">
             <a:extLst>
               <a:ext uri="{28A0092B-C50C-407E-A947-70E740481C1C}">
                 <a14:useLocalDpi xmlns:a14="http://schemas.microsoft.com/office/drawing/2010/main" val="0"/>
@@ -8612,7 +8747,7 @@
           <p:nvPr/>
         </p:nvPicPr>
         <p:blipFill>
-          <a:blip r:embed="rId3">
+          <a:blip r:embed="rId4">
             <a:extLst>
               <a:ext uri="{28A0092B-C50C-407E-A947-70E740481C1C}">
                 <a14:useLocalDpi xmlns:a14="http://schemas.microsoft.com/office/drawing/2010/main" val="0"/>
@@ -8647,8 +8782,8 @@
         </p:nvSpPr>
         <p:spPr>
           <a:xfrm>
-            <a:off x="838200" y="1301631"/>
-            <a:ext cx="5000625" cy="4893647"/>
+            <a:off x="838200" y="2106503"/>
+            <a:ext cx="5000625" cy="2677656"/>
           </a:xfrm>
           <a:prstGeom prst="rect">
             <a:avLst/>
@@ -8673,7 +8808,7 @@
                   </a:schemeClr>
                 </a:solidFill>
               </a:rPr>
-              <a:t>For both the old tweets and new tweets, there was an imbalance in the number of the three sentiments.</a:t>
+              <a:t>There was an imbalance in the number of the three sentiments in both data frames.</a:t>
             </a:r>
           </a:p>
           <a:p>
@@ -8690,24 +8825,7 @@
                   </a:schemeClr>
                 </a:solidFill>
               </a:rPr>
-              <a:t>The top image represents the number of old tweets with the respective sentiments, and the bottom represents the new tweets with the respective sentiments.</a:t>
-            </a:r>
-          </a:p>
-          <a:p>
-            <a:pPr marL="342900" indent="-342900">
-              <a:buFont typeface="Arial" panose="020B0604020202020204" pitchFamily="34" charset="0"/>
-              <a:buChar char="•"/>
-            </a:pPr>
-            <a:r>
-              <a:rPr lang="en-US" sz="2400" dirty="0">
-                <a:solidFill>
-                  <a:schemeClr val="tx1">
-                    <a:lumMod val="65000"/>
-                    <a:lumOff val="35000"/>
-                  </a:schemeClr>
-                </a:solidFill>
-              </a:rPr>
-              <a:t>For both old and new tweets, the number of negative tweets were around a third of the size of the neutral tweets and positive tweets.</a:t>
+              <a:t>The number of negative tweets were around a third of the size of the neutral tweets and positive tweets.</a:t>
             </a:r>
           </a:p>
         </p:txBody>

</xml_diff>

<commit_message>
final update and readme look check
</commit_message>
<xml_diff>
--- a/twitter.pptx
+++ b/twitter.pptx
@@ -7,7 +7,7 @@
     <p:sldMasterId id="2147483692" r:id="rId3"/>
   </p:sldMasterIdLst>
   <p:notesMasterIdLst>
-    <p:notesMasterId r:id="rId23"/>
+    <p:notesMasterId r:id="rId26"/>
   </p:notesMasterIdLst>
   <p:sldIdLst>
     <p:sldId id="354" r:id="rId4"/>
@@ -17,18 +17,21 @@
     <p:sldId id="364" r:id="rId8"/>
     <p:sldId id="366" r:id="rId9"/>
     <p:sldId id="356" r:id="rId10"/>
-    <p:sldId id="359" r:id="rId11"/>
-    <p:sldId id="358" r:id="rId12"/>
-    <p:sldId id="360" r:id="rId13"/>
-    <p:sldId id="357" r:id="rId14"/>
-    <p:sldId id="361" r:id="rId15"/>
-    <p:sldId id="368" r:id="rId16"/>
-    <p:sldId id="362" r:id="rId17"/>
-    <p:sldId id="363" r:id="rId18"/>
-    <p:sldId id="369" r:id="rId19"/>
-    <p:sldId id="370" r:id="rId20"/>
-    <p:sldId id="371" r:id="rId21"/>
-    <p:sldId id="372" r:id="rId22"/>
+    <p:sldId id="373" r:id="rId11"/>
+    <p:sldId id="374" r:id="rId12"/>
+    <p:sldId id="358" r:id="rId13"/>
+    <p:sldId id="378" r:id="rId14"/>
+    <p:sldId id="379" r:id="rId15"/>
+    <p:sldId id="357" r:id="rId16"/>
+    <p:sldId id="375" r:id="rId17"/>
+    <p:sldId id="377" r:id="rId18"/>
+    <p:sldId id="368" r:id="rId19"/>
+    <p:sldId id="362" r:id="rId20"/>
+    <p:sldId id="363" r:id="rId21"/>
+    <p:sldId id="369" r:id="rId22"/>
+    <p:sldId id="370" r:id="rId23"/>
+    <p:sldId id="371" r:id="rId24"/>
+    <p:sldId id="372" r:id="rId25"/>
   </p:sldIdLst>
   <p:sldSz cx="12192000" cy="6858000"/>
   <p:notesSz cx="6858000" cy="9144000"/>
@@ -675,7 +678,7 @@
     </p:spTree>
     <p:extLst>
       <p:ext uri="{BB962C8B-B14F-4D97-AF65-F5344CB8AC3E}">
-        <p14:creationId xmlns:p14="http://schemas.microsoft.com/office/powerpoint/2010/main" val="3944929242"/>
+        <p14:creationId xmlns:p14="http://schemas.microsoft.com/office/powerpoint/2010/main" val="1781986893"/>
       </p:ext>
     </p:extLst>
   </p:cSld>
@@ -770,7 +773,7 @@
     </p:spTree>
     <p:extLst>
       <p:ext uri="{BB962C8B-B14F-4D97-AF65-F5344CB8AC3E}">
-        <p14:creationId xmlns:p14="http://schemas.microsoft.com/office/powerpoint/2010/main" val="326981967"/>
+        <p14:creationId xmlns:p14="http://schemas.microsoft.com/office/powerpoint/2010/main" val="4061844422"/>
       </p:ext>
     </p:extLst>
   </p:cSld>
@@ -857,6 +860,291 @@
             <a:fld id="{B68D2766-C49B-4C1A-9FEE-6F146754B02B}" type="slidenum">
               <a:rPr lang="en-US" smtClean="0"/>
               <a:t>13</a:t>
+            </a:fld>
+            <a:endParaRPr lang="en-US"/>
+          </a:p>
+        </p:txBody>
+      </p:sp>
+    </p:spTree>
+    <p:extLst>
+      <p:ext uri="{BB962C8B-B14F-4D97-AF65-F5344CB8AC3E}">
+        <p14:creationId xmlns:p14="http://schemas.microsoft.com/office/powerpoint/2010/main" val="3944929242"/>
+      </p:ext>
+    </p:extLst>
+  </p:cSld>
+  <p:clrMapOvr>
+    <a:masterClrMapping/>
+  </p:clrMapOvr>
+</p:notes>
+</file>
+
+<file path=ppt/notesSlides/notesSlide13.xml><?xml version="1.0" encoding="utf-8"?>
+<p:notes xmlns:a="http://schemas.openxmlformats.org/drawingml/2006/main" xmlns:r="http://schemas.openxmlformats.org/officeDocument/2006/relationships" xmlns:p="http://schemas.openxmlformats.org/presentationml/2006/main">
+  <p:cSld>
+    <p:spTree>
+      <p:nvGrpSpPr>
+        <p:cNvPr id="1" name=""/>
+        <p:cNvGrpSpPr/>
+        <p:nvPr/>
+      </p:nvGrpSpPr>
+      <p:grpSpPr>
+        <a:xfrm>
+          <a:off x="0" y="0"/>
+          <a:ext cx="0" cy="0"/>
+          <a:chOff x="0" y="0"/>
+          <a:chExt cx="0" cy="0"/>
+        </a:xfrm>
+      </p:grpSpPr>
+      <p:sp>
+        <p:nvSpPr>
+          <p:cNvPr id="2" name="Slide Image Placeholder 1"/>
+          <p:cNvSpPr>
+            <a:spLocks noGrp="1" noRot="1" noChangeAspect="1"/>
+          </p:cNvSpPr>
+          <p:nvPr>
+            <p:ph type="sldImg"/>
+          </p:nvPr>
+        </p:nvSpPr>
+        <p:spPr/>
+      </p:sp>
+      <p:sp>
+        <p:nvSpPr>
+          <p:cNvPr id="3" name="Notes Placeholder 2"/>
+          <p:cNvSpPr>
+            <a:spLocks noGrp="1"/>
+          </p:cNvSpPr>
+          <p:nvPr>
+            <p:ph type="body" idx="1"/>
+          </p:nvPr>
+        </p:nvSpPr>
+        <p:spPr/>
+        <p:txBody>
+          <a:bodyPr/>
+          <a:lstStyle/>
+          <a:p>
+            <a:r>
+              <a:rPr lang="en-US"/>
+              <a:t>© Copyright </a:t>
+            </a:r>
+            <a:r>
+              <a:rPr lang="en-US" b="1"/>
+              <a:t>PresentationGO.com</a:t>
+            </a:r>
+            <a:r>
+              <a:rPr lang="en-US"/>
+              <a:t> – The free PowerPoint template library</a:t>
+            </a:r>
+          </a:p>
+        </p:txBody>
+      </p:sp>
+      <p:sp>
+        <p:nvSpPr>
+          <p:cNvPr id="4" name="Slide Number Placeholder 3"/>
+          <p:cNvSpPr>
+            <a:spLocks noGrp="1"/>
+          </p:cNvSpPr>
+          <p:nvPr>
+            <p:ph type="sldNum" sz="quarter" idx="10"/>
+          </p:nvPr>
+        </p:nvSpPr>
+        <p:spPr/>
+        <p:txBody>
+          <a:bodyPr/>
+          <a:lstStyle/>
+          <a:p>
+            <a:fld id="{B68D2766-C49B-4C1A-9FEE-6F146754B02B}" type="slidenum">
+              <a:rPr lang="en-US" smtClean="0"/>
+              <a:t>14</a:t>
+            </a:fld>
+            <a:endParaRPr lang="en-US"/>
+          </a:p>
+        </p:txBody>
+      </p:sp>
+    </p:spTree>
+    <p:extLst>
+      <p:ext uri="{BB962C8B-B14F-4D97-AF65-F5344CB8AC3E}">
+        <p14:creationId xmlns:p14="http://schemas.microsoft.com/office/powerpoint/2010/main" val="982085106"/>
+      </p:ext>
+    </p:extLst>
+  </p:cSld>
+  <p:clrMapOvr>
+    <a:masterClrMapping/>
+  </p:clrMapOvr>
+</p:notes>
+</file>
+
+<file path=ppt/notesSlides/notesSlide14.xml><?xml version="1.0" encoding="utf-8"?>
+<p:notes xmlns:a="http://schemas.openxmlformats.org/drawingml/2006/main" xmlns:r="http://schemas.openxmlformats.org/officeDocument/2006/relationships" xmlns:p="http://schemas.openxmlformats.org/presentationml/2006/main">
+  <p:cSld>
+    <p:spTree>
+      <p:nvGrpSpPr>
+        <p:cNvPr id="1" name=""/>
+        <p:cNvGrpSpPr/>
+        <p:nvPr/>
+      </p:nvGrpSpPr>
+      <p:grpSpPr>
+        <a:xfrm>
+          <a:off x="0" y="0"/>
+          <a:ext cx="0" cy="0"/>
+          <a:chOff x="0" y="0"/>
+          <a:chExt cx="0" cy="0"/>
+        </a:xfrm>
+      </p:grpSpPr>
+      <p:sp>
+        <p:nvSpPr>
+          <p:cNvPr id="2" name="Slide Image Placeholder 1"/>
+          <p:cNvSpPr>
+            <a:spLocks noGrp="1" noRot="1" noChangeAspect="1"/>
+          </p:cNvSpPr>
+          <p:nvPr>
+            <p:ph type="sldImg"/>
+          </p:nvPr>
+        </p:nvSpPr>
+        <p:spPr/>
+      </p:sp>
+      <p:sp>
+        <p:nvSpPr>
+          <p:cNvPr id="3" name="Notes Placeholder 2"/>
+          <p:cNvSpPr>
+            <a:spLocks noGrp="1"/>
+          </p:cNvSpPr>
+          <p:nvPr>
+            <p:ph type="body" idx="1"/>
+          </p:nvPr>
+        </p:nvSpPr>
+        <p:spPr/>
+        <p:txBody>
+          <a:bodyPr/>
+          <a:lstStyle/>
+          <a:p>
+            <a:r>
+              <a:rPr lang="en-US"/>
+              <a:t>© Copyright </a:t>
+            </a:r>
+            <a:r>
+              <a:rPr lang="en-US" b="1"/>
+              <a:t>PresentationGO.com</a:t>
+            </a:r>
+            <a:r>
+              <a:rPr lang="en-US"/>
+              <a:t> – The free PowerPoint template library</a:t>
+            </a:r>
+          </a:p>
+        </p:txBody>
+      </p:sp>
+      <p:sp>
+        <p:nvSpPr>
+          <p:cNvPr id="4" name="Slide Number Placeholder 3"/>
+          <p:cNvSpPr>
+            <a:spLocks noGrp="1"/>
+          </p:cNvSpPr>
+          <p:nvPr>
+            <p:ph type="sldNum" sz="quarter" idx="10"/>
+          </p:nvPr>
+        </p:nvSpPr>
+        <p:spPr/>
+        <p:txBody>
+          <a:bodyPr/>
+          <a:lstStyle/>
+          <a:p>
+            <a:fld id="{B68D2766-C49B-4C1A-9FEE-6F146754B02B}" type="slidenum">
+              <a:rPr lang="en-US" smtClean="0"/>
+              <a:t>15</a:t>
+            </a:fld>
+            <a:endParaRPr lang="en-US"/>
+          </a:p>
+        </p:txBody>
+      </p:sp>
+    </p:spTree>
+    <p:extLst>
+      <p:ext uri="{BB962C8B-B14F-4D97-AF65-F5344CB8AC3E}">
+        <p14:creationId xmlns:p14="http://schemas.microsoft.com/office/powerpoint/2010/main" val="3059802035"/>
+      </p:ext>
+    </p:extLst>
+  </p:cSld>
+  <p:clrMapOvr>
+    <a:masterClrMapping/>
+  </p:clrMapOvr>
+</p:notes>
+</file>
+
+<file path=ppt/notesSlides/notesSlide15.xml><?xml version="1.0" encoding="utf-8"?>
+<p:notes xmlns:a="http://schemas.openxmlformats.org/drawingml/2006/main" xmlns:r="http://schemas.openxmlformats.org/officeDocument/2006/relationships" xmlns:p="http://schemas.openxmlformats.org/presentationml/2006/main">
+  <p:cSld>
+    <p:spTree>
+      <p:nvGrpSpPr>
+        <p:cNvPr id="1" name=""/>
+        <p:cNvGrpSpPr/>
+        <p:nvPr/>
+      </p:nvGrpSpPr>
+      <p:grpSpPr>
+        <a:xfrm>
+          <a:off x="0" y="0"/>
+          <a:ext cx="0" cy="0"/>
+          <a:chOff x="0" y="0"/>
+          <a:chExt cx="0" cy="0"/>
+        </a:xfrm>
+      </p:grpSpPr>
+      <p:sp>
+        <p:nvSpPr>
+          <p:cNvPr id="2" name="Slide Image Placeholder 1"/>
+          <p:cNvSpPr>
+            <a:spLocks noGrp="1" noRot="1" noChangeAspect="1"/>
+          </p:cNvSpPr>
+          <p:nvPr>
+            <p:ph type="sldImg"/>
+          </p:nvPr>
+        </p:nvSpPr>
+        <p:spPr/>
+      </p:sp>
+      <p:sp>
+        <p:nvSpPr>
+          <p:cNvPr id="3" name="Notes Placeholder 2"/>
+          <p:cNvSpPr>
+            <a:spLocks noGrp="1"/>
+          </p:cNvSpPr>
+          <p:nvPr>
+            <p:ph type="body" idx="1"/>
+          </p:nvPr>
+        </p:nvSpPr>
+        <p:spPr/>
+        <p:txBody>
+          <a:bodyPr/>
+          <a:lstStyle/>
+          <a:p>
+            <a:r>
+              <a:rPr lang="en-US"/>
+              <a:t>© Copyright </a:t>
+            </a:r>
+            <a:r>
+              <a:rPr lang="en-US" b="1"/>
+              <a:t>PresentationGO.com</a:t>
+            </a:r>
+            <a:r>
+              <a:rPr lang="en-US"/>
+              <a:t> – The free PowerPoint template library</a:t>
+            </a:r>
+          </a:p>
+        </p:txBody>
+      </p:sp>
+      <p:sp>
+        <p:nvSpPr>
+          <p:cNvPr id="4" name="Slide Number Placeholder 3"/>
+          <p:cNvSpPr>
+            <a:spLocks noGrp="1"/>
+          </p:cNvSpPr>
+          <p:nvPr>
+            <p:ph type="sldNum" sz="quarter" idx="10"/>
+          </p:nvPr>
+        </p:nvSpPr>
+        <p:spPr/>
+        <p:txBody>
+          <a:bodyPr/>
+          <a:lstStyle/>
+          <a:p>
+            <a:fld id="{B68D2766-C49B-4C1A-9FEE-6F146754B02B}" type="slidenum">
+              <a:rPr lang="en-US" smtClean="0"/>
+              <a:t>16</a:t>
             </a:fld>
             <a:endParaRPr lang="en-US"/>
           </a:p>
@@ -1582,7 +1870,7 @@
     </p:spTree>
     <p:extLst>
       <p:ext uri="{BB962C8B-B14F-4D97-AF65-F5344CB8AC3E}">
-        <p14:creationId xmlns:p14="http://schemas.microsoft.com/office/powerpoint/2010/main" val="1201213236"/>
+        <p14:creationId xmlns:p14="http://schemas.microsoft.com/office/powerpoint/2010/main" val="2452159036"/>
       </p:ext>
     </p:extLst>
   </p:cSld>
@@ -1677,7 +1965,7 @@
     </p:spTree>
     <p:extLst>
       <p:ext uri="{BB962C8B-B14F-4D97-AF65-F5344CB8AC3E}">
-        <p14:creationId xmlns:p14="http://schemas.microsoft.com/office/powerpoint/2010/main" val="3607588145"/>
+        <p14:creationId xmlns:p14="http://schemas.microsoft.com/office/powerpoint/2010/main" val="627487140"/>
       </p:ext>
     </p:extLst>
   </p:cSld>
@@ -1732,15 +2020,15 @@
           <a:lstStyle/>
           <a:p>
             <a:r>
-              <a:rPr lang="en-US"/>
+              <a:rPr lang="en-US" dirty="0"/>
               <a:t>© Copyright </a:t>
             </a:r>
             <a:r>
-              <a:rPr lang="en-US" b="1"/>
+              <a:rPr lang="en-US" b="1" dirty="0"/>
               <a:t>PresentationGO.com</a:t>
             </a:r>
             <a:r>
-              <a:rPr lang="en-US"/>
+              <a:rPr lang="en-US" dirty="0"/>
               <a:t> – The free PowerPoint template library</a:t>
             </a:r>
           </a:p>
@@ -1772,7 +2060,7 @@
     </p:spTree>
     <p:extLst>
       <p:ext uri="{BB962C8B-B14F-4D97-AF65-F5344CB8AC3E}">
-        <p14:creationId xmlns:p14="http://schemas.microsoft.com/office/powerpoint/2010/main" val="1288995506"/>
+        <p14:creationId xmlns:p14="http://schemas.microsoft.com/office/powerpoint/2010/main" val="3607588145"/>
       </p:ext>
     </p:extLst>
   </p:cSld>
@@ -4910,218 +5198,6 @@
           <a:chExt cx="0" cy="0"/>
         </a:xfrm>
       </p:grpSpPr>
-      <p:sp>
-        <p:nvSpPr>
-          <p:cNvPr id="2" name="Title 1">
-            <a:extLst>
-              <a:ext uri="{FF2B5EF4-FFF2-40B4-BE49-F238E27FC236}">
-                <a16:creationId xmlns:a16="http://schemas.microsoft.com/office/drawing/2014/main" id="{33101823-B7E8-4F9B-B03F-29FC1BF88595}"/>
-              </a:ext>
-            </a:extLst>
-          </p:cNvPr>
-          <p:cNvSpPr>
-            <a:spLocks noGrp="1"/>
-          </p:cNvSpPr>
-          <p:nvPr>
-            <p:ph type="title"/>
-          </p:nvPr>
-        </p:nvSpPr>
-        <p:spPr/>
-        <p:txBody>
-          <a:bodyPr>
-            <a:normAutofit/>
-          </a:bodyPr>
-          <a:lstStyle/>
-          <a:p>
-            <a:r>
-              <a:rPr lang="en-US" dirty="0"/>
-              <a:t>Word Cloud Comparison: Google</a:t>
-            </a:r>
-          </a:p>
-        </p:txBody>
-      </p:sp>
-      <p:pic>
-        <p:nvPicPr>
-          <p:cNvPr id="4" name="Picture 3">
-            <a:extLst>
-              <a:ext uri="{FF2B5EF4-FFF2-40B4-BE49-F238E27FC236}">
-                <a16:creationId xmlns:a16="http://schemas.microsoft.com/office/drawing/2014/main" id="{0D942AE8-A76D-4F0F-8500-E3EBE80A3E1B}"/>
-              </a:ext>
-            </a:extLst>
-          </p:cNvPr>
-          <p:cNvPicPr>
-            <a:picLocks noChangeAspect="1"/>
-          </p:cNvPicPr>
-          <p:nvPr/>
-        </p:nvPicPr>
-        <p:blipFill>
-          <a:blip r:embed="rId3">
-            <a:extLst>
-              <a:ext uri="{28A0092B-C50C-407E-A947-70E740481C1C}">
-                <a14:useLocalDpi xmlns:a14="http://schemas.microsoft.com/office/drawing/2010/main" val="0"/>
-              </a:ext>
-            </a:extLst>
-          </a:blip>
-          <a:srcRect/>
-          <a:stretch/>
-        </p:blipFill>
-        <p:spPr>
-          <a:xfrm>
-            <a:off x="316285" y="2276355"/>
-            <a:ext cx="5557626" cy="3420077"/>
-          </a:xfrm>
-          <a:prstGeom prst="rect">
-            <a:avLst/>
-          </a:prstGeom>
-        </p:spPr>
-      </p:pic>
-      <p:pic>
-        <p:nvPicPr>
-          <p:cNvPr id="6" name="Picture 5">
-            <a:extLst>
-              <a:ext uri="{FF2B5EF4-FFF2-40B4-BE49-F238E27FC236}">
-                <a16:creationId xmlns:a16="http://schemas.microsoft.com/office/drawing/2014/main" id="{3DA90E20-93E6-4C7E-A307-B0EA3EBB1432}"/>
-              </a:ext>
-            </a:extLst>
-          </p:cNvPr>
-          <p:cNvPicPr>
-            <a:picLocks noChangeAspect="1"/>
-          </p:cNvPicPr>
-          <p:nvPr/>
-        </p:nvPicPr>
-        <p:blipFill>
-          <a:blip r:embed="rId4">
-            <a:extLst>
-              <a:ext uri="{28A0092B-C50C-407E-A947-70E740481C1C}">
-                <a14:useLocalDpi xmlns:a14="http://schemas.microsoft.com/office/drawing/2010/main" val="0"/>
-              </a:ext>
-            </a:extLst>
-          </a:blip>
-          <a:srcRect/>
-          <a:stretch/>
-        </p:blipFill>
-        <p:spPr>
-          <a:xfrm>
-            <a:off x="6412374" y="2276354"/>
-            <a:ext cx="5557626" cy="3420078"/>
-          </a:xfrm>
-          <a:prstGeom prst="rect">
-            <a:avLst/>
-          </a:prstGeom>
-        </p:spPr>
-      </p:pic>
-      <p:sp>
-        <p:nvSpPr>
-          <p:cNvPr id="10" name="TextBox 9">
-            <a:extLst>
-              <a:ext uri="{FF2B5EF4-FFF2-40B4-BE49-F238E27FC236}">
-                <a16:creationId xmlns:a16="http://schemas.microsoft.com/office/drawing/2014/main" id="{FAA0FBC2-A78B-427A-B244-5AEAF817997E}"/>
-              </a:ext>
-            </a:extLst>
-          </p:cNvPr>
-          <p:cNvSpPr txBox="1"/>
-          <p:nvPr/>
-        </p:nvSpPr>
-        <p:spPr>
-          <a:xfrm>
-            <a:off x="1320616" y="1741714"/>
-            <a:ext cx="3446417" cy="369332"/>
-          </a:xfrm>
-          <a:prstGeom prst="rect">
-            <a:avLst/>
-          </a:prstGeom>
-          <a:noFill/>
-        </p:spPr>
-        <p:txBody>
-          <a:bodyPr wrap="square" rtlCol="0">
-            <a:spAutoFit/>
-          </a:bodyPr>
-          <a:lstStyle/>
-          <a:p>
-            <a:pPr algn="ctr"/>
-            <a:r>
-              <a:rPr lang="en-US" dirty="0"/>
-              <a:t>Old</a:t>
-            </a:r>
-          </a:p>
-        </p:txBody>
-      </p:sp>
-      <p:sp>
-        <p:nvSpPr>
-          <p:cNvPr id="11" name="TextBox 10">
-            <a:extLst>
-              <a:ext uri="{FF2B5EF4-FFF2-40B4-BE49-F238E27FC236}">
-                <a16:creationId xmlns:a16="http://schemas.microsoft.com/office/drawing/2014/main" id="{0D545C37-A0EF-45E3-9977-C94B7D4E34ED}"/>
-              </a:ext>
-            </a:extLst>
-          </p:cNvPr>
-          <p:cNvSpPr txBox="1"/>
-          <p:nvPr/>
-        </p:nvSpPr>
-        <p:spPr>
-          <a:xfrm>
-            <a:off x="7183980" y="1741714"/>
-            <a:ext cx="3446417" cy="369332"/>
-          </a:xfrm>
-          <a:prstGeom prst="rect">
-            <a:avLst/>
-          </a:prstGeom>
-          <a:noFill/>
-        </p:spPr>
-        <p:txBody>
-          <a:bodyPr wrap="square" rtlCol="0">
-            <a:spAutoFit/>
-          </a:bodyPr>
-          <a:lstStyle/>
-          <a:p>
-            <a:pPr algn="ctr"/>
-            <a:r>
-              <a:rPr lang="en-US" dirty="0"/>
-              <a:t>New</a:t>
-            </a:r>
-          </a:p>
-        </p:txBody>
-      </p:sp>
-    </p:spTree>
-    <p:extLst>
-      <p:ext uri="{BB962C8B-B14F-4D97-AF65-F5344CB8AC3E}">
-        <p14:creationId xmlns:p14="http://schemas.microsoft.com/office/powerpoint/2010/main" val="3513480580"/>
-      </p:ext>
-    </p:extLst>
-  </p:cSld>
-  <p:clrMapOvr>
-    <a:masterClrMapping/>
-  </p:clrMapOvr>
-</p:sld>
-</file>
-
-<file path=ppt/slides/slide11.xml><?xml version="1.0" encoding="utf-8"?>
-<p:sld xmlns:a="http://schemas.openxmlformats.org/drawingml/2006/main" xmlns:r="http://schemas.openxmlformats.org/officeDocument/2006/relationships" xmlns:p="http://schemas.openxmlformats.org/presentationml/2006/main">
-  <p:cSld>
-    <p:bg>
-      <p:bgPr>
-        <a:solidFill>
-          <a:schemeClr val="bg1">
-            <a:lumMod val="95000"/>
-          </a:schemeClr>
-        </a:solidFill>
-        <a:effectLst/>
-      </p:bgPr>
-    </p:bg>
-    <p:spTree>
-      <p:nvGrpSpPr>
-        <p:cNvPr id="1" name=""/>
-        <p:cNvGrpSpPr/>
-        <p:nvPr/>
-      </p:nvGrpSpPr>
-      <p:grpSpPr>
-        <a:xfrm>
-          <a:off x="0" y="0"/>
-          <a:ext cx="0" cy="0"/>
-          <a:chOff x="0" y="0"/>
-          <a:chExt cx="0" cy="0"/>
-        </a:xfrm>
-      </p:grpSpPr>
       <p:sp useBgFill="1">
         <p:nvSpPr>
           <p:cNvPr id="19" name="Rectangle 18">
@@ -5313,7 +5389,7 @@
               <a:rPr lang="en-US" sz="3200" dirty="0">
                 <a:latin typeface="Calibri (Body)"/>
               </a:rPr>
-              <a:t>Android</a:t>
+              <a:t>Google</a:t>
             </a:r>
           </a:p>
         </p:txBody>
@@ -5518,7 +5594,7 @@
             </a:pPr>
             <a:r>
               <a:rPr lang="en-US" dirty="0"/>
-              <a:t>User's sentiment towards Android has improved significantly. </a:t>
+              <a:t>Sentiment towards Google has increased. </a:t>
             </a:r>
           </a:p>
           <a:p>
@@ -5534,7 +5610,23 @@
             </a:pPr>
             <a:r>
               <a:rPr lang="en-US" dirty="0"/>
-              <a:t>The graph may seem to show similar sentiment, the ratio of negative to positive sentiments are not too different, but the total number of positive sentiments has increased.</a:t>
+              <a:t>The ratio of positive tweets have increased significantly. T</a:t>
+            </a:r>
+          </a:p>
+          <a:p>
+            <a:pPr indent="-228600">
+              <a:lnSpc>
+                <a:spcPct val="90000"/>
+              </a:lnSpc>
+              <a:spcAft>
+                <a:spcPts val="600"/>
+              </a:spcAft>
+              <a:buFont typeface="Arial" panose="020B0604020202020204" pitchFamily="34" charset="0"/>
+              <a:buChar char="•"/>
+            </a:pPr>
+            <a:r>
+              <a:rPr lang="en-US" dirty="0"/>
+              <a:t>he ratio of neutral sentiments decreased while the ratio of negative sentiments did not show too much change. </a:t>
             </a:r>
           </a:p>
         </p:txBody>
@@ -5612,7 +5704,231 @@
     </p:spTree>
     <p:extLst>
       <p:ext uri="{BB962C8B-B14F-4D97-AF65-F5344CB8AC3E}">
-        <p14:creationId xmlns:p14="http://schemas.microsoft.com/office/powerpoint/2010/main" val="1154550159"/>
+        <p14:creationId xmlns:p14="http://schemas.microsoft.com/office/powerpoint/2010/main" val="187179566"/>
+      </p:ext>
+    </p:extLst>
+  </p:cSld>
+  <p:clrMapOvr>
+    <a:masterClrMapping/>
+  </p:clrMapOvr>
+</p:sld>
+</file>
+
+<file path=ppt/slides/slide11.xml><?xml version="1.0" encoding="utf-8"?>
+<p:sld xmlns:a="http://schemas.openxmlformats.org/drawingml/2006/main" xmlns:r="http://schemas.openxmlformats.org/officeDocument/2006/relationships" xmlns:p="http://schemas.openxmlformats.org/presentationml/2006/main">
+  <p:cSld>
+    <p:bg>
+      <p:bgPr>
+        <a:solidFill>
+          <a:schemeClr val="bg1">
+            <a:lumMod val="95000"/>
+          </a:schemeClr>
+        </a:solidFill>
+        <a:effectLst/>
+      </p:bgPr>
+    </p:bg>
+    <p:spTree>
+      <p:nvGrpSpPr>
+        <p:cNvPr id="1" name=""/>
+        <p:cNvGrpSpPr/>
+        <p:nvPr/>
+      </p:nvGrpSpPr>
+      <p:grpSpPr>
+        <a:xfrm>
+          <a:off x="0" y="0"/>
+          <a:ext cx="0" cy="0"/>
+          <a:chOff x="0" y="0"/>
+          <a:chExt cx="0" cy="0"/>
+        </a:xfrm>
+      </p:grpSpPr>
+      <p:sp>
+        <p:nvSpPr>
+          <p:cNvPr id="2" name="Title 1">
+            <a:extLst>
+              <a:ext uri="{FF2B5EF4-FFF2-40B4-BE49-F238E27FC236}">
+                <a16:creationId xmlns:a16="http://schemas.microsoft.com/office/drawing/2014/main" id="{33101823-B7E8-4F9B-B03F-29FC1BF88595}"/>
+              </a:ext>
+            </a:extLst>
+          </p:cNvPr>
+          <p:cNvSpPr>
+            <a:spLocks noGrp="1"/>
+          </p:cNvSpPr>
+          <p:nvPr>
+            <p:ph type="title"/>
+          </p:nvPr>
+        </p:nvSpPr>
+        <p:spPr>
+          <a:xfrm>
+            <a:off x="838200" y="163481"/>
+            <a:ext cx="5878689" cy="739056"/>
+          </a:xfrm>
+        </p:spPr>
+        <p:txBody>
+          <a:bodyPr>
+            <a:normAutofit fontScale="90000"/>
+          </a:bodyPr>
+          <a:lstStyle/>
+          <a:p>
+            <a:r>
+              <a:rPr lang="en-US" dirty="0"/>
+              <a:t>Word Cloud Comparison: Neutral Sentiment Towards Google </a:t>
+            </a:r>
+          </a:p>
+        </p:txBody>
+      </p:sp>
+      <p:pic>
+        <p:nvPicPr>
+          <p:cNvPr id="4" name="Picture 3">
+            <a:extLst>
+              <a:ext uri="{FF2B5EF4-FFF2-40B4-BE49-F238E27FC236}">
+                <a16:creationId xmlns:a16="http://schemas.microsoft.com/office/drawing/2014/main" id="{0D942AE8-A76D-4F0F-8500-E3EBE80A3E1B}"/>
+              </a:ext>
+            </a:extLst>
+          </p:cNvPr>
+          <p:cNvPicPr>
+            <a:picLocks noChangeAspect="1"/>
+          </p:cNvPicPr>
+          <p:nvPr/>
+        </p:nvPicPr>
+        <p:blipFill>
+          <a:blip r:embed="rId3">
+            <a:extLst>
+              <a:ext uri="{28A0092B-C50C-407E-A947-70E740481C1C}">
+                <a14:useLocalDpi xmlns:a14="http://schemas.microsoft.com/office/drawing/2010/main" val="0"/>
+              </a:ext>
+            </a:extLst>
+          </a:blip>
+          <a:srcRect/>
+          <a:stretch/>
+        </p:blipFill>
+        <p:spPr>
+          <a:xfrm>
+            <a:off x="7271123" y="456308"/>
+            <a:ext cx="4807988" cy="3119105"/>
+          </a:xfrm>
+          <a:prstGeom prst="rect">
+            <a:avLst/>
+          </a:prstGeom>
+        </p:spPr>
+      </p:pic>
+      <p:pic>
+        <p:nvPicPr>
+          <p:cNvPr id="6" name="Picture 5">
+            <a:extLst>
+              <a:ext uri="{FF2B5EF4-FFF2-40B4-BE49-F238E27FC236}">
+                <a16:creationId xmlns:a16="http://schemas.microsoft.com/office/drawing/2014/main" id="{3DA90E20-93E6-4C7E-A307-B0EA3EBB1432}"/>
+              </a:ext>
+            </a:extLst>
+          </p:cNvPr>
+          <p:cNvPicPr>
+            <a:picLocks noChangeAspect="1"/>
+          </p:cNvPicPr>
+          <p:nvPr/>
+        </p:nvPicPr>
+        <p:blipFill>
+          <a:blip r:embed="rId4">
+            <a:extLst>
+              <a:ext uri="{28A0092B-C50C-407E-A947-70E740481C1C}">
+                <a14:useLocalDpi xmlns:a14="http://schemas.microsoft.com/office/drawing/2010/main" val="0"/>
+              </a:ext>
+            </a:extLst>
+          </a:blip>
+          <a:srcRect/>
+          <a:stretch/>
+        </p:blipFill>
+        <p:spPr>
+          <a:xfrm>
+            <a:off x="7271123" y="3575413"/>
+            <a:ext cx="4807988" cy="3119105"/>
+          </a:xfrm>
+          <a:prstGeom prst="rect">
+            <a:avLst/>
+          </a:prstGeom>
+        </p:spPr>
+      </p:pic>
+      <p:sp>
+        <p:nvSpPr>
+          <p:cNvPr id="5" name="Rectangle 4">
+            <a:extLst>
+              <a:ext uri="{FF2B5EF4-FFF2-40B4-BE49-F238E27FC236}">
+                <a16:creationId xmlns:a16="http://schemas.microsoft.com/office/drawing/2014/main" id="{04F37BE5-B810-42F6-A956-CFA0F8C09304}"/>
+              </a:ext>
+            </a:extLst>
+          </p:cNvPr>
+          <p:cNvSpPr/>
+          <p:nvPr/>
+        </p:nvSpPr>
+        <p:spPr>
+          <a:xfrm>
+            <a:off x="838200" y="1731532"/>
+            <a:ext cx="5625738" cy="3046988"/>
+          </a:xfrm>
+          <a:prstGeom prst="rect">
+            <a:avLst/>
+          </a:prstGeom>
+        </p:spPr>
+        <p:txBody>
+          <a:bodyPr wrap="square">
+            <a:spAutoFit/>
+          </a:bodyPr>
+          <a:lstStyle/>
+          <a:p>
+            <a:pPr marL="342900" indent="-342900">
+              <a:buFont typeface="Arial" panose="020B0604020202020204" pitchFamily="34" charset="0"/>
+              <a:buChar char="•"/>
+            </a:pPr>
+            <a:r>
+              <a:rPr lang="en-US" sz="2400" dirty="0">
+                <a:solidFill>
+                  <a:schemeClr val="tx1">
+                    <a:lumMod val="65000"/>
+                    <a:lumOff val="35000"/>
+                  </a:schemeClr>
+                </a:solidFill>
+              </a:rPr>
+              <a:t>Old Tweet: Social Network, Major New, Possibly Today, Launch</a:t>
+            </a:r>
+          </a:p>
+          <a:p>
+            <a:pPr marL="342900" indent="-342900">
+              <a:buFont typeface="Arial" panose="020B0604020202020204" pitchFamily="34" charset="0"/>
+              <a:buChar char="•"/>
+            </a:pPr>
+            <a:r>
+              <a:rPr lang="en-US" sz="2400" dirty="0">
+                <a:solidFill>
+                  <a:schemeClr val="tx1">
+                    <a:lumMod val="65000"/>
+                    <a:lumOff val="35000"/>
+                  </a:schemeClr>
+                </a:solidFill>
+              </a:rPr>
+              <a:t>New Tweet: Search, New, use, map, soft detection, translate</a:t>
+            </a:r>
+          </a:p>
+          <a:p>
+            <a:pPr marL="342900" indent="-342900">
+              <a:buFont typeface="Arial" panose="020B0604020202020204" pitchFamily="34" charset="0"/>
+              <a:buChar char="•"/>
+            </a:pPr>
+            <a:r>
+              <a:rPr lang="en-US" sz="2400" dirty="0">
+                <a:solidFill>
+                  <a:schemeClr val="tx1">
+                    <a:lumMod val="65000"/>
+                    <a:lumOff val="35000"/>
+                  </a:schemeClr>
+                </a:solidFill>
+              </a:rPr>
+              <a:t>Neutral sentiment towards Google seems to have shifted from texts relating to social media to general uses of the google search engine. </a:t>
+            </a:r>
+          </a:p>
+        </p:txBody>
+      </p:sp>
+    </p:spTree>
+    <p:extLst>
+      <p:ext uri="{BB962C8B-B14F-4D97-AF65-F5344CB8AC3E}">
+        <p14:creationId xmlns:p14="http://schemas.microsoft.com/office/powerpoint/2010/main" val="3649865296"/>
       </p:ext>
     </p:extLst>
   </p:cSld>
@@ -5665,16 +5981,21 @@
             <p:ph type="title"/>
           </p:nvPr>
         </p:nvSpPr>
-        <p:spPr/>
+        <p:spPr>
+          <a:xfrm>
+            <a:off x="838201" y="163481"/>
+            <a:ext cx="5889978" cy="739056"/>
+          </a:xfrm>
+        </p:spPr>
         <p:txBody>
           <a:bodyPr>
-            <a:normAutofit/>
+            <a:normAutofit fontScale="90000"/>
           </a:bodyPr>
           <a:lstStyle/>
           <a:p>
             <a:r>
               <a:rPr lang="en-US" dirty="0"/>
-              <a:t>Word Cloud Comparison: Android</a:t>
+              <a:t>Word Cloud Comparison: Positive Sentiment Towards Google </a:t>
             </a:r>
           </a:p>
         </p:txBody>
@@ -5706,8 +6027,8 @@
         </p:blipFill>
         <p:spPr>
           <a:xfrm>
-            <a:off x="316285" y="2276355"/>
-            <a:ext cx="5557625" cy="3420077"/>
+            <a:off x="7271123" y="533009"/>
+            <a:ext cx="4807988" cy="3119105"/>
           </a:xfrm>
           <a:prstGeom prst="rect">
             <a:avLst/>
@@ -5741,8 +6062,8 @@
         </p:blipFill>
         <p:spPr>
           <a:xfrm>
-            <a:off x="6412374" y="2276354"/>
-            <a:ext cx="5557626" cy="3420077"/>
+            <a:off x="7271123" y="3738895"/>
+            <a:ext cx="4807988" cy="3119105"/>
           </a:xfrm>
           <a:prstGeom prst="rect">
             <a:avLst/>
@@ -5751,72 +6072,184 @@
       </p:pic>
       <p:sp>
         <p:nvSpPr>
-          <p:cNvPr id="10" name="TextBox 9">
+          <p:cNvPr id="7" name="Rectangle 6">
             <a:extLst>
               <a:ext uri="{FF2B5EF4-FFF2-40B4-BE49-F238E27FC236}">
-                <a16:creationId xmlns:a16="http://schemas.microsoft.com/office/drawing/2014/main" id="{FAA0FBC2-A78B-427A-B244-5AEAF817997E}"/>
+                <a16:creationId xmlns:a16="http://schemas.microsoft.com/office/drawing/2014/main" id="{23D452BB-7550-4309-8171-718584DA519E}"/>
               </a:ext>
             </a:extLst>
           </p:cNvPr>
-          <p:cNvSpPr txBox="1"/>
+          <p:cNvSpPr/>
           <p:nvPr/>
         </p:nvSpPr>
         <p:spPr>
           <a:xfrm>
-            <a:off x="1320616" y="1741714"/>
-            <a:ext cx="3446417" cy="369332"/>
+            <a:off x="838200" y="1731532"/>
+            <a:ext cx="5625738" cy="4154984"/>
           </a:xfrm>
           <a:prstGeom prst="rect">
             <a:avLst/>
           </a:prstGeom>
-          <a:noFill/>
         </p:spPr>
         <p:txBody>
-          <a:bodyPr wrap="square" rtlCol="0">
+          <a:bodyPr wrap="square">
             <a:spAutoFit/>
           </a:bodyPr>
           <a:lstStyle/>
           <a:p>
-            <a:pPr algn="ctr"/>
-            <a:r>
-              <a:rPr lang="en-US" dirty="0"/>
-              <a:t>Old</a:t>
-            </a:r>
-          </a:p>
-        </p:txBody>
-      </p:sp>
-      <p:sp>
-        <p:nvSpPr>
-          <p:cNvPr id="11" name="TextBox 10">
-            <a:extLst>
-              <a:ext uri="{FF2B5EF4-FFF2-40B4-BE49-F238E27FC236}">
-                <a16:creationId xmlns:a16="http://schemas.microsoft.com/office/drawing/2014/main" id="{0D545C37-A0EF-45E3-9977-C94B7D4E34ED}"/>
-              </a:ext>
-            </a:extLst>
-          </p:cNvPr>
-          <p:cNvSpPr txBox="1"/>
-          <p:nvPr/>
-        </p:nvSpPr>
-        <p:spPr>
-          <a:xfrm>
-            <a:off x="7183980" y="1741714"/>
-            <a:ext cx="3446417" cy="369332"/>
-          </a:xfrm>
-          <a:prstGeom prst="rect">
-            <a:avLst/>
-          </a:prstGeom>
-          <a:noFill/>
-        </p:spPr>
-        <p:txBody>
-          <a:bodyPr wrap="square" rtlCol="0">
-            <a:spAutoFit/>
-          </a:bodyPr>
-          <a:lstStyle/>
-          <a:p>
-            <a:pPr algn="ctr"/>
-            <a:r>
-              <a:rPr lang="en-US" dirty="0"/>
-              <a:t>New</a:t>
+            <a:pPr marL="342900" indent="-342900">
+              <a:buFont typeface="Arial" panose="020B0604020202020204" pitchFamily="34" charset="0"/>
+              <a:buChar char="•"/>
+            </a:pPr>
+            <a:r>
+              <a:rPr lang="en-US" sz="2400" dirty="0">
+                <a:solidFill>
+                  <a:schemeClr val="tx1">
+                    <a:lumMod val="65000"/>
+                    <a:lumOff val="35000"/>
+                  </a:schemeClr>
+                </a:solidFill>
+              </a:rPr>
+              <a:t>Old Tweet: New</a:t>
+            </a:r>
+            <a:r>
+              <a:rPr lang="ko-KR" altLang="en-US" sz="2400" dirty="0">
+                <a:solidFill>
+                  <a:schemeClr val="tx1">
+                    <a:lumMod val="65000"/>
+                    <a:lumOff val="35000"/>
+                  </a:schemeClr>
+                </a:solidFill>
+              </a:rPr>
+              <a:t> </a:t>
+            </a:r>
+            <a:r>
+              <a:rPr lang="en-US" altLang="ko-KR" sz="2400" dirty="0">
+                <a:solidFill>
+                  <a:schemeClr val="tx1">
+                    <a:lumMod val="65000"/>
+                    <a:lumOff val="35000"/>
+                  </a:schemeClr>
+                </a:solidFill>
+              </a:rPr>
+              <a:t>Social,</a:t>
+            </a:r>
+            <a:r>
+              <a:rPr lang="ko-KR" altLang="en-US" sz="2400" dirty="0">
+                <a:solidFill>
+                  <a:schemeClr val="tx1">
+                    <a:lumMod val="65000"/>
+                    <a:lumOff val="35000"/>
+                  </a:schemeClr>
+                </a:solidFill>
+              </a:rPr>
+              <a:t> </a:t>
+            </a:r>
+            <a:r>
+              <a:rPr lang="en-US" altLang="ko-KR" sz="2400" dirty="0">
+                <a:solidFill>
+                  <a:schemeClr val="tx1">
+                    <a:lumMod val="65000"/>
+                    <a:lumOff val="35000"/>
+                  </a:schemeClr>
+                </a:solidFill>
+              </a:rPr>
+              <a:t>map,</a:t>
+            </a:r>
+            <a:r>
+              <a:rPr lang="ko-KR" altLang="en-US" sz="2400" dirty="0">
+                <a:solidFill>
+                  <a:schemeClr val="tx1">
+                    <a:lumMod val="65000"/>
+                    <a:lumOff val="35000"/>
+                  </a:schemeClr>
+                </a:solidFill>
+              </a:rPr>
+              <a:t> </a:t>
+            </a:r>
+            <a:r>
+              <a:rPr lang="en-US" altLang="ko-KR" sz="2400" dirty="0">
+                <a:solidFill>
+                  <a:schemeClr val="tx1">
+                    <a:lumMod val="65000"/>
+                    <a:lumOff val="35000"/>
+                  </a:schemeClr>
+                </a:solidFill>
+              </a:rPr>
+              <a:t>great,</a:t>
+            </a:r>
+            <a:r>
+              <a:rPr lang="ko-KR" altLang="en-US" sz="2400" dirty="0">
+                <a:solidFill>
+                  <a:schemeClr val="tx1">
+                    <a:lumMod val="65000"/>
+                    <a:lumOff val="35000"/>
+                  </a:schemeClr>
+                </a:solidFill>
+              </a:rPr>
+              <a:t> </a:t>
+            </a:r>
+            <a:r>
+              <a:rPr lang="en-US" altLang="ko-KR" sz="2400" dirty="0">
+                <a:solidFill>
+                  <a:schemeClr val="tx1">
+                    <a:lumMod val="65000"/>
+                    <a:lumOff val="35000"/>
+                  </a:schemeClr>
+                </a:solidFill>
+              </a:rPr>
+              <a:t>party, Social Network</a:t>
+            </a:r>
+          </a:p>
+          <a:p>
+            <a:pPr marL="342900" indent="-342900">
+              <a:buFont typeface="Arial" panose="020B0604020202020204" pitchFamily="34" charset="0"/>
+              <a:buChar char="•"/>
+            </a:pPr>
+            <a:r>
+              <a:rPr lang="en-US" sz="2400" dirty="0">
+                <a:solidFill>
+                  <a:schemeClr val="tx1">
+                    <a:lumMod val="65000"/>
+                    <a:lumOff val="35000"/>
+                  </a:schemeClr>
+                </a:solidFill>
+              </a:rPr>
+              <a:t>New Tweet: like, know, use, see, help, search, find</a:t>
+            </a:r>
+          </a:p>
+          <a:p>
+            <a:pPr marL="342900" indent="-342900">
+              <a:buFont typeface="Arial" panose="020B0604020202020204" pitchFamily="34" charset="0"/>
+              <a:buChar char="•"/>
+            </a:pPr>
+            <a:r>
+              <a:rPr lang="en-US" sz="2400" dirty="0">
+                <a:solidFill>
+                  <a:schemeClr val="tx1">
+                    <a:lumMod val="65000"/>
+                    <a:lumOff val="35000"/>
+                  </a:schemeClr>
+                </a:solidFill>
+              </a:rPr>
+              <a:t>Overall, the number of words related to positive sentiment towards Google seems to have decreased. </a:t>
+            </a:r>
+          </a:p>
+          <a:p>
+            <a:pPr marL="342900" indent="-342900">
+              <a:buFont typeface="Arial" panose="020B0604020202020204" pitchFamily="34" charset="0"/>
+              <a:buChar char="•"/>
+            </a:pPr>
+            <a:r>
+              <a:rPr lang="en-US" sz="2400" dirty="0">
+                <a:solidFill>
+                  <a:schemeClr val="tx1">
+                    <a:lumMod val="65000"/>
+                    <a:lumOff val="35000"/>
+                  </a:schemeClr>
+                </a:solidFill>
+              </a:rPr>
+              <a:t>Similar to the tweets with neutral sentiment, new tweets seem to be more related to the Google's search engine rather than Google as a company. </a:t>
             </a:r>
           </a:p>
         </p:txBody>
@@ -5824,7 +6257,7 @@
     </p:spTree>
     <p:extLst>
       <p:ext uri="{BB962C8B-B14F-4D97-AF65-F5344CB8AC3E}">
-        <p14:creationId xmlns:p14="http://schemas.microsoft.com/office/powerpoint/2010/main" val="2320827095"/>
+        <p14:creationId xmlns:p14="http://schemas.microsoft.com/office/powerpoint/2010/main" val="3561455558"/>
       </p:ext>
     </p:extLst>
   </p:cSld>
@@ -5835,6 +6268,1017 @@
 </file>
 
 <file path=ppt/slides/slide13.xml><?xml version="1.0" encoding="utf-8"?>
+<p:sld xmlns:a="http://schemas.openxmlformats.org/drawingml/2006/main" xmlns:r="http://schemas.openxmlformats.org/officeDocument/2006/relationships" xmlns:p="http://schemas.openxmlformats.org/presentationml/2006/main">
+  <p:cSld>
+    <p:bg>
+      <p:bgPr>
+        <a:solidFill>
+          <a:schemeClr val="bg1">
+            <a:lumMod val="95000"/>
+          </a:schemeClr>
+        </a:solidFill>
+        <a:effectLst/>
+      </p:bgPr>
+    </p:bg>
+    <p:spTree>
+      <p:nvGrpSpPr>
+        <p:cNvPr id="1" name=""/>
+        <p:cNvGrpSpPr/>
+        <p:nvPr/>
+      </p:nvGrpSpPr>
+      <p:grpSpPr>
+        <a:xfrm>
+          <a:off x="0" y="0"/>
+          <a:ext cx="0" cy="0"/>
+          <a:chOff x="0" y="0"/>
+          <a:chExt cx="0" cy="0"/>
+        </a:xfrm>
+      </p:grpSpPr>
+      <p:sp useBgFill="1">
+        <p:nvSpPr>
+          <p:cNvPr id="19" name="Rectangle 18">
+            <a:extLst>
+              <a:ext uri="{FF2B5EF4-FFF2-40B4-BE49-F238E27FC236}">
+                <a16:creationId xmlns:a16="http://schemas.microsoft.com/office/drawing/2014/main" id="{385E1BDC-A9B0-4A87-82E3-F3187F69A802}"/>
+              </a:ext>
+              <a:ext uri="{C183D7F6-B498-43B3-948B-1728B52AA6E4}">
+                <adec:decorative xmlns:adec="http://schemas.microsoft.com/office/drawing/2017/decorative" val="1"/>
+              </a:ext>
+            </a:extLst>
+          </p:cNvPr>
+          <p:cNvSpPr>
+            <a:spLocks noGrp="1" noRot="1" noChangeAspect="1" noMove="1" noResize="1" noEditPoints="1" noAdjustHandles="1" noChangeArrowheads="1" noChangeShapeType="1" noTextEdit="1"/>
+          </p:cNvSpPr>
+          <p:nvPr>
+            <p:extLst>
+              <p:ext uri="{386F3935-93C4-4BCD-93E2-E3B085C9AB24}">
+                <p16:designElem xmlns:p16="http://schemas.microsoft.com/office/powerpoint/2015/main" val="1"/>
+              </p:ext>
+            </p:extLst>
+          </p:nvPr>
+        </p:nvSpPr>
+        <p:spPr>
+          <a:xfrm>
+            <a:off x="0" y="0"/>
+            <a:ext cx="12192000" cy="6858000"/>
+          </a:xfrm>
+          <a:prstGeom prst="rect">
+            <a:avLst/>
+          </a:prstGeom>
+          <a:ln>
+            <a:noFill/>
+          </a:ln>
+        </p:spPr>
+        <p:style>
+          <a:lnRef idx="2">
+            <a:schemeClr val="accent1">
+              <a:shade val="50000"/>
+            </a:schemeClr>
+          </a:lnRef>
+          <a:fillRef idx="1">
+            <a:schemeClr val="accent1"/>
+          </a:fillRef>
+          <a:effectRef idx="0">
+            <a:schemeClr val="accent1"/>
+          </a:effectRef>
+          <a:fontRef idx="minor">
+            <a:schemeClr val="lt1"/>
+          </a:fontRef>
+        </p:style>
+        <p:txBody>
+          <a:bodyPr rtlCol="0" anchor="ctr"/>
+          <a:lstStyle/>
+          <a:p>
+            <a:pPr algn="ctr"/>
+            <a:endParaRPr lang="en-US"/>
+          </a:p>
+        </p:txBody>
+      </p:sp>
+      <p:sp useBgFill="1">
+        <p:nvSpPr>
+          <p:cNvPr id="21" name="Rectangle 20">
+            <a:extLst>
+              <a:ext uri="{FF2B5EF4-FFF2-40B4-BE49-F238E27FC236}">
+                <a16:creationId xmlns:a16="http://schemas.microsoft.com/office/drawing/2014/main" id="{0990C621-3B8B-4820-8328-D47EF7CE823C}"/>
+              </a:ext>
+              <a:ext uri="{C183D7F6-B498-43B3-948B-1728B52AA6E4}">
+                <adec:decorative xmlns:adec="http://schemas.microsoft.com/office/drawing/2017/decorative" val="1"/>
+              </a:ext>
+            </a:extLst>
+          </p:cNvPr>
+          <p:cNvSpPr>
+            <a:spLocks noGrp="1" noRot="1" noChangeAspect="1" noMove="1" noResize="1" noEditPoints="1" noAdjustHandles="1" noChangeArrowheads="1" noChangeShapeType="1" noTextEdit="1"/>
+          </p:cNvSpPr>
+          <p:nvPr>
+            <p:extLst>
+              <p:ext uri="{386F3935-93C4-4BCD-93E2-E3B085C9AB24}">
+                <p16:designElem xmlns:p16="http://schemas.microsoft.com/office/powerpoint/2015/main" val="1"/>
+              </p:ext>
+            </p:extLst>
+          </p:nvPr>
+        </p:nvSpPr>
+        <p:spPr>
+          <a:xfrm>
+            <a:off x="554416" y="365125"/>
+            <a:ext cx="11167447" cy="2089317"/>
+          </a:xfrm>
+          <a:prstGeom prst="rect">
+            <a:avLst/>
+          </a:prstGeom>
+          <a:ln w="12700">
+            <a:solidFill>
+              <a:srgbClr val="DEDEDE"/>
+            </a:solidFill>
+          </a:ln>
+          <a:effectLst>
+            <a:outerShdw blurRad="50800" dist="38100" dir="2700000" algn="tl" rotWithShape="0">
+              <a:schemeClr val="bg2">
+                <a:lumMod val="85000"/>
+                <a:alpha val="50000"/>
+              </a:schemeClr>
+            </a:outerShdw>
+          </a:effectLst>
+        </p:spPr>
+        <p:style>
+          <a:lnRef idx="2">
+            <a:schemeClr val="accent1">
+              <a:shade val="50000"/>
+            </a:schemeClr>
+          </a:lnRef>
+          <a:fillRef idx="1">
+            <a:schemeClr val="accent1"/>
+          </a:fillRef>
+          <a:effectRef idx="0">
+            <a:schemeClr val="accent1"/>
+          </a:effectRef>
+          <a:fontRef idx="minor">
+            <a:schemeClr val="lt1"/>
+          </a:fontRef>
+        </p:style>
+        <p:txBody>
+          <a:bodyPr rtlCol="0" anchor="ctr"/>
+          <a:lstStyle/>
+          <a:p>
+            <a:pPr marL="0" marR="0" lvl="0" indent="0" algn="ctr" defTabSz="914400" rtl="0" eaLnBrk="1" fontAlgn="auto" latinLnBrk="0" hangingPunct="1">
+              <a:lnSpc>
+                <a:spcPct val="100000"/>
+              </a:lnSpc>
+              <a:spcBef>
+                <a:spcPts val="0"/>
+              </a:spcBef>
+              <a:spcAft>
+                <a:spcPts val="0"/>
+              </a:spcAft>
+              <a:buClrTx/>
+              <a:buSzTx/>
+              <a:buFontTx/>
+              <a:buNone/>
+              <a:tabLst/>
+              <a:defRPr/>
+            </a:pPr>
+            <a:endParaRPr kumimoji="0" lang="en-US" sz="1800" b="0" i="0" u="none" strike="noStrike" kern="1200" cap="none" spc="0" normalizeH="0" baseline="0" noProof="0">
+              <a:ln>
+                <a:noFill/>
+              </a:ln>
+              <a:solidFill>
+                <a:prstClr val="white"/>
+              </a:solidFill>
+              <a:effectLst/>
+              <a:uLnTx/>
+              <a:uFillTx/>
+              <a:latin typeface="Calibri" panose="020F0502020204030204"/>
+              <a:ea typeface="+mn-ea"/>
+              <a:cs typeface="+mn-cs"/>
+            </a:endParaRPr>
+          </a:p>
+        </p:txBody>
+      </p:sp>
+      <p:sp>
+        <p:nvSpPr>
+          <p:cNvPr id="2" name="Title 1">
+            <a:extLst>
+              <a:ext uri="{FF2B5EF4-FFF2-40B4-BE49-F238E27FC236}">
+                <a16:creationId xmlns:a16="http://schemas.microsoft.com/office/drawing/2014/main" id="{33101823-B7E8-4F9B-B03F-29FC1BF88595}"/>
+              </a:ext>
+            </a:extLst>
+          </p:cNvPr>
+          <p:cNvSpPr>
+            <a:spLocks noGrp="1"/>
+          </p:cNvSpPr>
+          <p:nvPr>
+            <p:ph type="title"/>
+          </p:nvPr>
+        </p:nvSpPr>
+        <p:spPr>
+          <a:xfrm>
+            <a:off x="1051560" y="586822"/>
+            <a:ext cx="3657600" cy="1645920"/>
+          </a:xfrm>
+        </p:spPr>
+        <p:txBody>
+          <a:bodyPr vert="horz" lIns="91440" tIns="45720" rIns="91440" bIns="45720" rtlCol="0" anchor="ctr">
+            <a:normAutofit/>
+          </a:bodyPr>
+          <a:lstStyle/>
+          <a:p>
+            <a:r>
+              <a:rPr lang="en-US" sz="3200" dirty="0">
+                <a:latin typeface="Calibri (Body)"/>
+              </a:rPr>
+              <a:t>Android</a:t>
+            </a:r>
+          </a:p>
+        </p:txBody>
+      </p:sp>
+      <p:sp>
+        <p:nvSpPr>
+          <p:cNvPr id="23" name="Rectangle 22">
+            <a:extLst>
+              <a:ext uri="{FF2B5EF4-FFF2-40B4-BE49-F238E27FC236}">
+                <a16:creationId xmlns:a16="http://schemas.microsoft.com/office/drawing/2014/main" id="{C1A2385B-1D2A-4E17-84FA-6CB7F0AAE473}"/>
+              </a:ext>
+              <a:ext uri="{C183D7F6-B498-43B3-948B-1728B52AA6E4}">
+                <adec:decorative xmlns:adec="http://schemas.microsoft.com/office/drawing/2017/decorative" val="1"/>
+              </a:ext>
+            </a:extLst>
+          </p:cNvPr>
+          <p:cNvSpPr>
+            <a:spLocks noGrp="1" noRot="1" noChangeAspect="1" noMove="1" noResize="1" noEditPoints="1" noAdjustHandles="1" noChangeArrowheads="1" noChangeShapeType="1" noTextEdit="1"/>
+          </p:cNvSpPr>
+          <p:nvPr>
+            <p:extLst>
+              <p:ext uri="{386F3935-93C4-4BCD-93E2-E3B085C9AB24}">
+                <p16:designElem xmlns:p16="http://schemas.microsoft.com/office/powerpoint/2015/main" val="1"/>
+              </p:ext>
+            </p:extLst>
+          </p:nvPr>
+        </p:nvSpPr>
+        <p:spPr>
+          <a:xfrm>
+            <a:off x="490408" y="1057739"/>
+            <a:ext cx="128016" cy="704088"/>
+          </a:xfrm>
+          <a:prstGeom prst="rect">
+            <a:avLst/>
+          </a:prstGeom>
+          <a:solidFill>
+            <a:schemeClr val="accent2"/>
+          </a:solidFill>
+          <a:ln>
+            <a:noFill/>
+          </a:ln>
+        </p:spPr>
+        <p:style>
+          <a:lnRef idx="2">
+            <a:schemeClr val="accent1">
+              <a:shade val="50000"/>
+            </a:schemeClr>
+          </a:lnRef>
+          <a:fillRef idx="1">
+            <a:schemeClr val="accent1"/>
+          </a:fillRef>
+          <a:effectRef idx="0">
+            <a:schemeClr val="accent1"/>
+          </a:effectRef>
+          <a:fontRef idx="minor">
+            <a:schemeClr val="lt1"/>
+          </a:fontRef>
+        </p:style>
+        <p:txBody>
+          <a:bodyPr rtlCol="0" anchor="ctr"/>
+          <a:lstStyle/>
+          <a:p>
+            <a:pPr algn="ctr"/>
+            <a:endParaRPr lang="en-US" dirty="0">
+              <a:solidFill>
+                <a:prstClr val="white"/>
+              </a:solidFill>
+              <a:latin typeface="Calibri" panose="020F0502020204030204"/>
+            </a:endParaRPr>
+          </a:p>
+        </p:txBody>
+      </p:sp>
+      <p:sp>
+        <p:nvSpPr>
+          <p:cNvPr id="25" name="Rectangle 24">
+            <a:extLst>
+              <a:ext uri="{FF2B5EF4-FFF2-40B4-BE49-F238E27FC236}">
+                <a16:creationId xmlns:a16="http://schemas.microsoft.com/office/drawing/2014/main" id="{5E791F2F-79DB-4CC0-9FA1-001E3E91E8B7}"/>
+              </a:ext>
+              <a:ext uri="{C183D7F6-B498-43B3-948B-1728B52AA6E4}">
+                <adec:decorative xmlns:adec="http://schemas.microsoft.com/office/drawing/2017/decorative" val="1"/>
+              </a:ext>
+            </a:extLst>
+          </p:cNvPr>
+          <p:cNvSpPr>
+            <a:spLocks noGrp="1" noRot="1" noChangeAspect="1" noMove="1" noResize="1" noEditPoints="1" noAdjustHandles="1" noChangeArrowheads="1" noChangeShapeType="1" noTextEdit="1"/>
+          </p:cNvSpPr>
+          <p:nvPr>
+            <p:extLst>
+              <p:ext uri="{386F3935-93C4-4BCD-93E2-E3B085C9AB24}">
+                <p16:designElem xmlns:p16="http://schemas.microsoft.com/office/powerpoint/2015/main" val="1"/>
+              </p:ext>
+            </p:extLst>
+          </p:nvPr>
+        </p:nvSpPr>
+        <p:spPr>
+          <a:xfrm rot="5400000">
+            <a:off x="4243541" y="1400638"/>
+            <a:ext cx="1463040" cy="18288"/>
+          </a:xfrm>
+          <a:prstGeom prst="rect">
+            <a:avLst/>
+          </a:prstGeom>
+          <a:solidFill>
+            <a:srgbClr val="D5D5D5"/>
+          </a:solidFill>
+          <a:ln w="3175">
+            <a:noFill/>
+          </a:ln>
+          <a:effectLst/>
+        </p:spPr>
+        <p:style>
+          <a:lnRef idx="2">
+            <a:schemeClr val="accent1">
+              <a:shade val="50000"/>
+            </a:schemeClr>
+          </a:lnRef>
+          <a:fillRef idx="1">
+            <a:schemeClr val="accent1"/>
+          </a:fillRef>
+          <a:effectRef idx="0">
+            <a:schemeClr val="accent1"/>
+          </a:effectRef>
+          <a:fontRef idx="minor">
+            <a:schemeClr val="lt1"/>
+          </a:fontRef>
+        </p:style>
+        <p:txBody>
+          <a:bodyPr rtlCol="0" anchor="ctr"/>
+          <a:lstStyle/>
+          <a:p>
+            <a:pPr marL="0" marR="0" lvl="0" indent="0" algn="ctr" defTabSz="914400" rtl="0" eaLnBrk="1" fontAlgn="auto" latinLnBrk="0" hangingPunct="1">
+              <a:lnSpc>
+                <a:spcPct val="100000"/>
+              </a:lnSpc>
+              <a:spcBef>
+                <a:spcPts val="0"/>
+              </a:spcBef>
+              <a:spcAft>
+                <a:spcPts val="0"/>
+              </a:spcAft>
+              <a:buClrTx/>
+              <a:buSzTx/>
+              <a:buFontTx/>
+              <a:buNone/>
+              <a:tabLst/>
+              <a:defRPr/>
+            </a:pPr>
+            <a:endParaRPr kumimoji="0" lang="en-US" sz="1800" b="0" i="0" u="none" strike="noStrike" kern="1200" cap="none" spc="0" normalizeH="0" baseline="0" noProof="0">
+              <a:ln>
+                <a:noFill/>
+              </a:ln>
+              <a:solidFill>
+                <a:prstClr val="white"/>
+              </a:solidFill>
+              <a:effectLst/>
+              <a:uLnTx/>
+              <a:uFillTx/>
+              <a:latin typeface="Calibri" panose="020F0502020204030204"/>
+              <a:ea typeface="+mn-ea"/>
+              <a:cs typeface="+mn-cs"/>
+            </a:endParaRPr>
+          </a:p>
+        </p:txBody>
+      </p:sp>
+      <p:sp>
+        <p:nvSpPr>
+          <p:cNvPr id="14" name="Rectangle 13">
+            <a:extLst>
+              <a:ext uri="{FF2B5EF4-FFF2-40B4-BE49-F238E27FC236}">
+                <a16:creationId xmlns:a16="http://schemas.microsoft.com/office/drawing/2014/main" id="{F008B410-051D-43C5-BEA3-FB4D1C174B46}"/>
+              </a:ext>
+            </a:extLst>
+          </p:cNvPr>
+          <p:cNvSpPr/>
+          <p:nvPr/>
+        </p:nvSpPr>
+        <p:spPr>
+          <a:xfrm>
+            <a:off x="5250106" y="586822"/>
+            <a:ext cx="6106742" cy="1645920"/>
+          </a:xfrm>
+          <a:prstGeom prst="rect">
+            <a:avLst/>
+          </a:prstGeom>
+        </p:spPr>
+        <p:txBody>
+          <a:bodyPr vert="horz" lIns="91440" tIns="45720" rIns="91440" bIns="45720" rtlCol="0" anchor="ctr">
+            <a:normAutofit/>
+          </a:bodyPr>
+          <a:lstStyle/>
+          <a:p>
+            <a:pPr indent="-228600">
+              <a:lnSpc>
+                <a:spcPct val="90000"/>
+              </a:lnSpc>
+              <a:spcAft>
+                <a:spcPts val="600"/>
+              </a:spcAft>
+              <a:buFont typeface="Arial" panose="020B0604020202020204" pitchFamily="34" charset="0"/>
+              <a:buChar char="•"/>
+            </a:pPr>
+            <a:r>
+              <a:rPr lang="en-US" dirty="0"/>
+              <a:t>User's sentiment towards Android has more or less remained the same.</a:t>
+            </a:r>
+          </a:p>
+          <a:p>
+            <a:pPr indent="-228600">
+              <a:lnSpc>
+                <a:spcPct val="90000"/>
+              </a:lnSpc>
+              <a:spcAft>
+                <a:spcPts val="600"/>
+              </a:spcAft>
+              <a:buFont typeface="Arial" panose="020B0604020202020204" pitchFamily="34" charset="0"/>
+              <a:buChar char="•"/>
+            </a:pPr>
+            <a:r>
+              <a:rPr lang="en-US" dirty="0"/>
+              <a:t>The ratio of all sentiments in the new tweets do not differ too much from those of the old tweets.</a:t>
+            </a:r>
+          </a:p>
+        </p:txBody>
+      </p:sp>
+      <p:pic>
+        <p:nvPicPr>
+          <p:cNvPr id="7" name="Picture 6">
+            <a:extLst>
+              <a:ext uri="{FF2B5EF4-FFF2-40B4-BE49-F238E27FC236}">
+                <a16:creationId xmlns:a16="http://schemas.microsoft.com/office/drawing/2014/main" id="{770260DC-5919-42FD-8B97-60A388787D49}"/>
+              </a:ext>
+            </a:extLst>
+          </p:cNvPr>
+          <p:cNvPicPr>
+            <a:picLocks noChangeAspect="1"/>
+          </p:cNvPicPr>
+          <p:nvPr/>
+        </p:nvPicPr>
+        <p:blipFill>
+          <a:blip r:embed="rId3">
+            <a:extLst>
+              <a:ext uri="{28A0092B-C50C-407E-A947-70E740481C1C}">
+                <a14:useLocalDpi xmlns:a14="http://schemas.microsoft.com/office/drawing/2010/main" val="0"/>
+              </a:ext>
+            </a:extLst>
+          </a:blip>
+          <a:srcRect/>
+          <a:stretch/>
+        </p:blipFill>
+        <p:spPr>
+          <a:xfrm>
+            <a:off x="6139644" y="2925356"/>
+            <a:ext cx="5419344" cy="3676628"/>
+          </a:xfrm>
+          <a:prstGeom prst="rect">
+            <a:avLst/>
+          </a:prstGeom>
+        </p:spPr>
+      </p:pic>
+      <p:pic>
+        <p:nvPicPr>
+          <p:cNvPr id="4" name="Picture 3">
+            <a:extLst>
+              <a:ext uri="{FF2B5EF4-FFF2-40B4-BE49-F238E27FC236}">
+                <a16:creationId xmlns:a16="http://schemas.microsoft.com/office/drawing/2014/main" id="{1B613720-693C-4B67-8EAA-3635591E8FA4}"/>
+              </a:ext>
+            </a:extLst>
+          </p:cNvPr>
+          <p:cNvPicPr>
+            <a:picLocks noChangeAspect="1"/>
+          </p:cNvPicPr>
+          <p:nvPr/>
+        </p:nvPicPr>
+        <p:blipFill>
+          <a:blip r:embed="rId4">
+            <a:extLst>
+              <a:ext uri="{28A0092B-C50C-407E-A947-70E740481C1C}">
+                <a14:useLocalDpi xmlns:a14="http://schemas.microsoft.com/office/drawing/2010/main" val="0"/>
+              </a:ext>
+            </a:extLst>
+          </a:blip>
+          <a:srcRect/>
+          <a:stretch/>
+        </p:blipFill>
+        <p:spPr>
+          <a:xfrm>
+            <a:off x="345149" y="2925356"/>
+            <a:ext cx="5419344" cy="3676628"/>
+          </a:xfrm>
+          <a:prstGeom prst="rect">
+            <a:avLst/>
+          </a:prstGeom>
+        </p:spPr>
+      </p:pic>
+    </p:spTree>
+    <p:extLst>
+      <p:ext uri="{BB962C8B-B14F-4D97-AF65-F5344CB8AC3E}">
+        <p14:creationId xmlns:p14="http://schemas.microsoft.com/office/powerpoint/2010/main" val="1154550159"/>
+      </p:ext>
+    </p:extLst>
+  </p:cSld>
+  <p:clrMapOvr>
+    <a:masterClrMapping/>
+  </p:clrMapOvr>
+</p:sld>
+</file>
+
+<file path=ppt/slides/slide14.xml><?xml version="1.0" encoding="utf-8"?>
+<p:sld xmlns:a="http://schemas.openxmlformats.org/drawingml/2006/main" xmlns:r="http://schemas.openxmlformats.org/officeDocument/2006/relationships" xmlns:p="http://schemas.openxmlformats.org/presentationml/2006/main">
+  <p:cSld>
+    <p:bg>
+      <p:bgPr>
+        <a:solidFill>
+          <a:schemeClr val="bg1">
+            <a:lumMod val="95000"/>
+          </a:schemeClr>
+        </a:solidFill>
+        <a:effectLst/>
+      </p:bgPr>
+    </p:bg>
+    <p:spTree>
+      <p:nvGrpSpPr>
+        <p:cNvPr id="1" name=""/>
+        <p:cNvGrpSpPr/>
+        <p:nvPr/>
+      </p:nvGrpSpPr>
+      <p:grpSpPr>
+        <a:xfrm>
+          <a:off x="0" y="0"/>
+          <a:ext cx="0" cy="0"/>
+          <a:chOff x="0" y="0"/>
+          <a:chExt cx="0" cy="0"/>
+        </a:xfrm>
+      </p:grpSpPr>
+      <p:sp>
+        <p:nvSpPr>
+          <p:cNvPr id="2" name="Title 1">
+            <a:extLst>
+              <a:ext uri="{FF2B5EF4-FFF2-40B4-BE49-F238E27FC236}">
+                <a16:creationId xmlns:a16="http://schemas.microsoft.com/office/drawing/2014/main" id="{33101823-B7E8-4F9B-B03F-29FC1BF88595}"/>
+              </a:ext>
+            </a:extLst>
+          </p:cNvPr>
+          <p:cNvSpPr>
+            <a:spLocks noGrp="1"/>
+          </p:cNvSpPr>
+          <p:nvPr>
+            <p:ph type="title"/>
+          </p:nvPr>
+        </p:nvSpPr>
+        <p:spPr>
+          <a:xfrm>
+            <a:off x="838200" y="163481"/>
+            <a:ext cx="5788378" cy="739056"/>
+          </a:xfrm>
+        </p:spPr>
+        <p:txBody>
+          <a:bodyPr>
+            <a:normAutofit fontScale="90000"/>
+          </a:bodyPr>
+          <a:lstStyle/>
+          <a:p>
+            <a:r>
+              <a:rPr lang="en-US" dirty="0"/>
+              <a:t>Word Cloud Comparison: Positive Sentiment Towards Android </a:t>
+            </a:r>
+          </a:p>
+        </p:txBody>
+      </p:sp>
+      <p:pic>
+        <p:nvPicPr>
+          <p:cNvPr id="4" name="Picture 3">
+            <a:extLst>
+              <a:ext uri="{FF2B5EF4-FFF2-40B4-BE49-F238E27FC236}">
+                <a16:creationId xmlns:a16="http://schemas.microsoft.com/office/drawing/2014/main" id="{0D942AE8-A76D-4F0F-8500-E3EBE80A3E1B}"/>
+              </a:ext>
+            </a:extLst>
+          </p:cNvPr>
+          <p:cNvPicPr>
+            <a:picLocks noChangeAspect="1"/>
+          </p:cNvPicPr>
+          <p:nvPr/>
+        </p:nvPicPr>
+        <p:blipFill>
+          <a:blip r:embed="rId3">
+            <a:extLst>
+              <a:ext uri="{28A0092B-C50C-407E-A947-70E740481C1C}">
+                <a14:useLocalDpi xmlns:a14="http://schemas.microsoft.com/office/drawing/2010/main" val="0"/>
+              </a:ext>
+            </a:extLst>
+          </a:blip>
+          <a:srcRect/>
+          <a:stretch/>
+        </p:blipFill>
+        <p:spPr>
+          <a:xfrm>
+            <a:off x="7254657" y="533009"/>
+            <a:ext cx="4790587" cy="3107816"/>
+          </a:xfrm>
+          <a:prstGeom prst="rect">
+            <a:avLst/>
+          </a:prstGeom>
+        </p:spPr>
+      </p:pic>
+      <p:pic>
+        <p:nvPicPr>
+          <p:cNvPr id="6" name="Picture 5">
+            <a:extLst>
+              <a:ext uri="{FF2B5EF4-FFF2-40B4-BE49-F238E27FC236}">
+                <a16:creationId xmlns:a16="http://schemas.microsoft.com/office/drawing/2014/main" id="{3DA90E20-93E6-4C7E-A307-B0EA3EBB1432}"/>
+              </a:ext>
+            </a:extLst>
+          </p:cNvPr>
+          <p:cNvPicPr>
+            <a:picLocks noChangeAspect="1"/>
+          </p:cNvPicPr>
+          <p:nvPr/>
+        </p:nvPicPr>
+        <p:blipFill>
+          <a:blip r:embed="rId4">
+            <a:extLst>
+              <a:ext uri="{28A0092B-C50C-407E-A947-70E740481C1C}">
+                <a14:useLocalDpi xmlns:a14="http://schemas.microsoft.com/office/drawing/2010/main" val="0"/>
+              </a:ext>
+            </a:extLst>
+          </a:blip>
+          <a:srcRect/>
+          <a:stretch/>
+        </p:blipFill>
+        <p:spPr>
+          <a:xfrm>
+            <a:off x="7254657" y="3586702"/>
+            <a:ext cx="4790587" cy="3107817"/>
+          </a:xfrm>
+          <a:prstGeom prst="rect">
+            <a:avLst/>
+          </a:prstGeom>
+        </p:spPr>
+      </p:pic>
+      <p:sp>
+        <p:nvSpPr>
+          <p:cNvPr id="7" name="Rectangle 6">
+            <a:extLst>
+              <a:ext uri="{FF2B5EF4-FFF2-40B4-BE49-F238E27FC236}">
+                <a16:creationId xmlns:a16="http://schemas.microsoft.com/office/drawing/2014/main" id="{14F17B6B-F12B-4DBF-B2DD-834C9F8B5733}"/>
+              </a:ext>
+            </a:extLst>
+          </p:cNvPr>
+          <p:cNvSpPr/>
+          <p:nvPr/>
+        </p:nvSpPr>
+        <p:spPr>
+          <a:xfrm>
+            <a:off x="838200" y="1731532"/>
+            <a:ext cx="5625738" cy="4524315"/>
+          </a:xfrm>
+          <a:prstGeom prst="rect">
+            <a:avLst/>
+          </a:prstGeom>
+        </p:spPr>
+        <p:txBody>
+          <a:bodyPr wrap="square">
+            <a:spAutoFit/>
+          </a:bodyPr>
+          <a:lstStyle/>
+          <a:p>
+            <a:pPr marL="342900" indent="-342900">
+              <a:buFont typeface="Arial" panose="020B0604020202020204" pitchFamily="34" charset="0"/>
+              <a:buChar char="•"/>
+            </a:pPr>
+            <a:r>
+              <a:rPr lang="en-US" sz="2400" dirty="0">
+                <a:solidFill>
+                  <a:schemeClr val="tx1">
+                    <a:lumMod val="65000"/>
+                    <a:lumOff val="35000"/>
+                  </a:schemeClr>
+                </a:solidFill>
+              </a:rPr>
+              <a:t>Old Tweet: Team, App, wins best, phone, best Android</a:t>
+            </a:r>
+          </a:p>
+          <a:p>
+            <a:pPr marL="342900" indent="-342900">
+              <a:buFont typeface="Arial" panose="020B0604020202020204" pitchFamily="34" charset="0"/>
+              <a:buChar char="•"/>
+            </a:pPr>
+            <a:r>
+              <a:rPr lang="en-US" sz="2400" dirty="0">
+                <a:solidFill>
+                  <a:schemeClr val="tx1">
+                    <a:lumMod val="65000"/>
+                    <a:lumOff val="35000"/>
+                  </a:schemeClr>
+                </a:solidFill>
+              </a:rPr>
+              <a:t>New Tweet: app, music phone, device, Easy access</a:t>
+            </a:r>
+          </a:p>
+          <a:p>
+            <a:pPr marL="342900" indent="-342900">
+              <a:buFont typeface="Arial" panose="020B0604020202020204" pitchFamily="34" charset="0"/>
+              <a:buChar char="•"/>
+            </a:pPr>
+            <a:r>
+              <a:rPr lang="en-US" sz="2400" dirty="0">
+                <a:solidFill>
+                  <a:schemeClr val="tx1">
+                    <a:lumMod val="65000"/>
+                    <a:lumOff val="35000"/>
+                  </a:schemeClr>
+                </a:solidFill>
+              </a:rPr>
+              <a:t>Like the tweets about Apple, people seem to use their phones for music apps more. </a:t>
+            </a:r>
+          </a:p>
+          <a:p>
+            <a:pPr marL="342900" indent="-342900">
+              <a:buFont typeface="Arial" panose="020B0604020202020204" pitchFamily="34" charset="0"/>
+              <a:buChar char="•"/>
+            </a:pPr>
+            <a:r>
+              <a:rPr lang="en-US" sz="2400" dirty="0">
+                <a:solidFill>
+                  <a:schemeClr val="tx1">
+                    <a:lumMod val="65000"/>
+                    <a:lumOff val="35000"/>
+                  </a:schemeClr>
+                </a:solidFill>
+              </a:rPr>
+              <a:t>From the wording in the old tweets, there is a rivalry between the users of Android phones and iPhone users, which we can no longer observe in the new tweets.</a:t>
+            </a:r>
+          </a:p>
+        </p:txBody>
+      </p:sp>
+    </p:spTree>
+    <p:extLst>
+      <p:ext uri="{BB962C8B-B14F-4D97-AF65-F5344CB8AC3E}">
+        <p14:creationId xmlns:p14="http://schemas.microsoft.com/office/powerpoint/2010/main" val="1434097566"/>
+      </p:ext>
+    </p:extLst>
+  </p:cSld>
+  <p:clrMapOvr>
+    <a:masterClrMapping/>
+  </p:clrMapOvr>
+</p:sld>
+</file>
+
+<file path=ppt/slides/slide15.xml><?xml version="1.0" encoding="utf-8"?>
+<p:sld xmlns:a="http://schemas.openxmlformats.org/drawingml/2006/main" xmlns:r="http://schemas.openxmlformats.org/officeDocument/2006/relationships" xmlns:p="http://schemas.openxmlformats.org/presentationml/2006/main">
+  <p:cSld>
+    <p:bg>
+      <p:bgPr>
+        <a:solidFill>
+          <a:schemeClr val="bg1">
+            <a:lumMod val="95000"/>
+          </a:schemeClr>
+        </a:solidFill>
+        <a:effectLst/>
+      </p:bgPr>
+    </p:bg>
+    <p:spTree>
+      <p:nvGrpSpPr>
+        <p:cNvPr id="1" name=""/>
+        <p:cNvGrpSpPr/>
+        <p:nvPr/>
+      </p:nvGrpSpPr>
+      <p:grpSpPr>
+        <a:xfrm>
+          <a:off x="0" y="0"/>
+          <a:ext cx="0" cy="0"/>
+          <a:chOff x="0" y="0"/>
+          <a:chExt cx="0" cy="0"/>
+        </a:xfrm>
+      </p:grpSpPr>
+      <p:sp>
+        <p:nvSpPr>
+          <p:cNvPr id="2" name="Title 1">
+            <a:extLst>
+              <a:ext uri="{FF2B5EF4-FFF2-40B4-BE49-F238E27FC236}">
+                <a16:creationId xmlns:a16="http://schemas.microsoft.com/office/drawing/2014/main" id="{33101823-B7E8-4F9B-B03F-29FC1BF88595}"/>
+              </a:ext>
+            </a:extLst>
+          </p:cNvPr>
+          <p:cNvSpPr>
+            <a:spLocks noGrp="1"/>
+          </p:cNvSpPr>
+          <p:nvPr>
+            <p:ph type="title"/>
+          </p:nvPr>
+        </p:nvSpPr>
+        <p:spPr>
+          <a:xfrm>
+            <a:off x="838200" y="163481"/>
+            <a:ext cx="5449711" cy="739056"/>
+          </a:xfrm>
+        </p:spPr>
+        <p:txBody>
+          <a:bodyPr>
+            <a:normAutofit fontScale="90000"/>
+          </a:bodyPr>
+          <a:lstStyle/>
+          <a:p>
+            <a:r>
+              <a:rPr lang="en-US" dirty="0"/>
+              <a:t>Word Cloud Comparison: Neutral Sentiment Towards Android </a:t>
+            </a:r>
+          </a:p>
+        </p:txBody>
+      </p:sp>
+      <p:pic>
+        <p:nvPicPr>
+          <p:cNvPr id="4" name="Picture 3">
+            <a:extLst>
+              <a:ext uri="{FF2B5EF4-FFF2-40B4-BE49-F238E27FC236}">
+                <a16:creationId xmlns:a16="http://schemas.microsoft.com/office/drawing/2014/main" id="{0D942AE8-A76D-4F0F-8500-E3EBE80A3E1B}"/>
+              </a:ext>
+            </a:extLst>
+          </p:cNvPr>
+          <p:cNvPicPr>
+            <a:picLocks noChangeAspect="1"/>
+          </p:cNvPicPr>
+          <p:nvPr/>
+        </p:nvPicPr>
+        <p:blipFill>
+          <a:blip r:embed="rId3">
+            <a:extLst>
+              <a:ext uri="{28A0092B-C50C-407E-A947-70E740481C1C}">
+                <a14:useLocalDpi xmlns:a14="http://schemas.microsoft.com/office/drawing/2010/main" val="0"/>
+              </a:ext>
+            </a:extLst>
+          </a:blip>
+          <a:srcRect/>
+          <a:stretch/>
+        </p:blipFill>
+        <p:spPr>
+          <a:xfrm>
+            <a:off x="7302542" y="395332"/>
+            <a:ext cx="4889457" cy="3171957"/>
+          </a:xfrm>
+          <a:prstGeom prst="rect">
+            <a:avLst/>
+          </a:prstGeom>
+        </p:spPr>
+      </p:pic>
+      <p:pic>
+        <p:nvPicPr>
+          <p:cNvPr id="6" name="Picture 5">
+            <a:extLst>
+              <a:ext uri="{FF2B5EF4-FFF2-40B4-BE49-F238E27FC236}">
+                <a16:creationId xmlns:a16="http://schemas.microsoft.com/office/drawing/2014/main" id="{3DA90E20-93E6-4C7E-A307-B0EA3EBB1432}"/>
+              </a:ext>
+            </a:extLst>
+          </p:cNvPr>
+          <p:cNvPicPr>
+            <a:picLocks noChangeAspect="1"/>
+          </p:cNvPicPr>
+          <p:nvPr/>
+        </p:nvPicPr>
+        <p:blipFill>
+          <a:blip r:embed="rId4">
+            <a:extLst>
+              <a:ext uri="{28A0092B-C50C-407E-A947-70E740481C1C}">
+                <a14:useLocalDpi xmlns:a14="http://schemas.microsoft.com/office/drawing/2010/main" val="0"/>
+              </a:ext>
+            </a:extLst>
+          </a:blip>
+          <a:srcRect/>
+          <a:stretch/>
+        </p:blipFill>
+        <p:spPr>
+          <a:xfrm>
+            <a:off x="7302543" y="3567289"/>
+            <a:ext cx="4889457" cy="3171957"/>
+          </a:xfrm>
+          <a:prstGeom prst="rect">
+            <a:avLst/>
+          </a:prstGeom>
+        </p:spPr>
+      </p:pic>
+      <p:sp>
+        <p:nvSpPr>
+          <p:cNvPr id="8" name="Rectangle 7">
+            <a:extLst>
+              <a:ext uri="{FF2B5EF4-FFF2-40B4-BE49-F238E27FC236}">
+                <a16:creationId xmlns:a16="http://schemas.microsoft.com/office/drawing/2014/main" id="{2B56DA57-E4FA-49AF-B6F2-C1D5EB937563}"/>
+              </a:ext>
+            </a:extLst>
+          </p:cNvPr>
+          <p:cNvSpPr/>
+          <p:nvPr/>
+        </p:nvSpPr>
+        <p:spPr>
+          <a:xfrm>
+            <a:off x="838200" y="1731532"/>
+            <a:ext cx="5625738" cy="3785652"/>
+          </a:xfrm>
+          <a:prstGeom prst="rect">
+            <a:avLst/>
+          </a:prstGeom>
+        </p:spPr>
+        <p:txBody>
+          <a:bodyPr wrap="square">
+            <a:spAutoFit/>
+          </a:bodyPr>
+          <a:lstStyle/>
+          <a:p>
+            <a:pPr marL="342900" indent="-342900">
+              <a:buFont typeface="Arial" panose="020B0604020202020204" pitchFamily="34" charset="0"/>
+              <a:buChar char="•"/>
+            </a:pPr>
+            <a:r>
+              <a:rPr lang="en-US" sz="2400" dirty="0">
+                <a:solidFill>
+                  <a:schemeClr val="tx1">
+                    <a:lumMod val="65000"/>
+                    <a:lumOff val="35000"/>
+                  </a:schemeClr>
+                </a:solidFill>
+              </a:rPr>
+              <a:t>Old Tweet: app, New, Time, iOS, access, Platform, </a:t>
+            </a:r>
+            <a:r>
+              <a:rPr lang="en-US" sz="2400" dirty="0" err="1">
+                <a:solidFill>
+                  <a:schemeClr val="tx1">
+                    <a:lumMod val="65000"/>
+                    <a:lumOff val="35000"/>
+                  </a:schemeClr>
+                </a:solidFill>
+              </a:rPr>
+              <a:t>ChromeOS</a:t>
+            </a:r>
+            <a:endParaRPr lang="en-US" sz="2400" dirty="0">
+              <a:solidFill>
+                <a:schemeClr val="tx1">
+                  <a:lumMod val="65000"/>
+                  <a:lumOff val="35000"/>
+                </a:schemeClr>
+              </a:solidFill>
+            </a:endParaRPr>
+          </a:p>
+          <a:p>
+            <a:pPr marL="342900" indent="-342900">
+              <a:buFont typeface="Arial" panose="020B0604020202020204" pitchFamily="34" charset="0"/>
+              <a:buChar char="•"/>
+            </a:pPr>
+            <a:r>
+              <a:rPr lang="en-US" sz="2400" dirty="0">
+                <a:solidFill>
+                  <a:schemeClr val="tx1">
+                    <a:lumMod val="65000"/>
+                    <a:lumOff val="35000"/>
+                  </a:schemeClr>
+                </a:solidFill>
+              </a:rPr>
+              <a:t>New Tweet: app, music, Download, RADIO APP, iOS</a:t>
+            </a:r>
+          </a:p>
+          <a:p>
+            <a:pPr marL="342900" indent="-342900">
+              <a:buFont typeface="Arial" panose="020B0604020202020204" pitchFamily="34" charset="0"/>
+              <a:buChar char="•"/>
+            </a:pPr>
+            <a:r>
+              <a:rPr lang="en-US" sz="2400" dirty="0">
+                <a:solidFill>
+                  <a:schemeClr val="tx1">
+                    <a:lumMod val="65000"/>
+                    <a:lumOff val="35000"/>
+                  </a:schemeClr>
+                </a:solidFill>
+              </a:rPr>
+              <a:t>Both old and new tweets seem to focus on Android apps, and judging form the word iOS, these tweets seem to either compare the type of apps or show the availability in both the Google Play Store and the iOS App Store. </a:t>
+            </a:r>
+          </a:p>
+        </p:txBody>
+      </p:sp>
+    </p:spTree>
+    <p:extLst>
+      <p:ext uri="{BB962C8B-B14F-4D97-AF65-F5344CB8AC3E}">
+        <p14:creationId xmlns:p14="http://schemas.microsoft.com/office/powerpoint/2010/main" val="3236216137"/>
+      </p:ext>
+    </p:extLst>
+  </p:cSld>
+  <p:clrMapOvr>
+    <a:masterClrMapping/>
+  </p:clrMapOvr>
+</p:sld>
+</file>
+
+<file path=ppt/slides/slide16.xml><?xml version="1.0" encoding="utf-8"?>
 <p:sld xmlns:a="http://schemas.openxmlformats.org/drawingml/2006/main" xmlns:r="http://schemas.openxmlformats.org/officeDocument/2006/relationships" xmlns:p="http://schemas.openxmlformats.org/presentationml/2006/main">
   <p:cSld>
     <p:bg>
@@ -6304,7 +7748,7 @@
 </p:sld>
 </file>
 
-<file path=ppt/slides/slide14.xml><?xml version="1.0" encoding="utf-8"?>
+<file path=ppt/slides/slide17.xml><?xml version="1.0" encoding="utf-8"?>
 <p:sld xmlns:a="http://schemas.openxmlformats.org/drawingml/2006/main" xmlns:r="http://schemas.openxmlformats.org/officeDocument/2006/relationships" xmlns:p="http://schemas.openxmlformats.org/presentationml/2006/main">
   <p:cSld>
     <p:spTree>
@@ -6759,495 +8203,6 @@
 </p:sld>
 </file>
 
-<file path=ppt/slides/slide15.xml><?xml version="1.0" encoding="utf-8"?>
-<p:sld xmlns:a="http://schemas.openxmlformats.org/drawingml/2006/main" xmlns:r="http://schemas.openxmlformats.org/officeDocument/2006/relationships" xmlns:p="http://schemas.openxmlformats.org/presentationml/2006/main">
-  <p:cSld>
-    <p:spTree>
-      <p:nvGrpSpPr>
-        <p:cNvPr id="1" name=""/>
-        <p:cNvGrpSpPr/>
-        <p:nvPr/>
-      </p:nvGrpSpPr>
-      <p:grpSpPr>
-        <a:xfrm>
-          <a:off x="0" y="0"/>
-          <a:ext cx="0" cy="0"/>
-          <a:chOff x="0" y="0"/>
-          <a:chExt cx="0" cy="0"/>
-        </a:xfrm>
-      </p:grpSpPr>
-      <p:sp>
-        <p:nvSpPr>
-          <p:cNvPr id="2" name="Title 1">
-            <a:extLst>
-              <a:ext uri="{FF2B5EF4-FFF2-40B4-BE49-F238E27FC236}">
-                <a16:creationId xmlns:a16="http://schemas.microsoft.com/office/drawing/2014/main" id="{148CC2C7-94DC-40B4-A7A3-C779995D9F5E}"/>
-              </a:ext>
-            </a:extLst>
-          </p:cNvPr>
-          <p:cNvSpPr>
-            <a:spLocks noGrp="1"/>
-          </p:cNvSpPr>
-          <p:nvPr>
-            <p:ph type="title"/>
-          </p:nvPr>
-        </p:nvSpPr>
-        <p:spPr>
-          <a:xfrm>
-            <a:off x="907868" y="2689944"/>
-            <a:ext cx="10515600" cy="739056"/>
-          </a:xfrm>
-        </p:spPr>
-        <p:txBody>
-          <a:bodyPr>
-            <a:normAutofit fontScale="90000"/>
-          </a:bodyPr>
-          <a:lstStyle/>
-          <a:p>
-            <a:pPr algn="ctr"/>
-            <a:r>
-              <a:rPr lang="en-US" sz="9800" dirty="0"/>
-              <a:t>Thank You</a:t>
-            </a:r>
-            <a:br>
-              <a:rPr lang="en-US" dirty="0"/>
-            </a:br>
-            <a:r>
-              <a:rPr lang="en-US" dirty="0"/>
-              <a:t>Q&amp;A</a:t>
-            </a:r>
-          </a:p>
-        </p:txBody>
-      </p:sp>
-    </p:spTree>
-    <p:extLst>
-      <p:ext uri="{BB962C8B-B14F-4D97-AF65-F5344CB8AC3E}">
-        <p14:creationId xmlns:p14="http://schemas.microsoft.com/office/powerpoint/2010/main" val="3463978095"/>
-      </p:ext>
-    </p:extLst>
-  </p:cSld>
-  <p:clrMapOvr>
-    <a:masterClrMapping/>
-  </p:clrMapOvr>
-</p:sld>
-</file>
-
-<file path=ppt/slides/slide16.xml><?xml version="1.0" encoding="utf-8"?>
-<p:sld xmlns:a="http://schemas.openxmlformats.org/drawingml/2006/main" xmlns:r="http://schemas.openxmlformats.org/officeDocument/2006/relationships" xmlns:p="http://schemas.openxmlformats.org/presentationml/2006/main">
-  <p:cSld>
-    <p:spTree>
-      <p:nvGrpSpPr>
-        <p:cNvPr id="1" name=""/>
-        <p:cNvGrpSpPr/>
-        <p:nvPr/>
-      </p:nvGrpSpPr>
-      <p:grpSpPr>
-        <a:xfrm>
-          <a:off x="0" y="0"/>
-          <a:ext cx="0" cy="0"/>
-          <a:chOff x="0" y="0"/>
-          <a:chExt cx="0" cy="0"/>
-        </a:xfrm>
-      </p:grpSpPr>
-      <p:sp>
-        <p:nvSpPr>
-          <p:cNvPr id="2" name="Title 1">
-            <a:extLst>
-              <a:ext uri="{FF2B5EF4-FFF2-40B4-BE49-F238E27FC236}">
-                <a16:creationId xmlns:a16="http://schemas.microsoft.com/office/drawing/2014/main" id="{85BFC2D1-07F0-4E13-B620-194934AD87CF}"/>
-              </a:ext>
-            </a:extLst>
-          </p:cNvPr>
-          <p:cNvSpPr>
-            <a:spLocks noGrp="1"/>
-          </p:cNvSpPr>
-          <p:nvPr>
-            <p:ph type="title"/>
-          </p:nvPr>
-        </p:nvSpPr>
-        <p:spPr/>
-        <p:txBody>
-          <a:bodyPr>
-            <a:normAutofit fontScale="90000"/>
-          </a:bodyPr>
-          <a:lstStyle/>
-          <a:p>
-            <a:r>
-              <a:rPr lang="en-US" dirty="0" err="1"/>
-              <a:t>Appendx</a:t>
-            </a:r>
-            <a:r>
-              <a:rPr lang="en-US" dirty="0"/>
-              <a:t>: Random Forest Base model and Pipeline (Old Tweet)</a:t>
-            </a:r>
-          </a:p>
-        </p:txBody>
-      </p:sp>
-      <p:pic>
-        <p:nvPicPr>
-          <p:cNvPr id="4" name="Picture 3" descr="Chart, treemap chart&#10;&#10;Description automatically generated">
-            <a:extLst>
-              <a:ext uri="{FF2B5EF4-FFF2-40B4-BE49-F238E27FC236}">
-                <a16:creationId xmlns:a16="http://schemas.microsoft.com/office/drawing/2014/main" id="{1F4C5A53-FBF8-4502-A3BE-22F6B30D4D76}"/>
-              </a:ext>
-            </a:extLst>
-          </p:cNvPr>
-          <p:cNvPicPr>
-            <a:picLocks noChangeAspect="1"/>
-          </p:cNvPicPr>
-          <p:nvPr/>
-        </p:nvPicPr>
-        <p:blipFill>
-          <a:blip r:embed="rId2">
-            <a:extLst>
-              <a:ext uri="{28A0092B-C50C-407E-A947-70E740481C1C}">
-                <a14:useLocalDpi xmlns:a14="http://schemas.microsoft.com/office/drawing/2010/main" val="0"/>
-              </a:ext>
-            </a:extLst>
-          </a:blip>
-          <a:stretch>
-            <a:fillRect/>
-          </a:stretch>
-        </p:blipFill>
-        <p:spPr>
-          <a:xfrm>
-            <a:off x="6614853" y="1420492"/>
-            <a:ext cx="4855464" cy="5437507"/>
-          </a:xfrm>
-          <a:prstGeom prst="rect">
-            <a:avLst/>
-          </a:prstGeom>
-        </p:spPr>
-      </p:pic>
-      <p:pic>
-        <p:nvPicPr>
-          <p:cNvPr id="6" name="Picture 5" descr="Chart, treemap chart&#10;&#10;Description automatically generated">
-            <a:extLst>
-              <a:ext uri="{FF2B5EF4-FFF2-40B4-BE49-F238E27FC236}">
-                <a16:creationId xmlns:a16="http://schemas.microsoft.com/office/drawing/2014/main" id="{753364F9-C1F5-4944-8627-0EFEEDB956FD}"/>
-              </a:ext>
-            </a:extLst>
-          </p:cNvPr>
-          <p:cNvPicPr>
-            <a:picLocks noChangeAspect="1"/>
-          </p:cNvPicPr>
-          <p:nvPr/>
-        </p:nvPicPr>
-        <p:blipFill>
-          <a:blip r:embed="rId3">
-            <a:extLst>
-              <a:ext uri="{28A0092B-C50C-407E-A947-70E740481C1C}">
-                <a14:useLocalDpi xmlns:a14="http://schemas.microsoft.com/office/drawing/2010/main" val="0"/>
-              </a:ext>
-            </a:extLst>
-          </a:blip>
-          <a:stretch>
-            <a:fillRect/>
-          </a:stretch>
-        </p:blipFill>
-        <p:spPr>
-          <a:xfrm>
-            <a:off x="838200" y="1420492"/>
-            <a:ext cx="4855464" cy="5411899"/>
-          </a:xfrm>
-          <a:prstGeom prst="rect">
-            <a:avLst/>
-          </a:prstGeom>
-        </p:spPr>
-      </p:pic>
-      <p:sp>
-        <p:nvSpPr>
-          <p:cNvPr id="7" name="TextBox 6">
-            <a:extLst>
-              <a:ext uri="{FF2B5EF4-FFF2-40B4-BE49-F238E27FC236}">
-                <a16:creationId xmlns:a16="http://schemas.microsoft.com/office/drawing/2014/main" id="{2A3D876D-6908-4B8A-B53F-7CE788381D7B}"/>
-              </a:ext>
-            </a:extLst>
-          </p:cNvPr>
-          <p:cNvSpPr txBox="1"/>
-          <p:nvPr/>
-        </p:nvSpPr>
-        <p:spPr>
-          <a:xfrm>
-            <a:off x="2257587" y="1060098"/>
-            <a:ext cx="2016690" cy="369332"/>
-          </a:xfrm>
-          <a:prstGeom prst="rect">
-            <a:avLst/>
-          </a:prstGeom>
-          <a:noFill/>
-        </p:spPr>
-        <p:txBody>
-          <a:bodyPr wrap="square" rtlCol="0">
-            <a:spAutoFit/>
-          </a:bodyPr>
-          <a:lstStyle/>
-          <a:p>
-            <a:pPr algn="ctr"/>
-            <a:r>
-              <a:rPr lang="en-US" dirty="0"/>
-              <a:t>Base</a:t>
-            </a:r>
-          </a:p>
-        </p:txBody>
-      </p:sp>
-      <p:sp>
-        <p:nvSpPr>
-          <p:cNvPr id="8" name="TextBox 7">
-            <a:extLst>
-              <a:ext uri="{FF2B5EF4-FFF2-40B4-BE49-F238E27FC236}">
-                <a16:creationId xmlns:a16="http://schemas.microsoft.com/office/drawing/2014/main" id="{69B7906D-2577-4C1C-A250-0EAFDBEAA775}"/>
-              </a:ext>
-            </a:extLst>
-          </p:cNvPr>
-          <p:cNvSpPr txBox="1"/>
-          <p:nvPr/>
-        </p:nvSpPr>
-        <p:spPr>
-          <a:xfrm>
-            <a:off x="8034240" y="1000874"/>
-            <a:ext cx="2016690" cy="369332"/>
-          </a:xfrm>
-          <a:prstGeom prst="rect">
-            <a:avLst/>
-          </a:prstGeom>
-          <a:noFill/>
-        </p:spPr>
-        <p:txBody>
-          <a:bodyPr wrap="square" rtlCol="0">
-            <a:spAutoFit/>
-          </a:bodyPr>
-          <a:lstStyle/>
-          <a:p>
-            <a:pPr algn="ctr"/>
-            <a:r>
-              <a:rPr lang="en-US" dirty="0" err="1"/>
-              <a:t>Piepeline</a:t>
-            </a:r>
-            <a:endParaRPr lang="en-US" dirty="0"/>
-          </a:p>
-        </p:txBody>
-      </p:sp>
-    </p:spTree>
-    <p:extLst>
-      <p:ext uri="{BB962C8B-B14F-4D97-AF65-F5344CB8AC3E}">
-        <p14:creationId xmlns:p14="http://schemas.microsoft.com/office/powerpoint/2010/main" val="284740002"/>
-      </p:ext>
-    </p:extLst>
-  </p:cSld>
-  <p:clrMapOvr>
-    <a:masterClrMapping/>
-  </p:clrMapOvr>
-</p:sld>
-</file>
-
-<file path=ppt/slides/slide17.xml><?xml version="1.0" encoding="utf-8"?>
-<p:sld xmlns:a="http://schemas.openxmlformats.org/drawingml/2006/main" xmlns:r="http://schemas.openxmlformats.org/officeDocument/2006/relationships" xmlns:p="http://schemas.openxmlformats.org/presentationml/2006/main">
-  <p:cSld>
-    <p:spTree>
-      <p:nvGrpSpPr>
-        <p:cNvPr id="1" name=""/>
-        <p:cNvGrpSpPr/>
-        <p:nvPr/>
-      </p:nvGrpSpPr>
-      <p:grpSpPr>
-        <a:xfrm>
-          <a:off x="0" y="0"/>
-          <a:ext cx="0" cy="0"/>
-          <a:chOff x="0" y="0"/>
-          <a:chExt cx="0" cy="0"/>
-        </a:xfrm>
-      </p:grpSpPr>
-      <p:sp>
-        <p:nvSpPr>
-          <p:cNvPr id="2" name="Title 1">
-            <a:extLst>
-              <a:ext uri="{FF2B5EF4-FFF2-40B4-BE49-F238E27FC236}">
-                <a16:creationId xmlns:a16="http://schemas.microsoft.com/office/drawing/2014/main" id="{85BFC2D1-07F0-4E13-B620-194934AD87CF}"/>
-              </a:ext>
-            </a:extLst>
-          </p:cNvPr>
-          <p:cNvSpPr>
-            <a:spLocks noGrp="1"/>
-          </p:cNvSpPr>
-          <p:nvPr>
-            <p:ph type="title"/>
-          </p:nvPr>
-        </p:nvSpPr>
-        <p:spPr/>
-        <p:txBody>
-          <a:bodyPr>
-            <a:normAutofit fontScale="90000"/>
-          </a:bodyPr>
-          <a:lstStyle/>
-          <a:p>
-            <a:r>
-              <a:rPr lang="en-US" dirty="0" err="1"/>
-              <a:t>Appendx</a:t>
-            </a:r>
-            <a:r>
-              <a:rPr lang="en-US" dirty="0"/>
-              <a:t>: Random Forest Base model and Pipeline (New Tweet)</a:t>
-            </a:r>
-          </a:p>
-        </p:txBody>
-      </p:sp>
-      <p:pic>
-        <p:nvPicPr>
-          <p:cNvPr id="3" name="Picture 2">
-            <a:extLst>
-              <a:ext uri="{FF2B5EF4-FFF2-40B4-BE49-F238E27FC236}">
-                <a16:creationId xmlns:a16="http://schemas.microsoft.com/office/drawing/2014/main" id="{9FBB54F7-4ED2-426E-82A4-2E4724F18B15}"/>
-              </a:ext>
-            </a:extLst>
-          </p:cNvPr>
-          <p:cNvPicPr>
-            <a:picLocks noChangeAspect="1"/>
-          </p:cNvPicPr>
-          <p:nvPr/>
-        </p:nvPicPr>
-        <p:blipFill>
-          <a:blip r:embed="rId2">
-            <a:extLst>
-              <a:ext uri="{28A0092B-C50C-407E-A947-70E740481C1C}">
-                <a14:useLocalDpi xmlns:a14="http://schemas.microsoft.com/office/drawing/2010/main" val="0"/>
-              </a:ext>
-            </a:extLst>
-          </a:blip>
-          <a:srcRect/>
-          <a:stretch/>
-        </p:blipFill>
-        <p:spPr>
-          <a:xfrm>
-            <a:off x="6687342" y="1420492"/>
-            <a:ext cx="4710486" cy="5437507"/>
-          </a:xfrm>
-          <a:prstGeom prst="rect">
-            <a:avLst/>
-          </a:prstGeom>
-        </p:spPr>
-      </p:pic>
-      <p:pic>
-        <p:nvPicPr>
-          <p:cNvPr id="4" name="Picture 3">
-            <a:extLst>
-              <a:ext uri="{FF2B5EF4-FFF2-40B4-BE49-F238E27FC236}">
-                <a16:creationId xmlns:a16="http://schemas.microsoft.com/office/drawing/2014/main" id="{B0D9F23A-D3A1-4A2F-ADB5-428121E8CF42}"/>
-              </a:ext>
-            </a:extLst>
-          </p:cNvPr>
-          <p:cNvPicPr>
-            <a:picLocks noChangeAspect="1"/>
-          </p:cNvPicPr>
-          <p:nvPr/>
-        </p:nvPicPr>
-        <p:blipFill>
-          <a:blip r:embed="rId3">
-            <a:extLst>
-              <a:ext uri="{28A0092B-C50C-407E-A947-70E740481C1C}">
-                <a14:useLocalDpi xmlns:a14="http://schemas.microsoft.com/office/drawing/2010/main" val="0"/>
-              </a:ext>
-            </a:extLst>
-          </a:blip>
-          <a:srcRect/>
-          <a:stretch/>
-        </p:blipFill>
-        <p:spPr>
-          <a:xfrm>
-            <a:off x="880123" y="1420492"/>
-            <a:ext cx="4771617" cy="5411899"/>
-          </a:xfrm>
-          <a:prstGeom prst="rect">
-            <a:avLst/>
-          </a:prstGeom>
-        </p:spPr>
-      </p:pic>
-      <p:sp>
-        <p:nvSpPr>
-          <p:cNvPr id="5" name="TextBox 4">
-            <a:extLst>
-              <a:ext uri="{FF2B5EF4-FFF2-40B4-BE49-F238E27FC236}">
-                <a16:creationId xmlns:a16="http://schemas.microsoft.com/office/drawing/2014/main" id="{7CBEFEF6-5DB6-44BD-ADC8-6AC6DA14BC80}"/>
-              </a:ext>
-            </a:extLst>
-          </p:cNvPr>
-          <p:cNvSpPr txBox="1"/>
-          <p:nvPr/>
-        </p:nvSpPr>
-        <p:spPr>
-          <a:xfrm>
-            <a:off x="2257587" y="1060098"/>
-            <a:ext cx="2016690" cy="369332"/>
-          </a:xfrm>
-          <a:prstGeom prst="rect">
-            <a:avLst/>
-          </a:prstGeom>
-          <a:noFill/>
-        </p:spPr>
-        <p:txBody>
-          <a:bodyPr wrap="square" rtlCol="0">
-            <a:spAutoFit/>
-          </a:bodyPr>
-          <a:lstStyle/>
-          <a:p>
-            <a:pPr algn="ctr"/>
-            <a:r>
-              <a:rPr lang="en-US" dirty="0"/>
-              <a:t>Base</a:t>
-            </a:r>
-          </a:p>
-        </p:txBody>
-      </p:sp>
-      <p:sp>
-        <p:nvSpPr>
-          <p:cNvPr id="6" name="TextBox 5">
-            <a:extLst>
-              <a:ext uri="{FF2B5EF4-FFF2-40B4-BE49-F238E27FC236}">
-                <a16:creationId xmlns:a16="http://schemas.microsoft.com/office/drawing/2014/main" id="{23F5D8B8-CAD8-4546-A79B-694F49A74BD8}"/>
-              </a:ext>
-            </a:extLst>
-          </p:cNvPr>
-          <p:cNvSpPr txBox="1"/>
-          <p:nvPr/>
-        </p:nvSpPr>
-        <p:spPr>
-          <a:xfrm>
-            <a:off x="8034240" y="1000874"/>
-            <a:ext cx="2016690" cy="369332"/>
-          </a:xfrm>
-          <a:prstGeom prst="rect">
-            <a:avLst/>
-          </a:prstGeom>
-          <a:noFill/>
-        </p:spPr>
-        <p:txBody>
-          <a:bodyPr wrap="square" rtlCol="0">
-            <a:spAutoFit/>
-          </a:bodyPr>
-          <a:lstStyle/>
-          <a:p>
-            <a:pPr algn="ctr"/>
-            <a:r>
-              <a:rPr lang="en-US" dirty="0" err="1"/>
-              <a:t>Piepeline</a:t>
-            </a:r>
-            <a:endParaRPr lang="en-US" dirty="0"/>
-          </a:p>
-        </p:txBody>
-      </p:sp>
-    </p:spTree>
-    <p:extLst>
-      <p:ext uri="{BB962C8B-B14F-4D97-AF65-F5344CB8AC3E}">
-        <p14:creationId xmlns:p14="http://schemas.microsoft.com/office/powerpoint/2010/main" val="3701945742"/>
-      </p:ext>
-    </p:extLst>
-  </p:cSld>
-  <p:clrMapOvr>
-    <a:masterClrMapping/>
-  </p:clrMapOvr>
-</p:sld>
-</file>
-
 <file path=ppt/slides/slide18.xml><?xml version="1.0" encoding="utf-8"?>
 <p:sld xmlns:a="http://schemas.openxmlformats.org/drawingml/2006/main" xmlns:r="http://schemas.openxmlformats.org/officeDocument/2006/relationships" xmlns:p="http://schemas.openxmlformats.org/presentationml/2006/main">
   <p:cSld>
@@ -7270,7 +8225,7 @@
           <p:cNvPr id="2" name="Title 1">
             <a:extLst>
               <a:ext uri="{FF2B5EF4-FFF2-40B4-BE49-F238E27FC236}">
-                <a16:creationId xmlns:a16="http://schemas.microsoft.com/office/drawing/2014/main" id="{85BFC2D1-07F0-4E13-B620-194934AD87CF}"/>
+                <a16:creationId xmlns:a16="http://schemas.microsoft.com/office/drawing/2014/main" id="{148CC2C7-94DC-40B4-A7A3-C779995D9F5E}"/>
               </a:ext>
             </a:extLst>
           </p:cNvPr>
@@ -7281,162 +8236,29 @@
             <p:ph type="title"/>
           </p:nvPr>
         </p:nvSpPr>
-        <p:spPr/>
+        <p:spPr>
+          <a:xfrm>
+            <a:off x="907868" y="2689944"/>
+            <a:ext cx="10515600" cy="739056"/>
+          </a:xfrm>
+        </p:spPr>
         <p:txBody>
           <a:bodyPr>
             <a:normAutofit fontScale="90000"/>
           </a:bodyPr>
           <a:lstStyle/>
           <a:p>
-            <a:r>
-              <a:rPr lang="en-US" dirty="0" err="1"/>
-              <a:t>Appendx</a:t>
-            </a:r>
-            <a:r>
+            <a:pPr algn="ctr"/>
+            <a:r>
+              <a:rPr lang="en-US" sz="9800" dirty="0"/>
+              <a:t>Thank You</a:t>
+            </a:r>
+            <a:br>
               <a:rPr lang="en-US" dirty="0"/>
-              <a:t>: Naïve Bayesian Base model and Grid Search (Old Tweet)</a:t>
-            </a:r>
-          </a:p>
-        </p:txBody>
-      </p:sp>
-      <p:pic>
-        <p:nvPicPr>
-          <p:cNvPr id="3" name="Picture 2">
-            <a:extLst>
-              <a:ext uri="{FF2B5EF4-FFF2-40B4-BE49-F238E27FC236}">
-                <a16:creationId xmlns:a16="http://schemas.microsoft.com/office/drawing/2014/main" id="{5DF3EBF4-05EB-4FC0-B904-4CCC6AA0F4E3}"/>
-              </a:ext>
-            </a:extLst>
-          </p:cNvPr>
-          <p:cNvPicPr>
-            <a:picLocks noChangeAspect="1"/>
-          </p:cNvPicPr>
-          <p:nvPr/>
-        </p:nvPicPr>
-        <p:blipFill>
-          <a:blip r:embed="rId2">
-            <a:extLst>
-              <a:ext uri="{28A0092B-C50C-407E-A947-70E740481C1C}">
-                <a14:useLocalDpi xmlns:a14="http://schemas.microsoft.com/office/drawing/2010/main" val="0"/>
-              </a:ext>
-            </a:extLst>
-          </a:blip>
-          <a:srcRect/>
-          <a:stretch/>
-        </p:blipFill>
-        <p:spPr>
-          <a:xfrm>
-            <a:off x="6671228" y="1420492"/>
-            <a:ext cx="4742714" cy="5437507"/>
-          </a:xfrm>
-          <a:prstGeom prst="rect">
-            <a:avLst/>
-          </a:prstGeom>
-        </p:spPr>
-      </p:pic>
-      <p:pic>
-        <p:nvPicPr>
-          <p:cNvPr id="4" name="Picture 3">
-            <a:extLst>
-              <a:ext uri="{FF2B5EF4-FFF2-40B4-BE49-F238E27FC236}">
-                <a16:creationId xmlns:a16="http://schemas.microsoft.com/office/drawing/2014/main" id="{9B95F1E7-B7FE-4350-A51B-EAD63E47028D}"/>
-              </a:ext>
-            </a:extLst>
-          </p:cNvPr>
-          <p:cNvPicPr>
-            <a:picLocks noChangeAspect="1"/>
-          </p:cNvPicPr>
-          <p:nvPr/>
-        </p:nvPicPr>
-        <p:blipFill>
-          <a:blip r:embed="rId3">
-            <a:extLst>
-              <a:ext uri="{28A0092B-C50C-407E-A947-70E740481C1C}">
-                <a14:useLocalDpi xmlns:a14="http://schemas.microsoft.com/office/drawing/2010/main" val="0"/>
-              </a:ext>
-            </a:extLst>
-          </a:blip>
-          <a:srcRect/>
-          <a:stretch/>
-        </p:blipFill>
-        <p:spPr>
-          <a:xfrm>
-            <a:off x="838200" y="1420928"/>
-            <a:ext cx="4855464" cy="5411026"/>
-          </a:xfrm>
-          <a:prstGeom prst="rect">
-            <a:avLst/>
-          </a:prstGeom>
-        </p:spPr>
-      </p:pic>
-      <p:sp>
-        <p:nvSpPr>
-          <p:cNvPr id="5" name="TextBox 4">
-            <a:extLst>
-              <a:ext uri="{FF2B5EF4-FFF2-40B4-BE49-F238E27FC236}">
-                <a16:creationId xmlns:a16="http://schemas.microsoft.com/office/drawing/2014/main" id="{F267E81E-70C4-44B1-BD0F-91EF99761667}"/>
-              </a:ext>
-            </a:extLst>
-          </p:cNvPr>
-          <p:cNvSpPr txBox="1"/>
-          <p:nvPr/>
-        </p:nvSpPr>
-        <p:spPr>
-          <a:xfrm>
-            <a:off x="2257587" y="1060098"/>
-            <a:ext cx="2016690" cy="369332"/>
-          </a:xfrm>
-          <a:prstGeom prst="rect">
-            <a:avLst/>
-          </a:prstGeom>
-          <a:noFill/>
-        </p:spPr>
-        <p:txBody>
-          <a:bodyPr wrap="square" rtlCol="0">
-            <a:spAutoFit/>
-          </a:bodyPr>
-          <a:lstStyle/>
-          <a:p>
-            <a:pPr algn="ctr"/>
+            </a:br>
             <a:r>
               <a:rPr lang="en-US" dirty="0"/>
-              <a:t>Base</a:t>
-            </a:r>
-          </a:p>
-        </p:txBody>
-      </p:sp>
-      <p:sp>
-        <p:nvSpPr>
-          <p:cNvPr id="6" name="TextBox 5">
-            <a:extLst>
-              <a:ext uri="{FF2B5EF4-FFF2-40B4-BE49-F238E27FC236}">
-                <a16:creationId xmlns:a16="http://schemas.microsoft.com/office/drawing/2014/main" id="{00368D60-4075-461A-90C0-1763D2558FCA}"/>
-              </a:ext>
-            </a:extLst>
-          </p:cNvPr>
-          <p:cNvSpPr txBox="1"/>
-          <p:nvPr/>
-        </p:nvSpPr>
-        <p:spPr>
-          <a:xfrm>
-            <a:off x="8034240" y="1000874"/>
-            <a:ext cx="2016690" cy="369332"/>
-          </a:xfrm>
-          <a:prstGeom prst="rect">
-            <a:avLst/>
-          </a:prstGeom>
-          <a:noFill/>
-        </p:spPr>
-        <p:txBody>
-          <a:bodyPr wrap="square" rtlCol="0">
-            <a:spAutoFit/>
-          </a:bodyPr>
-          <a:lstStyle/>
-          <a:p>
-            <a:pPr algn="ctr"/>
-            <a:r>
-              <a:rPr lang="en-US" dirty="0"/>
-              <a:t>Grid Search</a:t>
+              <a:t>Q&amp;A</a:t>
             </a:r>
           </a:p>
         </p:txBody>
@@ -7444,7 +8266,7 @@
     </p:spTree>
     <p:extLst>
       <p:ext uri="{BB962C8B-B14F-4D97-AF65-F5344CB8AC3E}">
-        <p14:creationId xmlns:p14="http://schemas.microsoft.com/office/powerpoint/2010/main" val="1708327473"/>
+        <p14:creationId xmlns:p14="http://schemas.microsoft.com/office/powerpoint/2010/main" val="3463978095"/>
       </p:ext>
     </p:extLst>
   </p:cSld>
@@ -7500,17 +8322,17 @@
             </a:r>
             <a:r>
               <a:rPr lang="en-US" dirty="0"/>
-              <a:t>: Naïve Bayesian Base model and Grid Search (New Tweet)</a:t>
+              <a:t>: Random Forest Base model and Pipeline (Old Tweet)</a:t>
             </a:r>
           </a:p>
         </p:txBody>
       </p:sp>
       <p:pic>
         <p:nvPicPr>
-          <p:cNvPr id="3" name="Picture 2">
+          <p:cNvPr id="4" name="Picture 3" descr="Chart, treemap chart&#10;&#10;Description automatically generated">
             <a:extLst>
               <a:ext uri="{FF2B5EF4-FFF2-40B4-BE49-F238E27FC236}">
-                <a16:creationId xmlns:a16="http://schemas.microsoft.com/office/drawing/2014/main" id="{29D1D51D-641E-4651-BCDA-C81EC02EE3BA}"/>
+                <a16:creationId xmlns:a16="http://schemas.microsoft.com/office/drawing/2014/main" id="{1F4C5A53-FBF8-4502-A3BE-22F6B30D4D76}"/>
               </a:ext>
             </a:extLst>
           </p:cNvPr>
@@ -7527,13 +8349,14 @@
               </a:ext>
             </a:extLst>
           </a:blip>
-          <a:srcRect/>
-          <a:stretch/>
+          <a:stretch>
+            <a:fillRect/>
+          </a:stretch>
         </p:blipFill>
         <p:spPr>
           <a:xfrm>
-            <a:off x="6634330" y="1420492"/>
-            <a:ext cx="4816510" cy="5437507"/>
+            <a:off x="6614853" y="1420492"/>
+            <a:ext cx="4855464" cy="5437507"/>
           </a:xfrm>
           <a:prstGeom prst="rect">
             <a:avLst/>
@@ -7542,10 +8365,10 @@
       </p:pic>
       <p:pic>
         <p:nvPicPr>
-          <p:cNvPr id="4" name="Picture 3">
+          <p:cNvPr id="6" name="Picture 5" descr="Chart, treemap chart&#10;&#10;Description automatically generated">
             <a:extLst>
               <a:ext uri="{FF2B5EF4-FFF2-40B4-BE49-F238E27FC236}">
-                <a16:creationId xmlns:a16="http://schemas.microsoft.com/office/drawing/2014/main" id="{3D01ABC4-F88F-4AAE-942B-4D977DCD6927}"/>
+                <a16:creationId xmlns:a16="http://schemas.microsoft.com/office/drawing/2014/main" id="{753364F9-C1F5-4944-8627-0EFEEDB956FD}"/>
               </a:ext>
             </a:extLst>
           </p:cNvPr>
@@ -7562,13 +8385,14 @@
               </a:ext>
             </a:extLst>
           </a:blip>
-          <a:srcRect/>
-          <a:stretch/>
+          <a:stretch>
+            <a:fillRect/>
+          </a:stretch>
         </p:blipFill>
         <p:spPr>
           <a:xfrm>
-            <a:off x="887745" y="1420492"/>
-            <a:ext cx="4756373" cy="5411899"/>
+            <a:off x="838200" y="1420492"/>
+            <a:ext cx="4855464" cy="5411899"/>
           </a:xfrm>
           <a:prstGeom prst="rect">
             <a:avLst/>
@@ -7577,10 +8401,10 @@
       </p:pic>
       <p:sp>
         <p:nvSpPr>
-          <p:cNvPr id="5" name="TextBox 4">
+          <p:cNvPr id="7" name="TextBox 6">
             <a:extLst>
               <a:ext uri="{FF2B5EF4-FFF2-40B4-BE49-F238E27FC236}">
-                <a16:creationId xmlns:a16="http://schemas.microsoft.com/office/drawing/2014/main" id="{2DFF40BA-5CC4-45CC-AED5-3F14EEA70347}"/>
+                <a16:creationId xmlns:a16="http://schemas.microsoft.com/office/drawing/2014/main" id="{2A3D876D-6908-4B8A-B53F-7CE788381D7B}"/>
               </a:ext>
             </a:extLst>
           </p:cNvPr>
@@ -7613,10 +8437,10 @@
       </p:sp>
       <p:sp>
         <p:nvSpPr>
-          <p:cNvPr id="6" name="TextBox 5">
+          <p:cNvPr id="8" name="TextBox 7">
             <a:extLst>
               <a:ext uri="{FF2B5EF4-FFF2-40B4-BE49-F238E27FC236}">
-                <a16:creationId xmlns:a16="http://schemas.microsoft.com/office/drawing/2014/main" id="{9169320A-00D0-4A08-B1C9-A38AA9F035C9}"/>
+                <a16:creationId xmlns:a16="http://schemas.microsoft.com/office/drawing/2014/main" id="{69B7906D-2577-4C1C-A250-0EAFDBEAA775}"/>
               </a:ext>
             </a:extLst>
           </p:cNvPr>
@@ -7641,16 +8465,17 @@
           <a:p>
             <a:pPr algn="ctr"/>
             <a:r>
-              <a:rPr lang="en-US" dirty="0"/>
-              <a:t>Grid Search</a:t>
-            </a:r>
+              <a:rPr lang="en-US" dirty="0" err="1"/>
+              <a:t>Piepeline</a:t>
+            </a:r>
+            <a:endParaRPr lang="en-US" dirty="0"/>
           </a:p>
         </p:txBody>
       </p:sp>
     </p:spTree>
     <p:extLst>
       <p:ext uri="{BB962C8B-B14F-4D97-AF65-F5344CB8AC3E}">
-        <p14:creationId xmlns:p14="http://schemas.microsoft.com/office/powerpoint/2010/main" val="3874558146"/>
+        <p14:creationId xmlns:p14="http://schemas.microsoft.com/office/powerpoint/2010/main" val="284740002"/>
       </p:ext>
     </p:extLst>
   </p:cSld>
@@ -8102,6 +8927,625 @@
 </p:sld>
 </file>
 
+<file path=ppt/slides/slide20.xml><?xml version="1.0" encoding="utf-8"?>
+<p:sld xmlns:a="http://schemas.openxmlformats.org/drawingml/2006/main" xmlns:r="http://schemas.openxmlformats.org/officeDocument/2006/relationships" xmlns:p="http://schemas.openxmlformats.org/presentationml/2006/main">
+  <p:cSld>
+    <p:spTree>
+      <p:nvGrpSpPr>
+        <p:cNvPr id="1" name=""/>
+        <p:cNvGrpSpPr/>
+        <p:nvPr/>
+      </p:nvGrpSpPr>
+      <p:grpSpPr>
+        <a:xfrm>
+          <a:off x="0" y="0"/>
+          <a:ext cx="0" cy="0"/>
+          <a:chOff x="0" y="0"/>
+          <a:chExt cx="0" cy="0"/>
+        </a:xfrm>
+      </p:grpSpPr>
+      <p:sp>
+        <p:nvSpPr>
+          <p:cNvPr id="2" name="Title 1">
+            <a:extLst>
+              <a:ext uri="{FF2B5EF4-FFF2-40B4-BE49-F238E27FC236}">
+                <a16:creationId xmlns:a16="http://schemas.microsoft.com/office/drawing/2014/main" id="{85BFC2D1-07F0-4E13-B620-194934AD87CF}"/>
+              </a:ext>
+            </a:extLst>
+          </p:cNvPr>
+          <p:cNvSpPr>
+            <a:spLocks noGrp="1"/>
+          </p:cNvSpPr>
+          <p:nvPr>
+            <p:ph type="title"/>
+          </p:nvPr>
+        </p:nvSpPr>
+        <p:spPr/>
+        <p:txBody>
+          <a:bodyPr>
+            <a:normAutofit fontScale="90000"/>
+          </a:bodyPr>
+          <a:lstStyle/>
+          <a:p>
+            <a:r>
+              <a:rPr lang="en-US" dirty="0" err="1"/>
+              <a:t>Appendx</a:t>
+            </a:r>
+            <a:r>
+              <a:rPr lang="en-US" dirty="0"/>
+              <a:t>: Random Forest Base model and Pipeline (New Tweet)</a:t>
+            </a:r>
+          </a:p>
+        </p:txBody>
+      </p:sp>
+      <p:pic>
+        <p:nvPicPr>
+          <p:cNvPr id="3" name="Picture 2">
+            <a:extLst>
+              <a:ext uri="{FF2B5EF4-FFF2-40B4-BE49-F238E27FC236}">
+                <a16:creationId xmlns:a16="http://schemas.microsoft.com/office/drawing/2014/main" id="{9FBB54F7-4ED2-426E-82A4-2E4724F18B15}"/>
+              </a:ext>
+            </a:extLst>
+          </p:cNvPr>
+          <p:cNvPicPr>
+            <a:picLocks noChangeAspect="1"/>
+          </p:cNvPicPr>
+          <p:nvPr/>
+        </p:nvPicPr>
+        <p:blipFill>
+          <a:blip r:embed="rId2">
+            <a:extLst>
+              <a:ext uri="{28A0092B-C50C-407E-A947-70E740481C1C}">
+                <a14:useLocalDpi xmlns:a14="http://schemas.microsoft.com/office/drawing/2010/main" val="0"/>
+              </a:ext>
+            </a:extLst>
+          </a:blip>
+          <a:srcRect/>
+          <a:stretch/>
+        </p:blipFill>
+        <p:spPr>
+          <a:xfrm>
+            <a:off x="6687342" y="1420492"/>
+            <a:ext cx="4710486" cy="5437507"/>
+          </a:xfrm>
+          <a:prstGeom prst="rect">
+            <a:avLst/>
+          </a:prstGeom>
+        </p:spPr>
+      </p:pic>
+      <p:pic>
+        <p:nvPicPr>
+          <p:cNvPr id="4" name="Picture 3">
+            <a:extLst>
+              <a:ext uri="{FF2B5EF4-FFF2-40B4-BE49-F238E27FC236}">
+                <a16:creationId xmlns:a16="http://schemas.microsoft.com/office/drawing/2014/main" id="{B0D9F23A-D3A1-4A2F-ADB5-428121E8CF42}"/>
+              </a:ext>
+            </a:extLst>
+          </p:cNvPr>
+          <p:cNvPicPr>
+            <a:picLocks noChangeAspect="1"/>
+          </p:cNvPicPr>
+          <p:nvPr/>
+        </p:nvPicPr>
+        <p:blipFill>
+          <a:blip r:embed="rId3">
+            <a:extLst>
+              <a:ext uri="{28A0092B-C50C-407E-A947-70E740481C1C}">
+                <a14:useLocalDpi xmlns:a14="http://schemas.microsoft.com/office/drawing/2010/main" val="0"/>
+              </a:ext>
+            </a:extLst>
+          </a:blip>
+          <a:srcRect/>
+          <a:stretch/>
+        </p:blipFill>
+        <p:spPr>
+          <a:xfrm>
+            <a:off x="880123" y="1420492"/>
+            <a:ext cx="4771617" cy="5411899"/>
+          </a:xfrm>
+          <a:prstGeom prst="rect">
+            <a:avLst/>
+          </a:prstGeom>
+        </p:spPr>
+      </p:pic>
+      <p:sp>
+        <p:nvSpPr>
+          <p:cNvPr id="5" name="TextBox 4">
+            <a:extLst>
+              <a:ext uri="{FF2B5EF4-FFF2-40B4-BE49-F238E27FC236}">
+                <a16:creationId xmlns:a16="http://schemas.microsoft.com/office/drawing/2014/main" id="{7CBEFEF6-5DB6-44BD-ADC8-6AC6DA14BC80}"/>
+              </a:ext>
+            </a:extLst>
+          </p:cNvPr>
+          <p:cNvSpPr txBox="1"/>
+          <p:nvPr/>
+        </p:nvSpPr>
+        <p:spPr>
+          <a:xfrm>
+            <a:off x="2257587" y="1060098"/>
+            <a:ext cx="2016690" cy="369332"/>
+          </a:xfrm>
+          <a:prstGeom prst="rect">
+            <a:avLst/>
+          </a:prstGeom>
+          <a:noFill/>
+        </p:spPr>
+        <p:txBody>
+          <a:bodyPr wrap="square" rtlCol="0">
+            <a:spAutoFit/>
+          </a:bodyPr>
+          <a:lstStyle/>
+          <a:p>
+            <a:pPr algn="ctr"/>
+            <a:r>
+              <a:rPr lang="en-US" dirty="0"/>
+              <a:t>Base</a:t>
+            </a:r>
+          </a:p>
+        </p:txBody>
+      </p:sp>
+      <p:sp>
+        <p:nvSpPr>
+          <p:cNvPr id="6" name="TextBox 5">
+            <a:extLst>
+              <a:ext uri="{FF2B5EF4-FFF2-40B4-BE49-F238E27FC236}">
+                <a16:creationId xmlns:a16="http://schemas.microsoft.com/office/drawing/2014/main" id="{23F5D8B8-CAD8-4546-A79B-694F49A74BD8}"/>
+              </a:ext>
+            </a:extLst>
+          </p:cNvPr>
+          <p:cNvSpPr txBox="1"/>
+          <p:nvPr/>
+        </p:nvSpPr>
+        <p:spPr>
+          <a:xfrm>
+            <a:off x="8034240" y="1000874"/>
+            <a:ext cx="2016690" cy="369332"/>
+          </a:xfrm>
+          <a:prstGeom prst="rect">
+            <a:avLst/>
+          </a:prstGeom>
+          <a:noFill/>
+        </p:spPr>
+        <p:txBody>
+          <a:bodyPr wrap="square" rtlCol="0">
+            <a:spAutoFit/>
+          </a:bodyPr>
+          <a:lstStyle/>
+          <a:p>
+            <a:pPr algn="ctr"/>
+            <a:r>
+              <a:rPr lang="en-US" dirty="0" err="1"/>
+              <a:t>Piepeline</a:t>
+            </a:r>
+            <a:endParaRPr lang="en-US" dirty="0"/>
+          </a:p>
+        </p:txBody>
+      </p:sp>
+    </p:spTree>
+    <p:extLst>
+      <p:ext uri="{BB962C8B-B14F-4D97-AF65-F5344CB8AC3E}">
+        <p14:creationId xmlns:p14="http://schemas.microsoft.com/office/powerpoint/2010/main" val="3701945742"/>
+      </p:ext>
+    </p:extLst>
+  </p:cSld>
+  <p:clrMapOvr>
+    <a:masterClrMapping/>
+  </p:clrMapOvr>
+</p:sld>
+</file>
+
+<file path=ppt/slides/slide21.xml><?xml version="1.0" encoding="utf-8"?>
+<p:sld xmlns:a="http://schemas.openxmlformats.org/drawingml/2006/main" xmlns:r="http://schemas.openxmlformats.org/officeDocument/2006/relationships" xmlns:p="http://schemas.openxmlformats.org/presentationml/2006/main">
+  <p:cSld>
+    <p:spTree>
+      <p:nvGrpSpPr>
+        <p:cNvPr id="1" name=""/>
+        <p:cNvGrpSpPr/>
+        <p:nvPr/>
+      </p:nvGrpSpPr>
+      <p:grpSpPr>
+        <a:xfrm>
+          <a:off x="0" y="0"/>
+          <a:ext cx="0" cy="0"/>
+          <a:chOff x="0" y="0"/>
+          <a:chExt cx="0" cy="0"/>
+        </a:xfrm>
+      </p:grpSpPr>
+      <p:sp>
+        <p:nvSpPr>
+          <p:cNvPr id="2" name="Title 1">
+            <a:extLst>
+              <a:ext uri="{FF2B5EF4-FFF2-40B4-BE49-F238E27FC236}">
+                <a16:creationId xmlns:a16="http://schemas.microsoft.com/office/drawing/2014/main" id="{85BFC2D1-07F0-4E13-B620-194934AD87CF}"/>
+              </a:ext>
+            </a:extLst>
+          </p:cNvPr>
+          <p:cNvSpPr>
+            <a:spLocks noGrp="1"/>
+          </p:cNvSpPr>
+          <p:nvPr>
+            <p:ph type="title"/>
+          </p:nvPr>
+        </p:nvSpPr>
+        <p:spPr/>
+        <p:txBody>
+          <a:bodyPr>
+            <a:normAutofit fontScale="90000"/>
+          </a:bodyPr>
+          <a:lstStyle/>
+          <a:p>
+            <a:r>
+              <a:rPr lang="en-US" dirty="0" err="1"/>
+              <a:t>Appendx</a:t>
+            </a:r>
+            <a:r>
+              <a:rPr lang="en-US" dirty="0"/>
+              <a:t>: Naïve Bayesian Base model and Grid Search (Old Tweet)</a:t>
+            </a:r>
+          </a:p>
+        </p:txBody>
+      </p:sp>
+      <p:pic>
+        <p:nvPicPr>
+          <p:cNvPr id="3" name="Picture 2">
+            <a:extLst>
+              <a:ext uri="{FF2B5EF4-FFF2-40B4-BE49-F238E27FC236}">
+                <a16:creationId xmlns:a16="http://schemas.microsoft.com/office/drawing/2014/main" id="{5DF3EBF4-05EB-4FC0-B904-4CCC6AA0F4E3}"/>
+              </a:ext>
+            </a:extLst>
+          </p:cNvPr>
+          <p:cNvPicPr>
+            <a:picLocks noChangeAspect="1"/>
+          </p:cNvPicPr>
+          <p:nvPr/>
+        </p:nvPicPr>
+        <p:blipFill>
+          <a:blip r:embed="rId2">
+            <a:extLst>
+              <a:ext uri="{28A0092B-C50C-407E-A947-70E740481C1C}">
+                <a14:useLocalDpi xmlns:a14="http://schemas.microsoft.com/office/drawing/2010/main" val="0"/>
+              </a:ext>
+            </a:extLst>
+          </a:blip>
+          <a:srcRect/>
+          <a:stretch/>
+        </p:blipFill>
+        <p:spPr>
+          <a:xfrm>
+            <a:off x="6671228" y="1420492"/>
+            <a:ext cx="4742714" cy="5437507"/>
+          </a:xfrm>
+          <a:prstGeom prst="rect">
+            <a:avLst/>
+          </a:prstGeom>
+        </p:spPr>
+      </p:pic>
+      <p:pic>
+        <p:nvPicPr>
+          <p:cNvPr id="4" name="Picture 3">
+            <a:extLst>
+              <a:ext uri="{FF2B5EF4-FFF2-40B4-BE49-F238E27FC236}">
+                <a16:creationId xmlns:a16="http://schemas.microsoft.com/office/drawing/2014/main" id="{9B95F1E7-B7FE-4350-A51B-EAD63E47028D}"/>
+              </a:ext>
+            </a:extLst>
+          </p:cNvPr>
+          <p:cNvPicPr>
+            <a:picLocks noChangeAspect="1"/>
+          </p:cNvPicPr>
+          <p:nvPr/>
+        </p:nvPicPr>
+        <p:blipFill>
+          <a:blip r:embed="rId3">
+            <a:extLst>
+              <a:ext uri="{28A0092B-C50C-407E-A947-70E740481C1C}">
+                <a14:useLocalDpi xmlns:a14="http://schemas.microsoft.com/office/drawing/2010/main" val="0"/>
+              </a:ext>
+            </a:extLst>
+          </a:blip>
+          <a:srcRect/>
+          <a:stretch/>
+        </p:blipFill>
+        <p:spPr>
+          <a:xfrm>
+            <a:off x="838200" y="1420928"/>
+            <a:ext cx="4855464" cy="5411026"/>
+          </a:xfrm>
+          <a:prstGeom prst="rect">
+            <a:avLst/>
+          </a:prstGeom>
+        </p:spPr>
+      </p:pic>
+      <p:sp>
+        <p:nvSpPr>
+          <p:cNvPr id="5" name="TextBox 4">
+            <a:extLst>
+              <a:ext uri="{FF2B5EF4-FFF2-40B4-BE49-F238E27FC236}">
+                <a16:creationId xmlns:a16="http://schemas.microsoft.com/office/drawing/2014/main" id="{F267E81E-70C4-44B1-BD0F-91EF99761667}"/>
+              </a:ext>
+            </a:extLst>
+          </p:cNvPr>
+          <p:cNvSpPr txBox="1"/>
+          <p:nvPr/>
+        </p:nvSpPr>
+        <p:spPr>
+          <a:xfrm>
+            <a:off x="2257587" y="1060098"/>
+            <a:ext cx="2016690" cy="369332"/>
+          </a:xfrm>
+          <a:prstGeom prst="rect">
+            <a:avLst/>
+          </a:prstGeom>
+          <a:noFill/>
+        </p:spPr>
+        <p:txBody>
+          <a:bodyPr wrap="square" rtlCol="0">
+            <a:spAutoFit/>
+          </a:bodyPr>
+          <a:lstStyle/>
+          <a:p>
+            <a:pPr algn="ctr"/>
+            <a:r>
+              <a:rPr lang="en-US" dirty="0"/>
+              <a:t>Base</a:t>
+            </a:r>
+          </a:p>
+        </p:txBody>
+      </p:sp>
+      <p:sp>
+        <p:nvSpPr>
+          <p:cNvPr id="6" name="TextBox 5">
+            <a:extLst>
+              <a:ext uri="{FF2B5EF4-FFF2-40B4-BE49-F238E27FC236}">
+                <a16:creationId xmlns:a16="http://schemas.microsoft.com/office/drawing/2014/main" id="{00368D60-4075-461A-90C0-1763D2558FCA}"/>
+              </a:ext>
+            </a:extLst>
+          </p:cNvPr>
+          <p:cNvSpPr txBox="1"/>
+          <p:nvPr/>
+        </p:nvSpPr>
+        <p:spPr>
+          <a:xfrm>
+            <a:off x="8034240" y="1000874"/>
+            <a:ext cx="2016690" cy="369332"/>
+          </a:xfrm>
+          <a:prstGeom prst="rect">
+            <a:avLst/>
+          </a:prstGeom>
+          <a:noFill/>
+        </p:spPr>
+        <p:txBody>
+          <a:bodyPr wrap="square" rtlCol="0">
+            <a:spAutoFit/>
+          </a:bodyPr>
+          <a:lstStyle/>
+          <a:p>
+            <a:pPr algn="ctr"/>
+            <a:r>
+              <a:rPr lang="en-US" dirty="0"/>
+              <a:t>Grid Search</a:t>
+            </a:r>
+          </a:p>
+        </p:txBody>
+      </p:sp>
+    </p:spTree>
+    <p:extLst>
+      <p:ext uri="{BB962C8B-B14F-4D97-AF65-F5344CB8AC3E}">
+        <p14:creationId xmlns:p14="http://schemas.microsoft.com/office/powerpoint/2010/main" val="1708327473"/>
+      </p:ext>
+    </p:extLst>
+  </p:cSld>
+  <p:clrMapOvr>
+    <a:masterClrMapping/>
+  </p:clrMapOvr>
+</p:sld>
+</file>
+
+<file path=ppt/slides/slide22.xml><?xml version="1.0" encoding="utf-8"?>
+<p:sld xmlns:a="http://schemas.openxmlformats.org/drawingml/2006/main" xmlns:r="http://schemas.openxmlformats.org/officeDocument/2006/relationships" xmlns:p="http://schemas.openxmlformats.org/presentationml/2006/main">
+  <p:cSld>
+    <p:spTree>
+      <p:nvGrpSpPr>
+        <p:cNvPr id="1" name=""/>
+        <p:cNvGrpSpPr/>
+        <p:nvPr/>
+      </p:nvGrpSpPr>
+      <p:grpSpPr>
+        <a:xfrm>
+          <a:off x="0" y="0"/>
+          <a:ext cx="0" cy="0"/>
+          <a:chOff x="0" y="0"/>
+          <a:chExt cx="0" cy="0"/>
+        </a:xfrm>
+      </p:grpSpPr>
+      <p:sp>
+        <p:nvSpPr>
+          <p:cNvPr id="2" name="Title 1">
+            <a:extLst>
+              <a:ext uri="{FF2B5EF4-FFF2-40B4-BE49-F238E27FC236}">
+                <a16:creationId xmlns:a16="http://schemas.microsoft.com/office/drawing/2014/main" id="{85BFC2D1-07F0-4E13-B620-194934AD87CF}"/>
+              </a:ext>
+            </a:extLst>
+          </p:cNvPr>
+          <p:cNvSpPr>
+            <a:spLocks noGrp="1"/>
+          </p:cNvSpPr>
+          <p:nvPr>
+            <p:ph type="title"/>
+          </p:nvPr>
+        </p:nvSpPr>
+        <p:spPr/>
+        <p:txBody>
+          <a:bodyPr>
+            <a:normAutofit fontScale="90000"/>
+          </a:bodyPr>
+          <a:lstStyle/>
+          <a:p>
+            <a:r>
+              <a:rPr lang="en-US" dirty="0" err="1"/>
+              <a:t>Appendx</a:t>
+            </a:r>
+            <a:r>
+              <a:rPr lang="en-US" dirty="0"/>
+              <a:t>: Naïve Bayesian Base model and Grid Search (New Tweet)</a:t>
+            </a:r>
+          </a:p>
+        </p:txBody>
+      </p:sp>
+      <p:pic>
+        <p:nvPicPr>
+          <p:cNvPr id="3" name="Picture 2">
+            <a:extLst>
+              <a:ext uri="{FF2B5EF4-FFF2-40B4-BE49-F238E27FC236}">
+                <a16:creationId xmlns:a16="http://schemas.microsoft.com/office/drawing/2014/main" id="{29D1D51D-641E-4651-BCDA-C81EC02EE3BA}"/>
+              </a:ext>
+            </a:extLst>
+          </p:cNvPr>
+          <p:cNvPicPr>
+            <a:picLocks noChangeAspect="1"/>
+          </p:cNvPicPr>
+          <p:nvPr/>
+        </p:nvPicPr>
+        <p:blipFill>
+          <a:blip r:embed="rId2">
+            <a:extLst>
+              <a:ext uri="{28A0092B-C50C-407E-A947-70E740481C1C}">
+                <a14:useLocalDpi xmlns:a14="http://schemas.microsoft.com/office/drawing/2010/main" val="0"/>
+              </a:ext>
+            </a:extLst>
+          </a:blip>
+          <a:srcRect/>
+          <a:stretch/>
+        </p:blipFill>
+        <p:spPr>
+          <a:xfrm>
+            <a:off x="6634330" y="1420492"/>
+            <a:ext cx="4816510" cy="5437507"/>
+          </a:xfrm>
+          <a:prstGeom prst="rect">
+            <a:avLst/>
+          </a:prstGeom>
+        </p:spPr>
+      </p:pic>
+      <p:pic>
+        <p:nvPicPr>
+          <p:cNvPr id="4" name="Picture 3">
+            <a:extLst>
+              <a:ext uri="{FF2B5EF4-FFF2-40B4-BE49-F238E27FC236}">
+                <a16:creationId xmlns:a16="http://schemas.microsoft.com/office/drawing/2014/main" id="{3D01ABC4-F88F-4AAE-942B-4D977DCD6927}"/>
+              </a:ext>
+            </a:extLst>
+          </p:cNvPr>
+          <p:cNvPicPr>
+            <a:picLocks noChangeAspect="1"/>
+          </p:cNvPicPr>
+          <p:nvPr/>
+        </p:nvPicPr>
+        <p:blipFill>
+          <a:blip r:embed="rId3">
+            <a:extLst>
+              <a:ext uri="{28A0092B-C50C-407E-A947-70E740481C1C}">
+                <a14:useLocalDpi xmlns:a14="http://schemas.microsoft.com/office/drawing/2010/main" val="0"/>
+              </a:ext>
+            </a:extLst>
+          </a:blip>
+          <a:srcRect/>
+          <a:stretch/>
+        </p:blipFill>
+        <p:spPr>
+          <a:xfrm>
+            <a:off x="887745" y="1420492"/>
+            <a:ext cx="4756373" cy="5411899"/>
+          </a:xfrm>
+          <a:prstGeom prst="rect">
+            <a:avLst/>
+          </a:prstGeom>
+        </p:spPr>
+      </p:pic>
+      <p:sp>
+        <p:nvSpPr>
+          <p:cNvPr id="5" name="TextBox 4">
+            <a:extLst>
+              <a:ext uri="{FF2B5EF4-FFF2-40B4-BE49-F238E27FC236}">
+                <a16:creationId xmlns:a16="http://schemas.microsoft.com/office/drawing/2014/main" id="{2DFF40BA-5CC4-45CC-AED5-3F14EEA70347}"/>
+              </a:ext>
+            </a:extLst>
+          </p:cNvPr>
+          <p:cNvSpPr txBox="1"/>
+          <p:nvPr/>
+        </p:nvSpPr>
+        <p:spPr>
+          <a:xfrm>
+            <a:off x="2257587" y="1060098"/>
+            <a:ext cx="2016690" cy="369332"/>
+          </a:xfrm>
+          <a:prstGeom prst="rect">
+            <a:avLst/>
+          </a:prstGeom>
+          <a:noFill/>
+        </p:spPr>
+        <p:txBody>
+          <a:bodyPr wrap="square" rtlCol="0">
+            <a:spAutoFit/>
+          </a:bodyPr>
+          <a:lstStyle/>
+          <a:p>
+            <a:pPr algn="ctr"/>
+            <a:r>
+              <a:rPr lang="en-US" dirty="0"/>
+              <a:t>Base</a:t>
+            </a:r>
+          </a:p>
+        </p:txBody>
+      </p:sp>
+      <p:sp>
+        <p:nvSpPr>
+          <p:cNvPr id="6" name="TextBox 5">
+            <a:extLst>
+              <a:ext uri="{FF2B5EF4-FFF2-40B4-BE49-F238E27FC236}">
+                <a16:creationId xmlns:a16="http://schemas.microsoft.com/office/drawing/2014/main" id="{9169320A-00D0-4A08-B1C9-A38AA9F035C9}"/>
+              </a:ext>
+            </a:extLst>
+          </p:cNvPr>
+          <p:cNvSpPr txBox="1"/>
+          <p:nvPr/>
+        </p:nvSpPr>
+        <p:spPr>
+          <a:xfrm>
+            <a:off x="8034240" y="1000874"/>
+            <a:ext cx="2016690" cy="369332"/>
+          </a:xfrm>
+          <a:prstGeom prst="rect">
+            <a:avLst/>
+          </a:prstGeom>
+          <a:noFill/>
+        </p:spPr>
+        <p:txBody>
+          <a:bodyPr wrap="square" rtlCol="0">
+            <a:spAutoFit/>
+          </a:bodyPr>
+          <a:lstStyle/>
+          <a:p>
+            <a:pPr algn="ctr"/>
+            <a:r>
+              <a:rPr lang="en-US" dirty="0"/>
+              <a:t>Grid Search</a:t>
+            </a:r>
+          </a:p>
+        </p:txBody>
+      </p:sp>
+    </p:spTree>
+    <p:extLst>
+      <p:ext uri="{BB962C8B-B14F-4D97-AF65-F5344CB8AC3E}">
+        <p14:creationId xmlns:p14="http://schemas.microsoft.com/office/powerpoint/2010/main" val="3874558146"/>
+      </p:ext>
+    </p:extLst>
+  </p:cSld>
+  <p:clrMapOvr>
+    <a:masterClrMapping/>
+  </p:clrMapOvr>
+</p:sld>
+</file>
+
 <file path=ppt/slides/slide3.xml><?xml version="1.0" encoding="utf-8"?>
 <p:sld xmlns:a="http://schemas.openxmlformats.org/drawingml/2006/main" xmlns:r="http://schemas.openxmlformats.org/officeDocument/2006/relationships" xmlns:p="http://schemas.openxmlformats.org/presentationml/2006/main">
   <p:cSld>
@@ -8830,6 +10274,78 @@
           </a:p>
         </p:txBody>
       </p:sp>
+      <p:sp>
+        <p:nvSpPr>
+          <p:cNvPr id="3" name="TextBox 2">
+            <a:extLst>
+              <a:ext uri="{FF2B5EF4-FFF2-40B4-BE49-F238E27FC236}">
+                <a16:creationId xmlns:a16="http://schemas.microsoft.com/office/drawing/2014/main" id="{894D313A-6E1E-43DB-97FE-E7ACEAC9EDC0}"/>
+              </a:ext>
+            </a:extLst>
+          </p:cNvPr>
+          <p:cNvSpPr txBox="1"/>
+          <p:nvPr/>
+        </p:nvSpPr>
+        <p:spPr>
+          <a:xfrm rot="16200000">
+            <a:off x="5362808" y="1603408"/>
+            <a:ext cx="2855935" cy="369332"/>
+          </a:xfrm>
+          <a:prstGeom prst="rect">
+            <a:avLst/>
+          </a:prstGeom>
+          <a:noFill/>
+        </p:spPr>
+        <p:txBody>
+          <a:bodyPr wrap="square" rtlCol="0">
+            <a:spAutoFit/>
+          </a:bodyPr>
+          <a:lstStyle/>
+          <a:p>
+            <a:pPr algn="ctr"/>
+            <a:r>
+              <a:rPr lang="en-US" dirty="0"/>
+              <a:t>Old Tweet</a:t>
+            </a:r>
+          </a:p>
+        </p:txBody>
+      </p:sp>
+      <p:sp>
+        <p:nvSpPr>
+          <p:cNvPr id="8" name="TextBox 7">
+            <a:extLst>
+              <a:ext uri="{FF2B5EF4-FFF2-40B4-BE49-F238E27FC236}">
+                <a16:creationId xmlns:a16="http://schemas.microsoft.com/office/drawing/2014/main" id="{B02D87A5-FA7D-4CA4-8F85-0408AB7C2B4B}"/>
+              </a:ext>
+            </a:extLst>
+          </p:cNvPr>
+          <p:cNvSpPr txBox="1"/>
+          <p:nvPr/>
+        </p:nvSpPr>
+        <p:spPr>
+          <a:xfrm rot="16200000">
+            <a:off x="5490022" y="4885258"/>
+            <a:ext cx="2855935" cy="369332"/>
+          </a:xfrm>
+          <a:prstGeom prst="rect">
+            <a:avLst/>
+          </a:prstGeom>
+          <a:noFill/>
+        </p:spPr>
+        <p:txBody>
+          <a:bodyPr wrap="square" rtlCol="0">
+            <a:spAutoFit/>
+          </a:bodyPr>
+          <a:lstStyle/>
+          <a:p>
+            <a:pPr algn="ctr"/>
+            <a:r>
+              <a:rPr lang="en-US" dirty="0"/>
+              <a:t>New Tweet</a:t>
+            </a:r>
+          </a:p>
+        </p:txBody>
+      </p:sp>
     </p:spTree>
     <p:extLst>
       <p:ext uri="{BB962C8B-B14F-4D97-AF65-F5344CB8AC3E}">
@@ -8912,7 +10428,7 @@
         </p:nvSpPr>
         <p:spPr>
           <a:xfrm>
-            <a:off x="513806" y="1590101"/>
+            <a:off x="6851976" y="1474497"/>
             <a:ext cx="4362994" cy="1200329"/>
           </a:xfrm>
           <a:prstGeom prst="rect">
@@ -8965,13 +10481,13 @@
               </a:ext>
             </a:extLst>
           </a:blip>
-          <a:srcRect l="797" t="7902" r="30589"/>
+          <a:srcRect l="797" t="31097" r="30589"/>
           <a:stretch/>
         </p:blipFill>
         <p:spPr>
           <a:xfrm>
-            <a:off x="5728062" y="463536"/>
-            <a:ext cx="5625738" cy="6316087"/>
+            <a:off x="470262" y="1474497"/>
+            <a:ext cx="5625738" cy="4725355"/>
           </a:xfrm>
           <a:prstGeom prst="rect">
             <a:avLst/>
@@ -9006,7 +10522,7 @@
         </p:blipFill>
         <p:spPr>
           <a:xfrm>
-            <a:off x="141706" y="3129651"/>
+            <a:off x="6561013" y="2898223"/>
             <a:ext cx="5160725" cy="3301629"/>
           </a:xfrm>
           <a:prstGeom prst="rect">
@@ -9062,7 +10578,7 @@
         </p:nvSpPr>
         <p:spPr>
           <a:xfrm>
-            <a:off x="7415408" y="0"/>
+            <a:off x="501041" y="270957"/>
             <a:ext cx="4559475" cy="739056"/>
           </a:xfrm>
         </p:spPr>
@@ -9098,7 +10614,7 @@
         </p:nvSpPr>
         <p:spPr>
           <a:xfrm>
-            <a:off x="6519276" y="929866"/>
+            <a:off x="6349145" y="503981"/>
             <a:ext cx="5625738" cy="1938992"/>
           </a:xfrm>
           <a:prstGeom prst="rect">
@@ -9160,7 +10676,7 @@
           </p:cNvPicPr>
           <p:nvPr/>
         </p:nvPicPr>
-        <p:blipFill>
+        <p:blipFill rotWithShape="1">
           <a:blip r:embed="rId3">
             <a:extLst>
               <a:ext uri="{28A0092B-C50C-407E-A947-70E740481C1C}">
@@ -9168,13 +10684,13 @@
               </a:ext>
             </a:extLst>
           </a:blip>
-          <a:srcRect t="519" b="519"/>
+          <a:srcRect t="25516" b="519"/>
           <a:stretch/>
         </p:blipFill>
         <p:spPr>
           <a:xfrm>
-            <a:off x="206730" y="270956"/>
-            <a:ext cx="5625738" cy="6316087"/>
+            <a:off x="206730" y="1866378"/>
+            <a:ext cx="5625738" cy="4720665"/>
           </a:xfrm>
           <a:prstGeom prst="rect">
             <a:avLst/>
@@ -9784,16 +11300,21 @@
             <p:ph type="title"/>
           </p:nvPr>
         </p:nvSpPr>
-        <p:spPr/>
+        <p:spPr>
+          <a:xfrm>
+            <a:off x="838201" y="163481"/>
+            <a:ext cx="5625738" cy="739056"/>
+          </a:xfrm>
+        </p:spPr>
         <p:txBody>
           <a:bodyPr>
-            <a:normAutofit/>
+            <a:normAutofit fontScale="90000"/>
           </a:bodyPr>
           <a:lstStyle/>
           <a:p>
             <a:r>
               <a:rPr lang="en-US" dirty="0"/>
-              <a:t>Word Cloud Comparison: Apple</a:t>
+              <a:t>Word Cloud Comparison: Positive Sentiment Towards Apple </a:t>
             </a:r>
           </a:p>
         </p:txBody>
@@ -9825,8 +11346,8 @@
         </p:blipFill>
         <p:spPr>
           <a:xfrm>
-            <a:off x="316285" y="2276355"/>
-            <a:ext cx="5557626" cy="3420078"/>
+            <a:off x="7204716" y="615505"/>
+            <a:ext cx="4863105" cy="3055019"/>
           </a:xfrm>
           <a:prstGeom prst="rect">
             <a:avLst/>
@@ -9860,8 +11381,8 @@
         </p:blipFill>
         <p:spPr>
           <a:xfrm>
-            <a:off x="6412374" y="2276354"/>
-            <a:ext cx="5557627" cy="3420078"/>
+            <a:off x="7204716" y="3737926"/>
+            <a:ext cx="4863105" cy="3055019"/>
           </a:xfrm>
           <a:prstGeom prst="rect">
             <a:avLst/>
@@ -9870,80 +11391,101 @@
       </p:pic>
       <p:sp>
         <p:nvSpPr>
-          <p:cNvPr id="10" name="TextBox 9">
+          <p:cNvPr id="7" name="Rectangle 6">
             <a:extLst>
               <a:ext uri="{FF2B5EF4-FFF2-40B4-BE49-F238E27FC236}">
-                <a16:creationId xmlns:a16="http://schemas.microsoft.com/office/drawing/2014/main" id="{FAA0FBC2-A78B-427A-B244-5AEAF817997E}"/>
+                <a16:creationId xmlns:a16="http://schemas.microsoft.com/office/drawing/2014/main" id="{55B350B7-6B06-4D89-A822-5B473CAAB5F8}"/>
               </a:ext>
             </a:extLst>
           </p:cNvPr>
-          <p:cNvSpPr txBox="1"/>
+          <p:cNvSpPr/>
           <p:nvPr/>
         </p:nvSpPr>
         <p:spPr>
           <a:xfrm>
-            <a:off x="1320616" y="1741714"/>
-            <a:ext cx="3446417" cy="369332"/>
+            <a:off x="838201" y="2147030"/>
+            <a:ext cx="5625738" cy="3785652"/>
           </a:xfrm>
           <a:prstGeom prst="rect">
             <a:avLst/>
           </a:prstGeom>
-          <a:noFill/>
         </p:spPr>
         <p:txBody>
-          <a:bodyPr wrap="square" rtlCol="0">
+          <a:bodyPr wrap="square">
             <a:spAutoFit/>
           </a:bodyPr>
           <a:lstStyle/>
           <a:p>
-            <a:pPr algn="ctr"/>
-            <a:r>
-              <a:rPr lang="en-US" dirty="0"/>
-              <a:t>Old</a:t>
-            </a:r>
-          </a:p>
-        </p:txBody>
-      </p:sp>
-      <p:sp>
-        <p:nvSpPr>
-          <p:cNvPr id="11" name="TextBox 10">
-            <a:extLst>
-              <a:ext uri="{FF2B5EF4-FFF2-40B4-BE49-F238E27FC236}">
-                <a16:creationId xmlns:a16="http://schemas.microsoft.com/office/drawing/2014/main" id="{0D545C37-A0EF-45E3-9977-C94B7D4E34ED}"/>
-              </a:ext>
-            </a:extLst>
-          </p:cNvPr>
-          <p:cNvSpPr txBox="1"/>
-          <p:nvPr/>
-        </p:nvSpPr>
-        <p:spPr>
-          <a:xfrm>
-            <a:off x="7183980" y="1741714"/>
-            <a:ext cx="3446417" cy="369332"/>
-          </a:xfrm>
-          <a:prstGeom prst="rect">
-            <a:avLst/>
-          </a:prstGeom>
-          <a:noFill/>
-        </p:spPr>
-        <p:txBody>
-          <a:bodyPr wrap="square" rtlCol="0">
-            <a:spAutoFit/>
-          </a:bodyPr>
-          <a:lstStyle/>
-          <a:p>
-            <a:pPr algn="ctr"/>
-            <a:r>
-              <a:rPr lang="en-US" dirty="0"/>
-              <a:t>New</a:t>
-            </a:r>
+            <a:pPr marL="342900" indent="-342900">
+              <a:buFont typeface="Arial" panose="020B0604020202020204" pitchFamily="34" charset="0"/>
+              <a:buChar char="•"/>
+            </a:pPr>
+            <a:r>
+              <a:rPr lang="en-US" sz="2400" dirty="0">
+                <a:solidFill>
+                  <a:schemeClr val="tx1">
+                    <a:lumMod val="65000"/>
+                    <a:lumOff val="35000"/>
+                  </a:schemeClr>
+                </a:solidFill>
+              </a:rPr>
+              <a:t>Old Tweet: store, app, line, opening, win, great, Thank, want</a:t>
+            </a:r>
+          </a:p>
+          <a:p>
+            <a:pPr marL="342900" indent="-342900">
+              <a:buFont typeface="Arial" panose="020B0604020202020204" pitchFamily="34" charset="0"/>
+              <a:buChar char="•"/>
+            </a:pPr>
+            <a:r>
+              <a:rPr lang="en-US" sz="2400" dirty="0">
+                <a:solidFill>
+                  <a:schemeClr val="tx1">
+                    <a:lumMod val="65000"/>
+                    <a:lumOff val="35000"/>
+                  </a:schemeClr>
+                </a:solidFill>
+              </a:rPr>
+              <a:t>New Tweet: music, like, phone, Spotify, want, Watch</a:t>
+            </a:r>
+          </a:p>
+          <a:p>
+            <a:pPr marL="342900" indent="-342900">
+              <a:buFont typeface="Arial" panose="020B0604020202020204" pitchFamily="34" charset="0"/>
+              <a:buChar char="•"/>
+            </a:pPr>
+            <a:r>
+              <a:rPr lang="en-US" sz="2400" dirty="0">
+                <a:solidFill>
+                  <a:schemeClr val="tx1">
+                    <a:lumMod val="65000"/>
+                    <a:lumOff val="35000"/>
+                  </a:schemeClr>
+                </a:solidFill>
+              </a:rPr>
+              <a:t>Words associated with positive sentiment seems to change from one's experience at the Apple store or using their product apps such as Apple Music or Spotify. </a:t>
+            </a:r>
+          </a:p>
+          <a:p>
+            <a:pPr marL="342900" indent="-342900">
+              <a:buFont typeface="Arial" panose="020B0604020202020204" pitchFamily="34" charset="0"/>
+              <a:buChar char="•"/>
+            </a:pPr>
+            <a:endParaRPr lang="en-US" sz="2400" dirty="0">
+              <a:solidFill>
+                <a:schemeClr val="tx1">
+                  <a:lumMod val="65000"/>
+                  <a:lumOff val="35000"/>
+                </a:schemeClr>
+              </a:solidFill>
+            </a:endParaRPr>
           </a:p>
         </p:txBody>
       </p:sp>
     </p:spTree>
     <p:extLst>
       <p:ext uri="{BB962C8B-B14F-4D97-AF65-F5344CB8AC3E}">
-        <p14:creationId xmlns:p14="http://schemas.microsoft.com/office/powerpoint/2010/main" val="756654474"/>
+        <p14:creationId xmlns:p14="http://schemas.microsoft.com/office/powerpoint/2010/main" val="3162313702"/>
       </p:ext>
     </p:extLst>
   </p:cSld>
@@ -9980,165 +11522,6 @@
           <a:chExt cx="0" cy="0"/>
         </a:xfrm>
       </p:grpSpPr>
-      <p:sp useBgFill="1">
-        <p:nvSpPr>
-          <p:cNvPr id="19" name="Rectangle 18">
-            <a:extLst>
-              <a:ext uri="{FF2B5EF4-FFF2-40B4-BE49-F238E27FC236}">
-                <a16:creationId xmlns:a16="http://schemas.microsoft.com/office/drawing/2014/main" id="{385E1BDC-A9B0-4A87-82E3-F3187F69A802}"/>
-              </a:ext>
-              <a:ext uri="{C183D7F6-B498-43B3-948B-1728B52AA6E4}">
-                <adec:decorative xmlns:adec="http://schemas.microsoft.com/office/drawing/2017/decorative" val="1"/>
-              </a:ext>
-            </a:extLst>
-          </p:cNvPr>
-          <p:cNvSpPr>
-            <a:spLocks noGrp="1" noRot="1" noChangeAspect="1" noMove="1" noResize="1" noEditPoints="1" noAdjustHandles="1" noChangeArrowheads="1" noChangeShapeType="1" noTextEdit="1"/>
-          </p:cNvSpPr>
-          <p:nvPr>
-            <p:extLst>
-              <p:ext uri="{386F3935-93C4-4BCD-93E2-E3B085C9AB24}">
-                <p16:designElem xmlns:p16="http://schemas.microsoft.com/office/powerpoint/2015/main" val="1"/>
-              </p:ext>
-            </p:extLst>
-          </p:nvPr>
-        </p:nvSpPr>
-        <p:spPr>
-          <a:xfrm>
-            <a:off x="0" y="0"/>
-            <a:ext cx="12192000" cy="6858000"/>
-          </a:xfrm>
-          <a:prstGeom prst="rect">
-            <a:avLst/>
-          </a:prstGeom>
-          <a:ln>
-            <a:noFill/>
-          </a:ln>
-        </p:spPr>
-        <p:style>
-          <a:lnRef idx="2">
-            <a:schemeClr val="accent1">
-              <a:shade val="50000"/>
-            </a:schemeClr>
-          </a:lnRef>
-          <a:fillRef idx="1">
-            <a:schemeClr val="accent1"/>
-          </a:fillRef>
-          <a:effectRef idx="0">
-            <a:schemeClr val="accent1"/>
-          </a:effectRef>
-          <a:fontRef idx="minor">
-            <a:schemeClr val="lt1"/>
-          </a:fontRef>
-        </p:style>
-        <p:txBody>
-          <a:bodyPr rtlCol="0" anchor="ctr"/>
-          <a:lstStyle/>
-          <a:p>
-            <a:pPr algn="ctr"/>
-            <a:endParaRPr lang="en-US"/>
-          </a:p>
-        </p:txBody>
-      </p:sp>
-      <p:sp useBgFill="1">
-        <p:nvSpPr>
-          <p:cNvPr id="21" name="Rectangle 20">
-            <a:extLst>
-              <a:ext uri="{FF2B5EF4-FFF2-40B4-BE49-F238E27FC236}">
-                <a16:creationId xmlns:a16="http://schemas.microsoft.com/office/drawing/2014/main" id="{0990C621-3B8B-4820-8328-D47EF7CE823C}"/>
-              </a:ext>
-              <a:ext uri="{C183D7F6-B498-43B3-948B-1728B52AA6E4}">
-                <adec:decorative xmlns:adec="http://schemas.microsoft.com/office/drawing/2017/decorative" val="1"/>
-              </a:ext>
-            </a:extLst>
-          </p:cNvPr>
-          <p:cNvSpPr>
-            <a:spLocks noGrp="1" noRot="1" noChangeAspect="1" noMove="1" noResize="1" noEditPoints="1" noAdjustHandles="1" noChangeArrowheads="1" noChangeShapeType="1" noTextEdit="1"/>
-          </p:cNvSpPr>
-          <p:nvPr>
-            <p:extLst>
-              <p:ext uri="{386F3935-93C4-4BCD-93E2-E3B085C9AB24}">
-                <p16:designElem xmlns:p16="http://schemas.microsoft.com/office/powerpoint/2015/main" val="1"/>
-              </p:ext>
-            </p:extLst>
-          </p:nvPr>
-        </p:nvSpPr>
-        <p:spPr>
-          <a:xfrm>
-            <a:off x="554416" y="365125"/>
-            <a:ext cx="11167447" cy="2089317"/>
-          </a:xfrm>
-          <a:prstGeom prst="rect">
-            <a:avLst/>
-          </a:prstGeom>
-          <a:ln w="12700">
-            <a:solidFill>
-              <a:srgbClr val="DEDEDE"/>
-            </a:solidFill>
-          </a:ln>
-          <a:effectLst>
-            <a:outerShdw blurRad="50800" dist="38100" dir="2700000" algn="tl" rotWithShape="0">
-              <a:schemeClr val="bg2">
-                <a:lumMod val="85000"/>
-                <a:alpha val="50000"/>
-              </a:schemeClr>
-            </a:outerShdw>
-          </a:effectLst>
-        </p:spPr>
-        <p:style>
-          <a:lnRef idx="2">
-            <a:schemeClr val="accent1">
-              <a:shade val="50000"/>
-            </a:schemeClr>
-          </a:lnRef>
-          <a:fillRef idx="1">
-            <a:schemeClr val="accent1"/>
-          </a:fillRef>
-          <a:effectRef idx="0">
-            <a:schemeClr val="accent1"/>
-          </a:effectRef>
-          <a:fontRef idx="minor">
-            <a:schemeClr val="lt1"/>
-          </a:fontRef>
-        </p:style>
-        <p:txBody>
-          <a:bodyPr rtlCol="0" anchor="ctr"/>
-          <a:lstStyle/>
-          <a:p>
-            <a:pPr marL="0" marR="0" lvl="0" indent="0" algn="ctr" defTabSz="914400" rtl="0" eaLnBrk="1" fontAlgn="auto" latinLnBrk="0" hangingPunct="1">
-              <a:lnSpc>
-                <a:spcPct val="100000"/>
-              </a:lnSpc>
-              <a:spcBef>
-                <a:spcPts val="0"/>
-              </a:spcBef>
-              <a:spcAft>
-                <a:spcPts val="0"/>
-              </a:spcAft>
-              <a:buClrTx/>
-              <a:buSzTx/>
-              <a:buFontTx/>
-              <a:buNone/>
-              <a:tabLst/>
-              <a:defRPr/>
-            </a:pPr>
-            <a:endParaRPr kumimoji="0" lang="en-US" sz="1800" b="0" i="0" u="none" strike="noStrike" kern="1200" cap="none" spc="0" normalizeH="0" baseline="0" noProof="0">
-              <a:ln>
-                <a:noFill/>
-              </a:ln>
-              <a:solidFill>
-                <a:prstClr val="white"/>
-              </a:solidFill>
-              <a:effectLst/>
-              <a:uLnTx/>
-              <a:uFillTx/>
-              <a:latin typeface="Calibri" panose="020F0502020204030204"/>
-              <a:ea typeface="+mn-ea"/>
-              <a:cs typeface="+mn-cs"/>
-            </a:endParaRPr>
-          </a:p>
-        </p:txBody>
-      </p:sp>
       <p:sp>
         <p:nvSpPr>
           <p:cNvPr id="2" name="Title 1">
@@ -10157,252 +11540,29 @@
         </p:nvSpPr>
         <p:spPr>
           <a:xfrm>
-            <a:off x="1051560" y="586822"/>
-            <a:ext cx="3657600" cy="1645920"/>
+            <a:off x="838200" y="163481"/>
+            <a:ext cx="5731933" cy="739056"/>
           </a:xfrm>
         </p:spPr>
         <p:txBody>
-          <a:bodyPr vert="horz" lIns="91440" tIns="45720" rIns="91440" bIns="45720" rtlCol="0" anchor="ctr">
-            <a:normAutofit/>
+          <a:bodyPr>
+            <a:normAutofit fontScale="90000"/>
           </a:bodyPr>
           <a:lstStyle/>
           <a:p>
             <a:r>
-              <a:rPr lang="en-US" sz="3200" dirty="0">
-                <a:latin typeface="Calibri (Body)"/>
-              </a:rPr>
-              <a:t>Google</a:t>
-            </a:r>
-          </a:p>
-        </p:txBody>
-      </p:sp>
-      <p:sp>
-        <p:nvSpPr>
-          <p:cNvPr id="23" name="Rectangle 22">
-            <a:extLst>
-              <a:ext uri="{FF2B5EF4-FFF2-40B4-BE49-F238E27FC236}">
-                <a16:creationId xmlns:a16="http://schemas.microsoft.com/office/drawing/2014/main" id="{C1A2385B-1D2A-4E17-84FA-6CB7F0AAE473}"/>
-              </a:ext>
-              <a:ext uri="{C183D7F6-B498-43B3-948B-1728B52AA6E4}">
-                <adec:decorative xmlns:adec="http://schemas.microsoft.com/office/drawing/2017/decorative" val="1"/>
-              </a:ext>
-            </a:extLst>
-          </p:cNvPr>
-          <p:cNvSpPr>
-            <a:spLocks noGrp="1" noRot="1" noChangeAspect="1" noMove="1" noResize="1" noEditPoints="1" noAdjustHandles="1" noChangeArrowheads="1" noChangeShapeType="1" noTextEdit="1"/>
-          </p:cNvSpPr>
-          <p:nvPr>
-            <p:extLst>
-              <p:ext uri="{386F3935-93C4-4BCD-93E2-E3B085C9AB24}">
-                <p16:designElem xmlns:p16="http://schemas.microsoft.com/office/powerpoint/2015/main" val="1"/>
-              </p:ext>
-            </p:extLst>
-          </p:nvPr>
-        </p:nvSpPr>
-        <p:spPr>
-          <a:xfrm>
-            <a:off x="490408" y="1057739"/>
-            <a:ext cx="128016" cy="704088"/>
-          </a:xfrm>
-          <a:prstGeom prst="rect">
-            <a:avLst/>
-          </a:prstGeom>
-          <a:solidFill>
-            <a:schemeClr val="accent2"/>
-          </a:solidFill>
-          <a:ln>
-            <a:noFill/>
-          </a:ln>
-        </p:spPr>
-        <p:style>
-          <a:lnRef idx="2">
-            <a:schemeClr val="accent1">
-              <a:shade val="50000"/>
-            </a:schemeClr>
-          </a:lnRef>
-          <a:fillRef idx="1">
-            <a:schemeClr val="accent1"/>
-          </a:fillRef>
-          <a:effectRef idx="0">
-            <a:schemeClr val="accent1"/>
-          </a:effectRef>
-          <a:fontRef idx="minor">
-            <a:schemeClr val="lt1"/>
-          </a:fontRef>
-        </p:style>
-        <p:txBody>
-          <a:bodyPr rtlCol="0" anchor="ctr"/>
-          <a:lstStyle/>
-          <a:p>
-            <a:pPr algn="ctr"/>
-            <a:endParaRPr lang="en-US" dirty="0">
-              <a:solidFill>
-                <a:prstClr val="white"/>
-              </a:solidFill>
-              <a:latin typeface="Calibri" panose="020F0502020204030204"/>
-            </a:endParaRPr>
-          </a:p>
-        </p:txBody>
-      </p:sp>
-      <p:sp>
-        <p:nvSpPr>
-          <p:cNvPr id="25" name="Rectangle 24">
-            <a:extLst>
-              <a:ext uri="{FF2B5EF4-FFF2-40B4-BE49-F238E27FC236}">
-                <a16:creationId xmlns:a16="http://schemas.microsoft.com/office/drawing/2014/main" id="{5E791F2F-79DB-4CC0-9FA1-001E3E91E8B7}"/>
-              </a:ext>
-              <a:ext uri="{C183D7F6-B498-43B3-948B-1728B52AA6E4}">
-                <adec:decorative xmlns:adec="http://schemas.microsoft.com/office/drawing/2017/decorative" val="1"/>
-              </a:ext>
-            </a:extLst>
-          </p:cNvPr>
-          <p:cNvSpPr>
-            <a:spLocks noGrp="1" noRot="1" noChangeAspect="1" noMove="1" noResize="1" noEditPoints="1" noAdjustHandles="1" noChangeArrowheads="1" noChangeShapeType="1" noTextEdit="1"/>
-          </p:cNvSpPr>
-          <p:nvPr>
-            <p:extLst>
-              <p:ext uri="{386F3935-93C4-4BCD-93E2-E3B085C9AB24}">
-                <p16:designElem xmlns:p16="http://schemas.microsoft.com/office/powerpoint/2015/main" val="1"/>
-              </p:ext>
-            </p:extLst>
-          </p:nvPr>
-        </p:nvSpPr>
-        <p:spPr>
-          <a:xfrm rot="5400000">
-            <a:off x="4243541" y="1400638"/>
-            <a:ext cx="1463040" cy="18288"/>
-          </a:xfrm>
-          <a:prstGeom prst="rect">
-            <a:avLst/>
-          </a:prstGeom>
-          <a:solidFill>
-            <a:srgbClr val="D5D5D5"/>
-          </a:solidFill>
-          <a:ln w="3175">
-            <a:noFill/>
-          </a:ln>
-          <a:effectLst/>
-        </p:spPr>
-        <p:style>
-          <a:lnRef idx="2">
-            <a:schemeClr val="accent1">
-              <a:shade val="50000"/>
-            </a:schemeClr>
-          </a:lnRef>
-          <a:fillRef idx="1">
-            <a:schemeClr val="accent1"/>
-          </a:fillRef>
-          <a:effectRef idx="0">
-            <a:schemeClr val="accent1"/>
-          </a:effectRef>
-          <a:fontRef idx="minor">
-            <a:schemeClr val="lt1"/>
-          </a:fontRef>
-        </p:style>
-        <p:txBody>
-          <a:bodyPr rtlCol="0" anchor="ctr"/>
-          <a:lstStyle/>
-          <a:p>
-            <a:pPr marL="0" marR="0" lvl="0" indent="0" algn="ctr" defTabSz="914400" rtl="0" eaLnBrk="1" fontAlgn="auto" latinLnBrk="0" hangingPunct="1">
-              <a:lnSpc>
-                <a:spcPct val="100000"/>
-              </a:lnSpc>
-              <a:spcBef>
-                <a:spcPts val="0"/>
-              </a:spcBef>
-              <a:spcAft>
-                <a:spcPts val="0"/>
-              </a:spcAft>
-              <a:buClrTx/>
-              <a:buSzTx/>
-              <a:buFontTx/>
-              <a:buNone/>
-              <a:tabLst/>
-              <a:defRPr/>
-            </a:pPr>
-            <a:endParaRPr kumimoji="0" lang="en-US" sz="1800" b="0" i="0" u="none" strike="noStrike" kern="1200" cap="none" spc="0" normalizeH="0" baseline="0" noProof="0">
-              <a:ln>
-                <a:noFill/>
-              </a:ln>
-              <a:solidFill>
-                <a:prstClr val="white"/>
-              </a:solidFill>
-              <a:effectLst/>
-              <a:uLnTx/>
-              <a:uFillTx/>
-              <a:latin typeface="Calibri" panose="020F0502020204030204"/>
-              <a:ea typeface="+mn-ea"/>
-              <a:cs typeface="+mn-cs"/>
-            </a:endParaRPr>
-          </a:p>
-        </p:txBody>
-      </p:sp>
-      <p:sp>
-        <p:nvSpPr>
-          <p:cNvPr id="14" name="Rectangle 13">
-            <a:extLst>
-              <a:ext uri="{FF2B5EF4-FFF2-40B4-BE49-F238E27FC236}">
-                <a16:creationId xmlns:a16="http://schemas.microsoft.com/office/drawing/2014/main" id="{F008B410-051D-43C5-BEA3-FB4D1C174B46}"/>
-              </a:ext>
-            </a:extLst>
-          </p:cNvPr>
-          <p:cNvSpPr/>
-          <p:nvPr/>
-        </p:nvSpPr>
-        <p:spPr>
-          <a:xfrm>
-            <a:off x="5250106" y="586822"/>
-            <a:ext cx="6106742" cy="1645920"/>
-          </a:xfrm>
-          <a:prstGeom prst="rect">
-            <a:avLst/>
-          </a:prstGeom>
-        </p:spPr>
-        <p:txBody>
-          <a:bodyPr vert="horz" lIns="91440" tIns="45720" rIns="91440" bIns="45720" rtlCol="0" anchor="ctr">
-            <a:normAutofit/>
-          </a:bodyPr>
-          <a:lstStyle/>
-          <a:p>
-            <a:pPr indent="-228600">
-              <a:lnSpc>
-                <a:spcPct val="90000"/>
-              </a:lnSpc>
-              <a:spcAft>
-                <a:spcPts val="600"/>
-              </a:spcAft>
-              <a:buFont typeface="Arial" panose="020B0604020202020204" pitchFamily="34" charset="0"/>
-              <a:buChar char="•"/>
-            </a:pPr>
-            <a:r>
               <a:rPr lang="en-US" dirty="0"/>
-              <a:t>Sentiment towards Google also became slightly worse.</a:t>
-            </a:r>
-          </a:p>
-          <a:p>
-            <a:pPr indent="-228600">
-              <a:lnSpc>
-                <a:spcPct val="90000"/>
-              </a:lnSpc>
-              <a:spcAft>
-                <a:spcPts val="600"/>
-              </a:spcAft>
-              <a:buFont typeface="Arial" panose="020B0604020202020204" pitchFamily="34" charset="0"/>
-              <a:buChar char="•"/>
-            </a:pPr>
-            <a:r>
-              <a:rPr lang="en-US" dirty="0"/>
-              <a:t>While the graphs may seem to represent a positive change, the ratio of negative to positive comments have increased by nearly two-fold. </a:t>
+              <a:t>Word Cloud Comparison: Negative Sentiment Towards Apple </a:t>
             </a:r>
           </a:p>
         </p:txBody>
       </p:sp>
       <p:pic>
         <p:nvPicPr>
-          <p:cNvPr id="7" name="Picture 6">
+          <p:cNvPr id="4" name="Picture 3">
             <a:extLst>
               <a:ext uri="{FF2B5EF4-FFF2-40B4-BE49-F238E27FC236}">
-                <a16:creationId xmlns:a16="http://schemas.microsoft.com/office/drawing/2014/main" id="{770260DC-5919-42FD-8B97-60A388787D49}"/>
+                <a16:creationId xmlns:a16="http://schemas.microsoft.com/office/drawing/2014/main" id="{0D942AE8-A76D-4F0F-8500-E3EBE80A3E1B}"/>
               </a:ext>
             </a:extLst>
           </p:cNvPr>
@@ -10424,8 +11584,8 @@
         </p:blipFill>
         <p:spPr>
           <a:xfrm>
-            <a:off x="6139644" y="2925356"/>
-            <a:ext cx="5419344" cy="3676628"/>
+            <a:off x="7225058" y="533009"/>
+            <a:ext cx="4807988" cy="3119106"/>
           </a:xfrm>
           <a:prstGeom prst="rect">
             <a:avLst/>
@@ -10434,10 +11594,10 @@
       </p:pic>
       <p:pic>
         <p:nvPicPr>
-          <p:cNvPr id="4" name="Picture 3">
+          <p:cNvPr id="6" name="Picture 5">
             <a:extLst>
               <a:ext uri="{FF2B5EF4-FFF2-40B4-BE49-F238E27FC236}">
-                <a16:creationId xmlns:a16="http://schemas.microsoft.com/office/drawing/2014/main" id="{1B613720-693C-4B67-8EAA-3635591E8FA4}"/>
+                <a16:creationId xmlns:a16="http://schemas.microsoft.com/office/drawing/2014/main" id="{3DA90E20-93E6-4C7E-A307-B0EA3EBB1432}"/>
               </a:ext>
             </a:extLst>
           </p:cNvPr>
@@ -10459,18 +11619,169 @@
         </p:blipFill>
         <p:spPr>
           <a:xfrm>
-            <a:off x="345149" y="2925356"/>
-            <a:ext cx="5419344" cy="3676628"/>
+            <a:off x="7271123" y="3575413"/>
+            <a:ext cx="4807988" cy="3119106"/>
           </a:xfrm>
           <a:prstGeom prst="rect">
             <a:avLst/>
           </a:prstGeom>
         </p:spPr>
       </p:pic>
+      <p:sp>
+        <p:nvSpPr>
+          <p:cNvPr id="5" name="Rectangle 4">
+            <a:extLst>
+              <a:ext uri="{FF2B5EF4-FFF2-40B4-BE49-F238E27FC236}">
+                <a16:creationId xmlns:a16="http://schemas.microsoft.com/office/drawing/2014/main" id="{9BA72F7E-37B1-4576-88B4-0DF0B4B7A549}"/>
+              </a:ext>
+            </a:extLst>
+          </p:cNvPr>
+          <p:cNvSpPr/>
+          <p:nvPr/>
+        </p:nvSpPr>
+        <p:spPr>
+          <a:xfrm>
+            <a:off x="838200" y="1731532"/>
+            <a:ext cx="5625738" cy="4154984"/>
+          </a:xfrm>
+          <a:prstGeom prst="rect">
+            <a:avLst/>
+          </a:prstGeom>
+        </p:spPr>
+        <p:txBody>
+          <a:bodyPr wrap="square">
+            <a:spAutoFit/>
+          </a:bodyPr>
+          <a:lstStyle/>
+          <a:p>
+            <a:pPr marL="342900" indent="-342900">
+              <a:buFont typeface="Arial" panose="020B0604020202020204" pitchFamily="34" charset="0"/>
+              <a:buChar char="•"/>
+            </a:pPr>
+            <a:r>
+              <a:rPr lang="en-US" sz="2400" dirty="0">
+                <a:solidFill>
+                  <a:schemeClr val="tx1">
+                    <a:lumMod val="65000"/>
+                    <a:lumOff val="35000"/>
+                  </a:schemeClr>
+                </a:solidFill>
+              </a:rPr>
+              <a:t>Old Tweet: store, line, block, need, crazy</a:t>
+            </a:r>
+          </a:p>
+          <a:p>
+            <a:pPr marL="342900" indent="-342900">
+              <a:buFont typeface="Arial" panose="020B0604020202020204" pitchFamily="34" charset="0"/>
+              <a:buChar char="•"/>
+            </a:pPr>
+            <a:r>
+              <a:rPr lang="en-US" sz="2400" dirty="0">
+                <a:solidFill>
+                  <a:schemeClr val="tx1">
+                    <a:lumMod val="65000"/>
+                    <a:lumOff val="35000"/>
+                  </a:schemeClr>
+                </a:solidFill>
+              </a:rPr>
+              <a:t>New Tweet: price yet, people text, problem, stop, minutes drop</a:t>
+            </a:r>
+          </a:p>
+          <a:p>
+            <a:pPr marL="342900" indent="-342900">
+              <a:buFont typeface="Arial" panose="020B0604020202020204" pitchFamily="34" charset="0"/>
+              <a:buChar char="•"/>
+            </a:pPr>
+            <a:r>
+              <a:rPr lang="en-US" sz="2400" dirty="0">
+                <a:solidFill>
+                  <a:schemeClr val="tx1">
+                    <a:lumMod val="65000"/>
+                    <a:lumOff val="35000"/>
+                  </a:schemeClr>
+                </a:solidFill>
+              </a:rPr>
+              <a:t>As with before, the negative sentiment towards Apple has shifted from the Apple experience to people's discontent towards Apple's products and prices. </a:t>
+            </a:r>
+          </a:p>
+          <a:p>
+            <a:pPr marL="342900" indent="-342900">
+              <a:buFont typeface="Arial" panose="020B0604020202020204" pitchFamily="34" charset="0"/>
+              <a:buChar char="•"/>
+            </a:pPr>
+            <a:r>
+              <a:rPr lang="en-US" sz="2400" dirty="0" err="1">
+                <a:solidFill>
+                  <a:schemeClr val="tx1">
+                    <a:lumMod val="65000"/>
+                    <a:lumOff val="35000"/>
+                  </a:schemeClr>
+                </a:solidFill>
+              </a:rPr>
+              <a:t>Cashtag</a:t>
+            </a:r>
+            <a:r>
+              <a:rPr lang="en-US" sz="2400" dirty="0">
+                <a:solidFill>
+                  <a:schemeClr val="tx1">
+                    <a:lumMod val="65000"/>
+                    <a:lumOff val="35000"/>
+                  </a:schemeClr>
+                </a:solidFill>
+              </a:rPr>
+              <a:t>, get paid, </a:t>
+            </a:r>
+            <a:r>
+              <a:rPr lang="en-US" sz="2400" dirty="0" err="1">
+                <a:solidFill>
+                  <a:schemeClr val="tx1">
+                    <a:lumMod val="65000"/>
+                    <a:lumOff val="35000"/>
+                  </a:schemeClr>
+                </a:solidFill>
+              </a:rPr>
+              <a:t>cashtag</a:t>
+            </a:r>
+            <a:r>
+              <a:rPr lang="en-US" sz="2400" dirty="0">
+                <a:solidFill>
+                  <a:schemeClr val="tx1">
+                    <a:lumMod val="65000"/>
+                    <a:lumOff val="35000"/>
+                  </a:schemeClr>
+                </a:solidFill>
+              </a:rPr>
+              <a:t> name are all from advertisements that use an app called </a:t>
+            </a:r>
+            <a:r>
+              <a:rPr lang="en-US" sz="2400" dirty="0" err="1">
+                <a:solidFill>
+                  <a:schemeClr val="tx1">
+                    <a:lumMod val="65000"/>
+                    <a:lumOff val="35000"/>
+                  </a:schemeClr>
+                </a:solidFill>
+              </a:rPr>
+              <a:t>Cashpay</a:t>
+            </a:r>
+            <a:r>
+              <a:rPr lang="en-US" sz="2400" dirty="0">
+                <a:solidFill>
+                  <a:schemeClr val="tx1">
+                    <a:lumMod val="65000"/>
+                    <a:lumOff val="35000"/>
+                  </a:schemeClr>
+                </a:solidFill>
+              </a:rPr>
+              <a:t>. PayPal also seems to be associated with advertisements. </a:t>
+            </a:r>
+          </a:p>
+        </p:txBody>
+      </p:sp>
     </p:spTree>
     <p:extLst>
       <p:ext uri="{BB962C8B-B14F-4D97-AF65-F5344CB8AC3E}">
-        <p14:creationId xmlns:p14="http://schemas.microsoft.com/office/powerpoint/2010/main" val="187179566"/>
+        <p14:creationId xmlns:p14="http://schemas.microsoft.com/office/powerpoint/2010/main" val="480745458"/>
       </p:ext>
     </p:extLst>
   </p:cSld>

</xml_diff>

<commit_message>
final final update with all codes run in notebook
</commit_message>
<xml_diff>
--- a/twitter.pptx
+++ b/twitter.pptx
@@ -5920,7 +5920,29 @@
                   </a:schemeClr>
                 </a:solidFill>
               </a:rPr>
-              <a:t>Neutral sentiment towards Google seems to have shifted from texts relating to social media to general uses of the google search engine. </a:t>
+              <a:t>Neutral sentiment towards Google seems to have shifted from texts relating to social media to general uses of </a:t>
+            </a:r>
+            <a:r>
+              <a:rPr lang="en-US" sz="2400">
+                <a:solidFill>
+                  <a:schemeClr val="tx1">
+                    <a:lumMod val="65000"/>
+                    <a:lumOff val="35000"/>
+                  </a:schemeClr>
+                </a:solidFill>
+              </a:rPr>
+              <a:t>the Google </a:t>
+            </a:r>
+            <a:r>
+              <a:rPr lang="en-US" sz="2400" dirty="0">
+                <a:solidFill>
+                  <a:schemeClr val="tx1">
+                    <a:lumMod val="65000"/>
+                    <a:lumOff val="35000"/>
+                  </a:schemeClr>
+                </a:solidFill>
+              </a:rPr>
+              <a:t>search engine. </a:t>
             </a:r>
           </a:p>
         </p:txBody>

</xml_diff>